<commit_message>
add queue skeleton code
</commit_message>
<xml_diff>
--- a/slides/datastructures/stack/Stack.pptx
+++ b/slides/datastructures/stack/Stack.pptx
@@ -8622,7 +8622,7 @@
           </a:ln>
           <a:extLst>
             <a:ext uri="{C572A759-6A51-4108-AA02-DFA0A04FC94B}">
-              <ma14:wrappingTextBoxFlag xmlns:ma14="http://schemas.microsoft.com/office/mac/drawingml/2011/main" xmlns="" val="1"/>
+              <ma14:wrappingTextBoxFlag xmlns="" xmlns:ma14="http://schemas.microsoft.com/office/mac/drawingml/2011/main" val="1"/>
             </a:ext>
           </a:extLst>
         </p:spPr>
@@ -8661,7 +8661,7 @@
           </a:ln>
           <a:extLst>
             <a:ext uri="{C572A759-6A51-4108-AA02-DFA0A04FC94B}">
-              <ma14:wrappingTextBoxFlag xmlns:ma14="http://schemas.microsoft.com/office/mac/drawingml/2011/main" xmlns="" val="1"/>
+              <ma14:wrappingTextBoxFlag xmlns="" xmlns:ma14="http://schemas.microsoft.com/office/mac/drawingml/2011/main" val="1"/>
             </a:ext>
           </a:extLst>
         </p:spPr>
@@ -9772,7 +9772,7 @@
           </a:ln>
           <a:extLst>
             <a:ext uri="{C572A759-6A51-4108-AA02-DFA0A04FC94B}">
-              <ma14:wrappingTextBoxFlag xmlns:ma14="http://schemas.microsoft.com/office/mac/drawingml/2011/main" xmlns="" val="1"/>
+              <ma14:wrappingTextBoxFlag xmlns="" xmlns:ma14="http://schemas.microsoft.com/office/mac/drawingml/2011/main" val="1"/>
             </a:ext>
           </a:extLst>
         </p:spPr>
@@ -9819,7 +9819,7 @@
           </a:ln>
           <a:extLst>
             <a:ext uri="{C572A759-6A51-4108-AA02-DFA0A04FC94B}">
-              <ma14:wrappingTextBoxFlag xmlns:ma14="http://schemas.microsoft.com/office/mac/drawingml/2011/main" xmlns="" val="1"/>
+              <ma14:wrappingTextBoxFlag xmlns="" xmlns:ma14="http://schemas.microsoft.com/office/mac/drawingml/2011/main" val="1"/>
             </a:ext>
           </a:extLst>
         </p:spPr>
@@ -9866,7 +9866,7 @@
           </a:ln>
           <a:extLst>
             <a:ext uri="{C572A759-6A51-4108-AA02-DFA0A04FC94B}">
-              <ma14:wrappingTextBoxFlag xmlns:ma14="http://schemas.microsoft.com/office/mac/drawingml/2011/main" xmlns="" val="1"/>
+              <ma14:wrappingTextBoxFlag xmlns="" xmlns:ma14="http://schemas.microsoft.com/office/mac/drawingml/2011/main" val="1"/>
             </a:ext>
           </a:extLst>
         </p:spPr>
@@ -9910,7 +9910,7 @@
           </a:ln>
           <a:extLst>
             <a:ext uri="{C572A759-6A51-4108-AA02-DFA0A04FC94B}">
-              <ma14:wrappingTextBoxFlag xmlns:ma14="http://schemas.microsoft.com/office/mac/drawingml/2011/main" xmlns="" val="1"/>
+              <ma14:wrappingTextBoxFlag xmlns="" xmlns:ma14="http://schemas.microsoft.com/office/mac/drawingml/2011/main" val="1"/>
             </a:ext>
           </a:extLst>
         </p:spPr>
@@ -10064,7 +10064,7 @@
           </a:ln>
           <a:extLst>
             <a:ext uri="{C572A759-6A51-4108-AA02-DFA0A04FC94B}">
-              <ma14:wrappingTextBoxFlag xmlns:ma14="http://schemas.microsoft.com/office/mac/drawingml/2011/main" xmlns="" val="1"/>
+              <ma14:wrappingTextBoxFlag xmlns="" xmlns:ma14="http://schemas.microsoft.com/office/mac/drawingml/2011/main" val="1"/>
             </a:ext>
           </a:extLst>
         </p:spPr>
@@ -10114,7 +10114,7 @@
           </a:ln>
           <a:extLst>
             <a:ext uri="{C572A759-6A51-4108-AA02-DFA0A04FC94B}">
-              <ma14:wrappingTextBoxFlag xmlns:ma14="http://schemas.microsoft.com/office/mac/drawingml/2011/main" xmlns="" val="1"/>
+              <ma14:wrappingTextBoxFlag xmlns="" xmlns:ma14="http://schemas.microsoft.com/office/mac/drawingml/2011/main" val="1"/>
             </a:ext>
           </a:extLst>
         </p:spPr>
@@ -10243,7 +10243,7 @@
           </a:ln>
           <a:extLst>
             <a:ext uri="{C572A759-6A51-4108-AA02-DFA0A04FC94B}">
-              <ma14:wrappingTextBoxFlag xmlns:ma14="http://schemas.microsoft.com/office/mac/drawingml/2011/main" xmlns="" val="1"/>
+              <ma14:wrappingTextBoxFlag xmlns="" xmlns:ma14="http://schemas.microsoft.com/office/mac/drawingml/2011/main" val="1"/>
             </a:ext>
           </a:extLst>
         </p:spPr>
@@ -10290,7 +10290,7 @@
           </a:ln>
           <a:extLst>
             <a:ext uri="{C572A759-6A51-4108-AA02-DFA0A04FC94B}">
-              <ma14:wrappingTextBoxFlag xmlns:ma14="http://schemas.microsoft.com/office/mac/drawingml/2011/main" xmlns="" val="1"/>
+              <ma14:wrappingTextBoxFlag xmlns="" xmlns:ma14="http://schemas.microsoft.com/office/mac/drawingml/2011/main" val="1"/>
             </a:ext>
           </a:extLst>
         </p:spPr>
@@ -10337,7 +10337,7 @@
           </a:ln>
           <a:extLst>
             <a:ext uri="{C572A759-6A51-4108-AA02-DFA0A04FC94B}">
-              <ma14:wrappingTextBoxFlag xmlns:ma14="http://schemas.microsoft.com/office/mac/drawingml/2011/main" xmlns="" val="1"/>
+              <ma14:wrappingTextBoxFlag xmlns="" xmlns:ma14="http://schemas.microsoft.com/office/mac/drawingml/2011/main" val="1"/>
             </a:ext>
           </a:extLst>
         </p:spPr>
@@ -10381,7 +10381,7 @@
           </a:ln>
           <a:extLst>
             <a:ext uri="{C572A759-6A51-4108-AA02-DFA0A04FC94B}">
-              <ma14:wrappingTextBoxFlag xmlns:ma14="http://schemas.microsoft.com/office/mac/drawingml/2011/main" xmlns="" val="1"/>
+              <ma14:wrappingTextBoxFlag xmlns="" xmlns:ma14="http://schemas.microsoft.com/office/mac/drawingml/2011/main" val="1"/>
             </a:ext>
           </a:extLst>
         </p:spPr>
@@ -10535,7 +10535,7 @@
           </a:ln>
           <a:extLst>
             <a:ext uri="{C572A759-6A51-4108-AA02-DFA0A04FC94B}">
-              <ma14:wrappingTextBoxFlag xmlns:ma14="http://schemas.microsoft.com/office/mac/drawingml/2011/main" xmlns="" val="1"/>
+              <ma14:wrappingTextBoxFlag xmlns="" xmlns:ma14="http://schemas.microsoft.com/office/mac/drawingml/2011/main" val="1"/>
             </a:ext>
           </a:extLst>
         </p:spPr>
@@ -10582,7 +10582,7 @@
           </a:ln>
           <a:extLst>
             <a:ext uri="{C572A759-6A51-4108-AA02-DFA0A04FC94B}">
-              <ma14:wrappingTextBoxFlag xmlns:ma14="http://schemas.microsoft.com/office/mac/drawingml/2011/main" xmlns="" val="1"/>
+              <ma14:wrappingTextBoxFlag xmlns="" xmlns:ma14="http://schemas.microsoft.com/office/mac/drawingml/2011/main" val="1"/>
             </a:ext>
           </a:extLst>
         </p:spPr>
@@ -10670,7 +10670,7 @@
           </a:ln>
           <a:extLst>
             <a:ext uri="{C572A759-6A51-4108-AA02-DFA0A04FC94B}">
-              <ma14:wrappingTextBoxFlag xmlns:ma14="http://schemas.microsoft.com/office/mac/drawingml/2011/main" xmlns="" val="1"/>
+              <ma14:wrappingTextBoxFlag xmlns="" xmlns:ma14="http://schemas.microsoft.com/office/mac/drawingml/2011/main" val="1"/>
             </a:ext>
           </a:extLst>
         </p:spPr>
@@ -10799,7 +10799,7 @@
           </a:ln>
           <a:extLst>
             <a:ext uri="{C572A759-6A51-4108-AA02-DFA0A04FC94B}">
-              <ma14:wrappingTextBoxFlag xmlns:ma14="http://schemas.microsoft.com/office/mac/drawingml/2011/main" xmlns="" val="1"/>
+              <ma14:wrappingTextBoxFlag xmlns="" xmlns:ma14="http://schemas.microsoft.com/office/mac/drawingml/2011/main" val="1"/>
             </a:ext>
           </a:extLst>
         </p:spPr>
@@ -10846,7 +10846,7 @@
           </a:ln>
           <a:extLst>
             <a:ext uri="{C572A759-6A51-4108-AA02-DFA0A04FC94B}">
-              <ma14:wrappingTextBoxFlag xmlns:ma14="http://schemas.microsoft.com/office/mac/drawingml/2011/main" xmlns="" val="1"/>
+              <ma14:wrappingTextBoxFlag xmlns="" xmlns:ma14="http://schemas.microsoft.com/office/mac/drawingml/2011/main" val="1"/>
             </a:ext>
           </a:extLst>
         </p:spPr>
@@ -10893,7 +10893,7 @@
           </a:ln>
           <a:extLst>
             <a:ext uri="{C572A759-6A51-4108-AA02-DFA0A04FC94B}">
-              <ma14:wrappingTextBoxFlag xmlns:ma14="http://schemas.microsoft.com/office/mac/drawingml/2011/main" xmlns="" val="1"/>
+              <ma14:wrappingTextBoxFlag xmlns="" xmlns:ma14="http://schemas.microsoft.com/office/mac/drawingml/2011/main" val="1"/>
             </a:ext>
           </a:extLst>
         </p:spPr>
@@ -10937,7 +10937,7 @@
           </a:ln>
           <a:extLst>
             <a:ext uri="{C572A759-6A51-4108-AA02-DFA0A04FC94B}">
-              <ma14:wrappingTextBoxFlag xmlns:ma14="http://schemas.microsoft.com/office/mac/drawingml/2011/main" xmlns="" val="1"/>
+              <ma14:wrappingTextBoxFlag xmlns="" xmlns:ma14="http://schemas.microsoft.com/office/mac/drawingml/2011/main" val="1"/>
             </a:ext>
           </a:extLst>
         </p:spPr>
@@ -11091,7 +11091,7 @@
           </a:ln>
           <a:extLst>
             <a:ext uri="{C572A759-6A51-4108-AA02-DFA0A04FC94B}">
-              <ma14:wrappingTextBoxFlag xmlns:ma14="http://schemas.microsoft.com/office/mac/drawingml/2011/main" xmlns="" val="1"/>
+              <ma14:wrappingTextBoxFlag xmlns="" xmlns:ma14="http://schemas.microsoft.com/office/mac/drawingml/2011/main" val="1"/>
             </a:ext>
           </a:extLst>
         </p:spPr>
@@ -11138,7 +11138,7 @@
           </a:ln>
           <a:extLst>
             <a:ext uri="{C572A759-6A51-4108-AA02-DFA0A04FC94B}">
-              <ma14:wrappingTextBoxFlag xmlns:ma14="http://schemas.microsoft.com/office/mac/drawingml/2011/main" xmlns="" val="1"/>
+              <ma14:wrappingTextBoxFlag xmlns="" xmlns:ma14="http://schemas.microsoft.com/office/mac/drawingml/2011/main" val="1"/>
             </a:ext>
           </a:extLst>
         </p:spPr>
@@ -11188,7 +11188,7 @@
           </a:ln>
           <a:extLst>
             <a:ext uri="{C572A759-6A51-4108-AA02-DFA0A04FC94B}">
-              <ma14:wrappingTextBoxFlag xmlns:ma14="http://schemas.microsoft.com/office/mac/drawingml/2011/main" xmlns="" val="1"/>
+              <ma14:wrappingTextBoxFlag xmlns="" xmlns:ma14="http://schemas.microsoft.com/office/mac/drawingml/2011/main" val="1"/>
             </a:ext>
           </a:extLst>
         </p:spPr>
@@ -11317,7 +11317,7 @@
           </a:ln>
           <a:extLst>
             <a:ext uri="{C572A759-6A51-4108-AA02-DFA0A04FC94B}">
-              <ma14:wrappingTextBoxFlag xmlns:ma14="http://schemas.microsoft.com/office/mac/drawingml/2011/main" xmlns="" val="1"/>
+              <ma14:wrappingTextBoxFlag xmlns="" xmlns:ma14="http://schemas.microsoft.com/office/mac/drawingml/2011/main" val="1"/>
             </a:ext>
           </a:extLst>
         </p:spPr>
@@ -11364,7 +11364,7 @@
           </a:ln>
           <a:extLst>
             <a:ext uri="{C572A759-6A51-4108-AA02-DFA0A04FC94B}">
-              <ma14:wrappingTextBoxFlag xmlns:ma14="http://schemas.microsoft.com/office/mac/drawingml/2011/main" xmlns="" val="1"/>
+              <ma14:wrappingTextBoxFlag xmlns="" xmlns:ma14="http://schemas.microsoft.com/office/mac/drawingml/2011/main" val="1"/>
             </a:ext>
           </a:extLst>
         </p:spPr>
@@ -11411,7 +11411,7 @@
           </a:ln>
           <a:extLst>
             <a:ext uri="{C572A759-6A51-4108-AA02-DFA0A04FC94B}">
-              <ma14:wrappingTextBoxFlag xmlns:ma14="http://schemas.microsoft.com/office/mac/drawingml/2011/main" xmlns="" val="1"/>
+              <ma14:wrappingTextBoxFlag xmlns="" xmlns:ma14="http://schemas.microsoft.com/office/mac/drawingml/2011/main" val="1"/>
             </a:ext>
           </a:extLst>
         </p:spPr>
@@ -11455,7 +11455,7 @@
           </a:ln>
           <a:extLst>
             <a:ext uri="{C572A759-6A51-4108-AA02-DFA0A04FC94B}">
-              <ma14:wrappingTextBoxFlag xmlns:ma14="http://schemas.microsoft.com/office/mac/drawingml/2011/main" xmlns="" val="1"/>
+              <ma14:wrappingTextBoxFlag xmlns="" xmlns:ma14="http://schemas.microsoft.com/office/mac/drawingml/2011/main" val="1"/>
             </a:ext>
           </a:extLst>
         </p:spPr>
@@ -11609,7 +11609,7 @@
           </a:ln>
           <a:extLst>
             <a:ext uri="{C572A759-6A51-4108-AA02-DFA0A04FC94B}">
-              <ma14:wrappingTextBoxFlag xmlns:ma14="http://schemas.microsoft.com/office/mac/drawingml/2011/main" xmlns="" val="1"/>
+              <ma14:wrappingTextBoxFlag xmlns="" xmlns:ma14="http://schemas.microsoft.com/office/mac/drawingml/2011/main" val="1"/>
             </a:ext>
           </a:extLst>
         </p:spPr>
@@ -11656,7 +11656,7 @@
           </a:ln>
           <a:extLst>
             <a:ext uri="{C572A759-6A51-4108-AA02-DFA0A04FC94B}">
-              <ma14:wrappingTextBoxFlag xmlns:ma14="http://schemas.microsoft.com/office/mac/drawingml/2011/main" xmlns="" val="1"/>
+              <ma14:wrappingTextBoxFlag xmlns="" xmlns:ma14="http://schemas.microsoft.com/office/mac/drawingml/2011/main" val="1"/>
             </a:ext>
           </a:extLst>
         </p:spPr>
@@ -11703,7 +11703,7 @@
           </a:ln>
           <a:extLst>
             <a:ext uri="{C572A759-6A51-4108-AA02-DFA0A04FC94B}">
-              <ma14:wrappingTextBoxFlag xmlns:ma14="http://schemas.microsoft.com/office/mac/drawingml/2011/main" xmlns="" val="1"/>
+              <ma14:wrappingTextBoxFlag xmlns="" xmlns:ma14="http://schemas.microsoft.com/office/mac/drawingml/2011/main" val="1"/>
             </a:ext>
           </a:extLst>
         </p:spPr>
@@ -11791,7 +11791,7 @@
           </a:ln>
           <a:extLst>
             <a:ext uri="{C572A759-6A51-4108-AA02-DFA0A04FC94B}">
-              <ma14:wrappingTextBoxFlag xmlns:ma14="http://schemas.microsoft.com/office/mac/drawingml/2011/main" xmlns="" val="1"/>
+              <ma14:wrappingTextBoxFlag xmlns="" xmlns:ma14="http://schemas.microsoft.com/office/mac/drawingml/2011/main" val="1"/>
             </a:ext>
           </a:extLst>
         </p:spPr>
@@ -11920,7 +11920,7 @@
           </a:ln>
           <a:extLst>
             <a:ext uri="{C572A759-6A51-4108-AA02-DFA0A04FC94B}">
-              <ma14:wrappingTextBoxFlag xmlns:ma14="http://schemas.microsoft.com/office/mac/drawingml/2011/main" xmlns="" val="1"/>
+              <ma14:wrappingTextBoxFlag xmlns="" xmlns:ma14="http://schemas.microsoft.com/office/mac/drawingml/2011/main" val="1"/>
             </a:ext>
           </a:extLst>
         </p:spPr>
@@ -11967,7 +11967,7 @@
           </a:ln>
           <a:extLst>
             <a:ext uri="{C572A759-6A51-4108-AA02-DFA0A04FC94B}">
-              <ma14:wrappingTextBoxFlag xmlns:ma14="http://schemas.microsoft.com/office/mac/drawingml/2011/main" xmlns="" val="1"/>
+              <ma14:wrappingTextBoxFlag xmlns="" xmlns:ma14="http://schemas.microsoft.com/office/mac/drawingml/2011/main" val="1"/>
             </a:ext>
           </a:extLst>
         </p:spPr>
@@ -12014,7 +12014,7 @@
           </a:ln>
           <a:extLst>
             <a:ext uri="{C572A759-6A51-4108-AA02-DFA0A04FC94B}">
-              <ma14:wrappingTextBoxFlag xmlns:ma14="http://schemas.microsoft.com/office/mac/drawingml/2011/main" xmlns="" val="1"/>
+              <ma14:wrappingTextBoxFlag xmlns="" xmlns:ma14="http://schemas.microsoft.com/office/mac/drawingml/2011/main" val="1"/>
             </a:ext>
           </a:extLst>
         </p:spPr>
@@ -12058,7 +12058,7 @@
           </a:ln>
           <a:extLst>
             <a:ext uri="{C572A759-6A51-4108-AA02-DFA0A04FC94B}">
-              <ma14:wrappingTextBoxFlag xmlns:ma14="http://schemas.microsoft.com/office/mac/drawingml/2011/main" xmlns="" val="1"/>
+              <ma14:wrappingTextBoxFlag xmlns="" xmlns:ma14="http://schemas.microsoft.com/office/mac/drawingml/2011/main" val="1"/>
             </a:ext>
           </a:extLst>
         </p:spPr>
@@ -12212,7 +12212,7 @@
           </a:ln>
           <a:extLst>
             <a:ext uri="{C572A759-6A51-4108-AA02-DFA0A04FC94B}">
-              <ma14:wrappingTextBoxFlag xmlns:ma14="http://schemas.microsoft.com/office/mac/drawingml/2011/main" xmlns="" val="1"/>
+              <ma14:wrappingTextBoxFlag xmlns="" xmlns:ma14="http://schemas.microsoft.com/office/mac/drawingml/2011/main" val="1"/>
             </a:ext>
           </a:extLst>
         </p:spPr>
@@ -12259,7 +12259,7 @@
           </a:ln>
           <a:extLst>
             <a:ext uri="{C572A759-6A51-4108-AA02-DFA0A04FC94B}">
-              <ma14:wrappingTextBoxFlag xmlns:ma14="http://schemas.microsoft.com/office/mac/drawingml/2011/main" xmlns="" val="1"/>
+              <ma14:wrappingTextBoxFlag xmlns="" xmlns:ma14="http://schemas.microsoft.com/office/mac/drawingml/2011/main" val="1"/>
             </a:ext>
           </a:extLst>
         </p:spPr>
@@ -12306,7 +12306,7 @@
           </a:ln>
           <a:extLst>
             <a:ext uri="{C572A759-6A51-4108-AA02-DFA0A04FC94B}">
-              <ma14:wrappingTextBoxFlag xmlns:ma14="http://schemas.microsoft.com/office/mac/drawingml/2011/main" xmlns="" val="1"/>
+              <ma14:wrappingTextBoxFlag xmlns="" xmlns:ma14="http://schemas.microsoft.com/office/mac/drawingml/2011/main" val="1"/>
             </a:ext>
           </a:extLst>
         </p:spPr>
@@ -12356,7 +12356,7 @@
           </a:ln>
           <a:extLst>
             <a:ext uri="{C572A759-6A51-4108-AA02-DFA0A04FC94B}">
-              <ma14:wrappingTextBoxFlag xmlns:ma14="http://schemas.microsoft.com/office/mac/drawingml/2011/main" xmlns="" val="1"/>
+              <ma14:wrappingTextBoxFlag xmlns="" xmlns:ma14="http://schemas.microsoft.com/office/mac/drawingml/2011/main" val="1"/>
             </a:ext>
           </a:extLst>
         </p:spPr>
@@ -12485,7 +12485,7 @@
           </a:ln>
           <a:extLst>
             <a:ext uri="{C572A759-6A51-4108-AA02-DFA0A04FC94B}">
-              <ma14:wrappingTextBoxFlag xmlns:ma14="http://schemas.microsoft.com/office/mac/drawingml/2011/main" xmlns="" val="1"/>
+              <ma14:wrappingTextBoxFlag xmlns="" xmlns:ma14="http://schemas.microsoft.com/office/mac/drawingml/2011/main" val="1"/>
             </a:ext>
           </a:extLst>
         </p:spPr>
@@ -12532,7 +12532,7 @@
           </a:ln>
           <a:extLst>
             <a:ext uri="{C572A759-6A51-4108-AA02-DFA0A04FC94B}">
-              <ma14:wrappingTextBoxFlag xmlns:ma14="http://schemas.microsoft.com/office/mac/drawingml/2011/main" xmlns="" val="1"/>
+              <ma14:wrappingTextBoxFlag xmlns="" xmlns:ma14="http://schemas.microsoft.com/office/mac/drawingml/2011/main" val="1"/>
             </a:ext>
           </a:extLst>
         </p:spPr>
@@ -12579,7 +12579,7 @@
           </a:ln>
           <a:extLst>
             <a:ext uri="{C572A759-6A51-4108-AA02-DFA0A04FC94B}">
-              <ma14:wrappingTextBoxFlag xmlns:ma14="http://schemas.microsoft.com/office/mac/drawingml/2011/main" xmlns="" val="1"/>
+              <ma14:wrappingTextBoxFlag xmlns="" xmlns:ma14="http://schemas.microsoft.com/office/mac/drawingml/2011/main" val="1"/>
             </a:ext>
           </a:extLst>
         </p:spPr>
@@ -12623,7 +12623,7 @@
           </a:ln>
           <a:extLst>
             <a:ext uri="{C572A759-6A51-4108-AA02-DFA0A04FC94B}">
-              <ma14:wrappingTextBoxFlag xmlns:ma14="http://schemas.microsoft.com/office/mac/drawingml/2011/main" xmlns="" val="1"/>
+              <ma14:wrappingTextBoxFlag xmlns="" xmlns:ma14="http://schemas.microsoft.com/office/mac/drawingml/2011/main" val="1"/>
             </a:ext>
           </a:extLst>
         </p:spPr>
@@ -12777,7 +12777,7 @@
           </a:ln>
           <a:extLst>
             <a:ext uri="{C572A759-6A51-4108-AA02-DFA0A04FC94B}">
-              <ma14:wrappingTextBoxFlag xmlns:ma14="http://schemas.microsoft.com/office/mac/drawingml/2011/main" xmlns="" val="1"/>
+              <ma14:wrappingTextBoxFlag xmlns="" xmlns:ma14="http://schemas.microsoft.com/office/mac/drawingml/2011/main" val="1"/>
             </a:ext>
           </a:extLst>
         </p:spPr>
@@ -12824,7 +12824,7 @@
           </a:ln>
           <a:extLst>
             <a:ext uri="{C572A759-6A51-4108-AA02-DFA0A04FC94B}">
-              <ma14:wrappingTextBoxFlag xmlns:ma14="http://schemas.microsoft.com/office/mac/drawingml/2011/main" xmlns="" val="1"/>
+              <ma14:wrappingTextBoxFlag xmlns="" xmlns:ma14="http://schemas.microsoft.com/office/mac/drawingml/2011/main" val="1"/>
             </a:ext>
           </a:extLst>
         </p:spPr>
@@ -12871,7 +12871,7 @@
           </a:ln>
           <a:extLst>
             <a:ext uri="{C572A759-6A51-4108-AA02-DFA0A04FC94B}">
-              <ma14:wrappingTextBoxFlag xmlns:ma14="http://schemas.microsoft.com/office/mac/drawingml/2011/main" xmlns="" val="1"/>
+              <ma14:wrappingTextBoxFlag xmlns="" xmlns:ma14="http://schemas.microsoft.com/office/mac/drawingml/2011/main" val="1"/>
             </a:ext>
           </a:extLst>
         </p:spPr>
@@ -12921,7 +12921,7 @@
           </a:ln>
           <a:extLst>
             <a:ext uri="{C572A759-6A51-4108-AA02-DFA0A04FC94B}">
-              <ma14:wrappingTextBoxFlag xmlns:ma14="http://schemas.microsoft.com/office/mac/drawingml/2011/main" xmlns="" val="1"/>
+              <ma14:wrappingTextBoxFlag xmlns="" xmlns:ma14="http://schemas.microsoft.com/office/mac/drawingml/2011/main" val="1"/>
             </a:ext>
           </a:extLst>
         </p:spPr>
@@ -13050,7 +13050,7 @@
           </a:ln>
           <a:extLst>
             <a:ext uri="{C572A759-6A51-4108-AA02-DFA0A04FC94B}">
-              <ma14:wrappingTextBoxFlag xmlns:ma14="http://schemas.microsoft.com/office/mac/drawingml/2011/main" xmlns="" val="1"/>
+              <ma14:wrappingTextBoxFlag xmlns="" xmlns:ma14="http://schemas.microsoft.com/office/mac/drawingml/2011/main" val="1"/>
             </a:ext>
           </a:extLst>
         </p:spPr>
@@ -13097,7 +13097,7 @@
           </a:ln>
           <a:extLst>
             <a:ext uri="{C572A759-6A51-4108-AA02-DFA0A04FC94B}">
-              <ma14:wrappingTextBoxFlag xmlns:ma14="http://schemas.microsoft.com/office/mac/drawingml/2011/main" xmlns="" val="1"/>
+              <ma14:wrappingTextBoxFlag xmlns="" xmlns:ma14="http://schemas.microsoft.com/office/mac/drawingml/2011/main" val="1"/>
             </a:ext>
           </a:extLst>
         </p:spPr>
@@ -13144,7 +13144,7 @@
           </a:ln>
           <a:extLst>
             <a:ext uri="{C572A759-6A51-4108-AA02-DFA0A04FC94B}">
-              <ma14:wrappingTextBoxFlag xmlns:ma14="http://schemas.microsoft.com/office/mac/drawingml/2011/main" xmlns="" val="1"/>
+              <ma14:wrappingTextBoxFlag xmlns="" xmlns:ma14="http://schemas.microsoft.com/office/mac/drawingml/2011/main" val="1"/>
             </a:ext>
           </a:extLst>
         </p:spPr>
@@ -13188,7 +13188,7 @@
           </a:ln>
           <a:extLst>
             <a:ext uri="{C572A759-6A51-4108-AA02-DFA0A04FC94B}">
-              <ma14:wrappingTextBoxFlag xmlns:ma14="http://schemas.microsoft.com/office/mac/drawingml/2011/main" xmlns="" val="1"/>
+              <ma14:wrappingTextBoxFlag xmlns="" xmlns:ma14="http://schemas.microsoft.com/office/mac/drawingml/2011/main" val="1"/>
             </a:ext>
           </a:extLst>
         </p:spPr>
@@ -13342,7 +13342,7 @@
           </a:ln>
           <a:extLst>
             <a:ext uri="{C572A759-6A51-4108-AA02-DFA0A04FC94B}">
-              <ma14:wrappingTextBoxFlag xmlns:ma14="http://schemas.microsoft.com/office/mac/drawingml/2011/main" xmlns="" val="1"/>
+              <ma14:wrappingTextBoxFlag xmlns="" xmlns:ma14="http://schemas.microsoft.com/office/mac/drawingml/2011/main" val="1"/>
             </a:ext>
           </a:extLst>
         </p:spPr>
@@ -13389,7 +13389,7 @@
           </a:ln>
           <a:extLst>
             <a:ext uri="{C572A759-6A51-4108-AA02-DFA0A04FC94B}">
-              <ma14:wrappingTextBoxFlag xmlns:ma14="http://schemas.microsoft.com/office/mac/drawingml/2011/main" xmlns="" val="1"/>
+              <ma14:wrappingTextBoxFlag xmlns="" xmlns:ma14="http://schemas.microsoft.com/office/mac/drawingml/2011/main" val="1"/>
             </a:ext>
           </a:extLst>
         </p:spPr>
@@ -13436,7 +13436,7 @@
           </a:ln>
           <a:extLst>
             <a:ext uri="{C572A759-6A51-4108-AA02-DFA0A04FC94B}">
-              <ma14:wrappingTextBoxFlag xmlns:ma14="http://schemas.microsoft.com/office/mac/drawingml/2011/main" xmlns="" val="1"/>
+              <ma14:wrappingTextBoxFlag xmlns="" xmlns:ma14="http://schemas.microsoft.com/office/mac/drawingml/2011/main" val="1"/>
             </a:ext>
           </a:extLst>
         </p:spPr>
@@ -13524,7 +13524,7 @@
           </a:ln>
           <a:extLst>
             <a:ext uri="{C572A759-6A51-4108-AA02-DFA0A04FC94B}">
-              <ma14:wrappingTextBoxFlag xmlns:ma14="http://schemas.microsoft.com/office/mac/drawingml/2011/main" xmlns="" val="1"/>
+              <ma14:wrappingTextBoxFlag xmlns="" xmlns:ma14="http://schemas.microsoft.com/office/mac/drawingml/2011/main" val="1"/>
             </a:ext>
           </a:extLst>
         </p:spPr>
@@ -13653,7 +13653,7 @@
           </a:ln>
           <a:extLst>
             <a:ext uri="{C572A759-6A51-4108-AA02-DFA0A04FC94B}">
-              <ma14:wrappingTextBoxFlag xmlns:ma14="http://schemas.microsoft.com/office/mac/drawingml/2011/main" xmlns="" val="1"/>
+              <ma14:wrappingTextBoxFlag xmlns="" xmlns:ma14="http://schemas.microsoft.com/office/mac/drawingml/2011/main" val="1"/>
             </a:ext>
           </a:extLst>
         </p:spPr>
@@ -13700,7 +13700,7 @@
           </a:ln>
           <a:extLst>
             <a:ext uri="{C572A759-6A51-4108-AA02-DFA0A04FC94B}">
-              <ma14:wrappingTextBoxFlag xmlns:ma14="http://schemas.microsoft.com/office/mac/drawingml/2011/main" xmlns="" val="1"/>
+              <ma14:wrappingTextBoxFlag xmlns="" xmlns:ma14="http://schemas.microsoft.com/office/mac/drawingml/2011/main" val="1"/>
             </a:ext>
           </a:extLst>
         </p:spPr>
@@ -13747,7 +13747,7 @@
           </a:ln>
           <a:extLst>
             <a:ext uri="{C572A759-6A51-4108-AA02-DFA0A04FC94B}">
-              <ma14:wrappingTextBoxFlag xmlns:ma14="http://schemas.microsoft.com/office/mac/drawingml/2011/main" xmlns="" val="1"/>
+              <ma14:wrappingTextBoxFlag xmlns="" xmlns:ma14="http://schemas.microsoft.com/office/mac/drawingml/2011/main" val="1"/>
             </a:ext>
           </a:extLst>
         </p:spPr>
@@ -13791,7 +13791,7 @@
           </a:ln>
           <a:extLst>
             <a:ext uri="{C572A759-6A51-4108-AA02-DFA0A04FC94B}">
-              <ma14:wrappingTextBoxFlag xmlns:ma14="http://schemas.microsoft.com/office/mac/drawingml/2011/main" xmlns="" val="1"/>
+              <ma14:wrappingTextBoxFlag xmlns="" xmlns:ma14="http://schemas.microsoft.com/office/mac/drawingml/2011/main" val="1"/>
             </a:ext>
           </a:extLst>
         </p:spPr>
@@ -13945,7 +13945,7 @@
           </a:ln>
           <a:extLst>
             <a:ext uri="{C572A759-6A51-4108-AA02-DFA0A04FC94B}">
-              <ma14:wrappingTextBoxFlag xmlns:ma14="http://schemas.microsoft.com/office/mac/drawingml/2011/main" xmlns="" val="1"/>
+              <ma14:wrappingTextBoxFlag xmlns="" xmlns:ma14="http://schemas.microsoft.com/office/mac/drawingml/2011/main" val="1"/>
             </a:ext>
           </a:extLst>
         </p:spPr>
@@ -13992,7 +13992,7 @@
           </a:ln>
           <a:extLst>
             <a:ext uri="{C572A759-6A51-4108-AA02-DFA0A04FC94B}">
-              <ma14:wrappingTextBoxFlag xmlns:ma14="http://schemas.microsoft.com/office/mac/drawingml/2011/main" xmlns="" val="1"/>
+              <ma14:wrappingTextBoxFlag xmlns="" xmlns:ma14="http://schemas.microsoft.com/office/mac/drawingml/2011/main" val="1"/>
             </a:ext>
           </a:extLst>
         </p:spPr>
@@ -14042,7 +14042,7 @@
           </a:ln>
           <a:extLst>
             <a:ext uri="{C572A759-6A51-4108-AA02-DFA0A04FC94B}">
-              <ma14:wrappingTextBoxFlag xmlns:ma14="http://schemas.microsoft.com/office/mac/drawingml/2011/main" xmlns="" val="1"/>
+              <ma14:wrappingTextBoxFlag xmlns="" xmlns:ma14="http://schemas.microsoft.com/office/mac/drawingml/2011/main" val="1"/>
             </a:ext>
           </a:extLst>
         </p:spPr>
@@ -14171,7 +14171,7 @@
           </a:ln>
           <a:extLst>
             <a:ext uri="{C572A759-6A51-4108-AA02-DFA0A04FC94B}">
-              <ma14:wrappingTextBoxFlag xmlns:ma14="http://schemas.microsoft.com/office/mac/drawingml/2011/main" xmlns="" val="1"/>
+              <ma14:wrappingTextBoxFlag xmlns="" xmlns:ma14="http://schemas.microsoft.com/office/mac/drawingml/2011/main" val="1"/>
             </a:ext>
           </a:extLst>
         </p:spPr>
@@ -14218,7 +14218,7 @@
           </a:ln>
           <a:extLst>
             <a:ext uri="{C572A759-6A51-4108-AA02-DFA0A04FC94B}">
-              <ma14:wrappingTextBoxFlag xmlns:ma14="http://schemas.microsoft.com/office/mac/drawingml/2011/main" xmlns="" val="1"/>
+              <ma14:wrappingTextBoxFlag xmlns="" xmlns:ma14="http://schemas.microsoft.com/office/mac/drawingml/2011/main" val="1"/>
             </a:ext>
           </a:extLst>
         </p:spPr>
@@ -14265,7 +14265,7 @@
           </a:ln>
           <a:extLst>
             <a:ext uri="{C572A759-6A51-4108-AA02-DFA0A04FC94B}">
-              <ma14:wrappingTextBoxFlag xmlns:ma14="http://schemas.microsoft.com/office/mac/drawingml/2011/main" xmlns="" val="1"/>
+              <ma14:wrappingTextBoxFlag xmlns="" xmlns:ma14="http://schemas.microsoft.com/office/mac/drawingml/2011/main" val="1"/>
             </a:ext>
           </a:extLst>
         </p:spPr>
@@ -14309,7 +14309,7 @@
           </a:ln>
           <a:extLst>
             <a:ext uri="{C572A759-6A51-4108-AA02-DFA0A04FC94B}">
-              <ma14:wrappingTextBoxFlag xmlns:ma14="http://schemas.microsoft.com/office/mac/drawingml/2011/main" xmlns="" val="1"/>
+              <ma14:wrappingTextBoxFlag xmlns="" xmlns:ma14="http://schemas.microsoft.com/office/mac/drawingml/2011/main" val="1"/>
             </a:ext>
           </a:extLst>
         </p:spPr>
@@ -14463,7 +14463,7 @@
           </a:ln>
           <a:extLst>
             <a:ext uri="{C572A759-6A51-4108-AA02-DFA0A04FC94B}">
-              <ma14:wrappingTextBoxFlag xmlns:ma14="http://schemas.microsoft.com/office/mac/drawingml/2011/main" xmlns="" val="1"/>
+              <ma14:wrappingTextBoxFlag xmlns="" xmlns:ma14="http://schemas.microsoft.com/office/mac/drawingml/2011/main" val="1"/>
             </a:ext>
           </a:extLst>
         </p:spPr>
@@ -14510,7 +14510,7 @@
           </a:ln>
           <a:extLst>
             <a:ext uri="{C572A759-6A51-4108-AA02-DFA0A04FC94B}">
-              <ma14:wrappingTextBoxFlag xmlns:ma14="http://schemas.microsoft.com/office/mac/drawingml/2011/main" xmlns="" val="1"/>
+              <ma14:wrappingTextBoxFlag xmlns="" xmlns:ma14="http://schemas.microsoft.com/office/mac/drawingml/2011/main" val="1"/>
             </a:ext>
           </a:extLst>
         </p:spPr>
@@ -14560,7 +14560,7 @@
           </a:ln>
           <a:extLst>
             <a:ext uri="{C572A759-6A51-4108-AA02-DFA0A04FC94B}">
-              <ma14:wrappingTextBoxFlag xmlns:ma14="http://schemas.microsoft.com/office/mac/drawingml/2011/main" xmlns="" val="1"/>
+              <ma14:wrappingTextBoxFlag xmlns="" xmlns:ma14="http://schemas.microsoft.com/office/mac/drawingml/2011/main" val="1"/>
             </a:ext>
           </a:extLst>
         </p:spPr>
@@ -14689,7 +14689,7 @@
           </a:ln>
           <a:extLst>
             <a:ext uri="{C572A759-6A51-4108-AA02-DFA0A04FC94B}">
-              <ma14:wrappingTextBoxFlag xmlns:ma14="http://schemas.microsoft.com/office/mac/drawingml/2011/main" xmlns="" val="1"/>
+              <ma14:wrappingTextBoxFlag xmlns="" xmlns:ma14="http://schemas.microsoft.com/office/mac/drawingml/2011/main" val="1"/>
             </a:ext>
           </a:extLst>
         </p:spPr>
@@ -14736,7 +14736,7 @@
           </a:ln>
           <a:extLst>
             <a:ext uri="{C572A759-6A51-4108-AA02-DFA0A04FC94B}">
-              <ma14:wrappingTextBoxFlag xmlns:ma14="http://schemas.microsoft.com/office/mac/drawingml/2011/main" xmlns="" val="1"/>
+              <ma14:wrappingTextBoxFlag xmlns="" xmlns:ma14="http://schemas.microsoft.com/office/mac/drawingml/2011/main" val="1"/>
             </a:ext>
           </a:extLst>
         </p:spPr>
@@ -14783,7 +14783,7 @@
           </a:ln>
           <a:extLst>
             <a:ext uri="{C572A759-6A51-4108-AA02-DFA0A04FC94B}">
-              <ma14:wrappingTextBoxFlag xmlns:ma14="http://schemas.microsoft.com/office/mac/drawingml/2011/main" xmlns="" val="1"/>
+              <ma14:wrappingTextBoxFlag xmlns="" xmlns:ma14="http://schemas.microsoft.com/office/mac/drawingml/2011/main" val="1"/>
             </a:ext>
           </a:extLst>
         </p:spPr>
@@ -14827,7 +14827,7 @@
           </a:ln>
           <a:extLst>
             <a:ext uri="{C572A759-6A51-4108-AA02-DFA0A04FC94B}">
-              <ma14:wrappingTextBoxFlag xmlns:ma14="http://schemas.microsoft.com/office/mac/drawingml/2011/main" xmlns="" val="1"/>
+              <ma14:wrappingTextBoxFlag xmlns="" xmlns:ma14="http://schemas.microsoft.com/office/mac/drawingml/2011/main" val="1"/>
             </a:ext>
           </a:extLst>
         </p:spPr>
@@ -14981,7 +14981,7 @@
           </a:ln>
           <a:extLst>
             <a:ext uri="{C572A759-6A51-4108-AA02-DFA0A04FC94B}">
-              <ma14:wrappingTextBoxFlag xmlns:ma14="http://schemas.microsoft.com/office/mac/drawingml/2011/main" xmlns="" val="1"/>
+              <ma14:wrappingTextBoxFlag xmlns="" xmlns:ma14="http://schemas.microsoft.com/office/mac/drawingml/2011/main" val="1"/>
             </a:ext>
           </a:extLst>
         </p:spPr>
@@ -15028,7 +15028,7 @@
           </a:ln>
           <a:extLst>
             <a:ext uri="{C572A759-6A51-4108-AA02-DFA0A04FC94B}">
-              <ma14:wrappingTextBoxFlag xmlns:ma14="http://schemas.microsoft.com/office/mac/drawingml/2011/main" xmlns="" val="1"/>
+              <ma14:wrappingTextBoxFlag xmlns="" xmlns:ma14="http://schemas.microsoft.com/office/mac/drawingml/2011/main" val="1"/>
             </a:ext>
           </a:extLst>
         </p:spPr>
@@ -15116,7 +15116,7 @@
           </a:ln>
           <a:extLst>
             <a:ext uri="{C572A759-6A51-4108-AA02-DFA0A04FC94B}">
-              <ma14:wrappingTextBoxFlag xmlns:ma14="http://schemas.microsoft.com/office/mac/drawingml/2011/main" xmlns="" val="1"/>
+              <ma14:wrappingTextBoxFlag xmlns="" xmlns:ma14="http://schemas.microsoft.com/office/mac/drawingml/2011/main" val="1"/>
             </a:ext>
           </a:extLst>
         </p:spPr>
@@ -15486,7 +15486,7 @@
           </a:ln>
           <a:extLst>
             <a:ext uri="{C572A759-6A51-4108-AA02-DFA0A04FC94B}">
-              <ma14:wrappingTextBoxFlag xmlns:ma14="http://schemas.microsoft.com/office/mac/drawingml/2011/main" xmlns="" val="1"/>
+              <ma14:wrappingTextBoxFlag xmlns="" xmlns:ma14="http://schemas.microsoft.com/office/mac/drawingml/2011/main" val="1"/>
             </a:ext>
           </a:extLst>
         </p:spPr>
@@ -15533,7 +15533,7 @@
           </a:ln>
           <a:extLst>
             <a:ext uri="{C572A759-6A51-4108-AA02-DFA0A04FC94B}">
-              <ma14:wrappingTextBoxFlag xmlns:ma14="http://schemas.microsoft.com/office/mac/drawingml/2011/main" xmlns="" val="1"/>
+              <ma14:wrappingTextBoxFlag xmlns="" xmlns:ma14="http://schemas.microsoft.com/office/mac/drawingml/2011/main" val="1"/>
             </a:ext>
           </a:extLst>
         </p:spPr>
@@ -15580,7 +15580,7 @@
           </a:ln>
           <a:extLst>
             <a:ext uri="{C572A759-6A51-4108-AA02-DFA0A04FC94B}">
-              <ma14:wrappingTextBoxFlag xmlns:ma14="http://schemas.microsoft.com/office/mac/drawingml/2011/main" xmlns="" val="1"/>
+              <ma14:wrappingTextBoxFlag xmlns="" xmlns:ma14="http://schemas.microsoft.com/office/mac/drawingml/2011/main" val="1"/>
             </a:ext>
           </a:extLst>
         </p:spPr>
@@ -15624,7 +15624,7 @@
           </a:ln>
           <a:extLst>
             <a:ext uri="{C572A759-6A51-4108-AA02-DFA0A04FC94B}">
-              <ma14:wrappingTextBoxFlag xmlns:ma14="http://schemas.microsoft.com/office/mac/drawingml/2011/main" xmlns="" val="1"/>
+              <ma14:wrappingTextBoxFlag xmlns="" xmlns:ma14="http://schemas.microsoft.com/office/mac/drawingml/2011/main" val="1"/>
             </a:ext>
           </a:extLst>
         </p:spPr>
@@ -15778,7 +15778,7 @@
           </a:ln>
           <a:extLst>
             <a:ext uri="{C572A759-6A51-4108-AA02-DFA0A04FC94B}">
-              <ma14:wrappingTextBoxFlag xmlns:ma14="http://schemas.microsoft.com/office/mac/drawingml/2011/main" xmlns="" val="1"/>
+              <ma14:wrappingTextBoxFlag xmlns="" xmlns:ma14="http://schemas.microsoft.com/office/mac/drawingml/2011/main" val="1"/>
             </a:ext>
           </a:extLst>
         </p:spPr>
@@ -15828,7 +15828,7 @@
           </a:ln>
           <a:extLst>
             <a:ext uri="{C572A759-6A51-4108-AA02-DFA0A04FC94B}">
-              <ma14:wrappingTextBoxFlag xmlns:ma14="http://schemas.microsoft.com/office/mac/drawingml/2011/main" xmlns="" val="1"/>
+              <ma14:wrappingTextBoxFlag xmlns="" xmlns:ma14="http://schemas.microsoft.com/office/mac/drawingml/2011/main" val="1"/>
             </a:ext>
           </a:extLst>
         </p:spPr>
@@ -15957,7 +15957,7 @@
           </a:ln>
           <a:extLst>
             <a:ext uri="{C572A759-6A51-4108-AA02-DFA0A04FC94B}">
-              <ma14:wrappingTextBoxFlag xmlns:ma14="http://schemas.microsoft.com/office/mac/drawingml/2011/main" xmlns="" val="1"/>
+              <ma14:wrappingTextBoxFlag xmlns="" xmlns:ma14="http://schemas.microsoft.com/office/mac/drawingml/2011/main" val="1"/>
             </a:ext>
           </a:extLst>
         </p:spPr>
@@ -16004,7 +16004,7 @@
           </a:ln>
           <a:extLst>
             <a:ext uri="{C572A759-6A51-4108-AA02-DFA0A04FC94B}">
-              <ma14:wrappingTextBoxFlag xmlns:ma14="http://schemas.microsoft.com/office/mac/drawingml/2011/main" xmlns="" val="1"/>
+              <ma14:wrappingTextBoxFlag xmlns="" xmlns:ma14="http://schemas.microsoft.com/office/mac/drawingml/2011/main" val="1"/>
             </a:ext>
           </a:extLst>
         </p:spPr>
@@ -16051,7 +16051,7 @@
           </a:ln>
           <a:extLst>
             <a:ext uri="{C572A759-6A51-4108-AA02-DFA0A04FC94B}">
-              <ma14:wrappingTextBoxFlag xmlns:ma14="http://schemas.microsoft.com/office/mac/drawingml/2011/main" xmlns="" val="1"/>
+              <ma14:wrappingTextBoxFlag xmlns="" xmlns:ma14="http://schemas.microsoft.com/office/mac/drawingml/2011/main" val="1"/>
             </a:ext>
           </a:extLst>
         </p:spPr>
@@ -16095,7 +16095,7 @@
           </a:ln>
           <a:extLst>
             <a:ext uri="{C572A759-6A51-4108-AA02-DFA0A04FC94B}">
-              <ma14:wrappingTextBoxFlag xmlns:ma14="http://schemas.microsoft.com/office/mac/drawingml/2011/main" xmlns="" val="1"/>
+              <ma14:wrappingTextBoxFlag xmlns="" xmlns:ma14="http://schemas.microsoft.com/office/mac/drawingml/2011/main" val="1"/>
             </a:ext>
           </a:extLst>
         </p:spPr>
@@ -16249,7 +16249,7 @@
           </a:ln>
           <a:extLst>
             <a:ext uri="{C572A759-6A51-4108-AA02-DFA0A04FC94B}">
-              <ma14:wrappingTextBoxFlag xmlns:ma14="http://schemas.microsoft.com/office/mac/drawingml/2011/main" xmlns="" val="1"/>
+              <ma14:wrappingTextBoxFlag xmlns="" xmlns:ma14="http://schemas.microsoft.com/office/mac/drawingml/2011/main" val="1"/>
             </a:ext>
           </a:extLst>
         </p:spPr>
@@ -16296,7 +16296,7 @@
           </a:ln>
           <a:extLst>
             <a:ext uri="{C572A759-6A51-4108-AA02-DFA0A04FC94B}">
-              <ma14:wrappingTextBoxFlag xmlns:ma14="http://schemas.microsoft.com/office/mac/drawingml/2011/main" xmlns="" val="1"/>
+              <ma14:wrappingTextBoxFlag xmlns="" xmlns:ma14="http://schemas.microsoft.com/office/mac/drawingml/2011/main" val="1"/>
             </a:ext>
           </a:extLst>
         </p:spPr>
@@ -16384,7 +16384,7 @@
           </a:ln>
           <a:extLst>
             <a:ext uri="{C572A759-6A51-4108-AA02-DFA0A04FC94B}">
-              <ma14:wrappingTextBoxFlag xmlns:ma14="http://schemas.microsoft.com/office/mac/drawingml/2011/main" xmlns="" val="1"/>
+              <ma14:wrappingTextBoxFlag xmlns="" xmlns:ma14="http://schemas.microsoft.com/office/mac/drawingml/2011/main" val="1"/>
             </a:ext>
           </a:extLst>
         </p:spPr>
@@ -16513,7 +16513,7 @@
           </a:ln>
           <a:extLst>
             <a:ext uri="{C572A759-6A51-4108-AA02-DFA0A04FC94B}">
-              <ma14:wrappingTextBoxFlag xmlns:ma14="http://schemas.microsoft.com/office/mac/drawingml/2011/main" xmlns="" val="1"/>
+              <ma14:wrappingTextBoxFlag xmlns="" xmlns:ma14="http://schemas.microsoft.com/office/mac/drawingml/2011/main" val="1"/>
             </a:ext>
           </a:extLst>
         </p:spPr>
@@ -16560,7 +16560,7 @@
           </a:ln>
           <a:extLst>
             <a:ext uri="{C572A759-6A51-4108-AA02-DFA0A04FC94B}">
-              <ma14:wrappingTextBoxFlag xmlns:ma14="http://schemas.microsoft.com/office/mac/drawingml/2011/main" xmlns="" val="1"/>
+              <ma14:wrappingTextBoxFlag xmlns="" xmlns:ma14="http://schemas.microsoft.com/office/mac/drawingml/2011/main" val="1"/>
             </a:ext>
           </a:extLst>
         </p:spPr>
@@ -16607,7 +16607,7 @@
           </a:ln>
           <a:extLst>
             <a:ext uri="{C572A759-6A51-4108-AA02-DFA0A04FC94B}">
-              <ma14:wrappingTextBoxFlag xmlns:ma14="http://schemas.microsoft.com/office/mac/drawingml/2011/main" xmlns="" val="1"/>
+              <ma14:wrappingTextBoxFlag xmlns="" xmlns:ma14="http://schemas.microsoft.com/office/mac/drawingml/2011/main" val="1"/>
             </a:ext>
           </a:extLst>
         </p:spPr>
@@ -16651,7 +16651,7 @@
           </a:ln>
           <a:extLst>
             <a:ext uri="{C572A759-6A51-4108-AA02-DFA0A04FC94B}">
-              <ma14:wrappingTextBoxFlag xmlns:ma14="http://schemas.microsoft.com/office/mac/drawingml/2011/main" xmlns="" val="1"/>
+              <ma14:wrappingTextBoxFlag xmlns="" xmlns:ma14="http://schemas.microsoft.com/office/mac/drawingml/2011/main" val="1"/>
             </a:ext>
           </a:extLst>
         </p:spPr>
@@ -16805,7 +16805,7 @@
           </a:ln>
           <a:extLst>
             <a:ext uri="{C572A759-6A51-4108-AA02-DFA0A04FC94B}">
-              <ma14:wrappingTextBoxFlag xmlns:ma14="http://schemas.microsoft.com/office/mac/drawingml/2011/main" xmlns="" val="1"/>
+              <ma14:wrappingTextBoxFlag xmlns="" xmlns:ma14="http://schemas.microsoft.com/office/mac/drawingml/2011/main" val="1"/>
             </a:ext>
           </a:extLst>
         </p:spPr>
@@ -16852,7 +16852,7 @@
           </a:ln>
           <a:extLst>
             <a:ext uri="{C572A759-6A51-4108-AA02-DFA0A04FC94B}">
-              <ma14:wrappingTextBoxFlag xmlns:ma14="http://schemas.microsoft.com/office/mac/drawingml/2011/main" xmlns="" val="1"/>
+              <ma14:wrappingTextBoxFlag xmlns="" xmlns:ma14="http://schemas.microsoft.com/office/mac/drawingml/2011/main" val="1"/>
             </a:ext>
           </a:extLst>
         </p:spPr>
@@ -16902,7 +16902,7 @@
           </a:ln>
           <a:extLst>
             <a:ext uri="{C572A759-6A51-4108-AA02-DFA0A04FC94B}">
-              <ma14:wrappingTextBoxFlag xmlns:ma14="http://schemas.microsoft.com/office/mac/drawingml/2011/main" xmlns="" val="1"/>
+              <ma14:wrappingTextBoxFlag xmlns="" xmlns:ma14="http://schemas.microsoft.com/office/mac/drawingml/2011/main" val="1"/>
             </a:ext>
           </a:extLst>
         </p:spPr>
@@ -17030,7 +17030,7 @@
           </a:ln>
           <a:extLst>
             <a:ext uri="{C572A759-6A51-4108-AA02-DFA0A04FC94B}">
-              <ma14:wrappingTextBoxFlag xmlns:ma14="http://schemas.microsoft.com/office/mac/drawingml/2011/main" xmlns="" val="1"/>
+              <ma14:wrappingTextBoxFlag xmlns="" xmlns:ma14="http://schemas.microsoft.com/office/mac/drawingml/2011/main" val="1"/>
             </a:ext>
           </a:extLst>
         </p:spPr>
@@ -17139,15 +17139,15 @@
             </a:pPr>
             <a:r>
               <a:rPr lang="zh-CN" altLang="en-US" dirty="0"/>
-              <a:t>可用于对图进行深度优先</a:t>
-            </a:r>
-            <a:r>
-              <a:rPr lang="en-US" altLang="zh-CN" dirty="0"/>
-              <a:t>(DFS)</a:t>
-            </a:r>
-            <a:r>
-              <a:rPr lang="zh-CN" altLang="en-US" dirty="0"/>
-              <a:t>搜索。</a:t>
+              <a:t>可用于对图进行深度优先搜索</a:t>
+            </a:r>
+            <a:r>
+              <a:rPr lang="en-US" altLang="zh-CN"/>
+              <a:t>(DFS) </a:t>
+            </a:r>
+            <a:r>
+              <a:rPr lang="zh-CN" altLang="en-US"/>
+              <a:t>。</a:t>
             </a:r>
             <a:endParaRPr dirty="0"/>
           </a:p>
@@ -17967,7 +17967,7 @@
           </a:ln>
           <a:extLst>
             <a:ext uri="{C572A759-6A51-4108-AA02-DFA0A04FC94B}">
-              <ma14:wrappingTextBoxFlag xmlns:ma14="http://schemas.microsoft.com/office/mac/drawingml/2011/main" xmlns="" val="1"/>
+              <ma14:wrappingTextBoxFlag xmlns="" xmlns:ma14="http://schemas.microsoft.com/office/mac/drawingml/2011/main" val="1"/>
             </a:ext>
           </a:extLst>
         </p:spPr>
@@ -18043,7 +18043,7 @@
           </a:ln>
           <a:extLst>
             <a:ext uri="{C572A759-6A51-4108-AA02-DFA0A04FC94B}">
-              <ma14:wrappingTextBoxFlag xmlns:ma14="http://schemas.microsoft.com/office/mac/drawingml/2011/main" xmlns="" val="1"/>
+              <ma14:wrappingTextBoxFlag xmlns="" xmlns:ma14="http://schemas.microsoft.com/office/mac/drawingml/2011/main" val="1"/>
             </a:ext>
           </a:extLst>
         </p:spPr>
@@ -18078,7 +18078,7 @@
           </a:ln>
           <a:extLst>
             <a:ext uri="{C572A759-6A51-4108-AA02-DFA0A04FC94B}">
-              <ma14:wrappingTextBoxFlag xmlns:ma14="http://schemas.microsoft.com/office/mac/drawingml/2011/main" xmlns="" val="1"/>
+              <ma14:wrappingTextBoxFlag xmlns="" xmlns:ma14="http://schemas.microsoft.com/office/mac/drawingml/2011/main" val="1"/>
             </a:ext>
           </a:extLst>
         </p:spPr>
@@ -18113,7 +18113,7 @@
           </a:ln>
           <a:extLst>
             <a:ext uri="{C572A759-6A51-4108-AA02-DFA0A04FC94B}">
-              <ma14:wrappingTextBoxFlag xmlns:ma14="http://schemas.microsoft.com/office/mac/drawingml/2011/main" xmlns="" val="1"/>
+              <ma14:wrappingTextBoxFlag xmlns="" xmlns:ma14="http://schemas.microsoft.com/office/mac/drawingml/2011/main" val="1"/>
             </a:ext>
           </a:extLst>
         </p:spPr>
@@ -18148,7 +18148,7 @@
           </a:ln>
           <a:extLst>
             <a:ext uri="{C572A759-6A51-4108-AA02-DFA0A04FC94B}">
-              <ma14:wrappingTextBoxFlag xmlns:ma14="http://schemas.microsoft.com/office/mac/drawingml/2011/main" xmlns="" val="1"/>
+              <ma14:wrappingTextBoxFlag xmlns="" xmlns:ma14="http://schemas.microsoft.com/office/mac/drawingml/2011/main" val="1"/>
             </a:ext>
           </a:extLst>
         </p:spPr>
@@ -18183,7 +18183,7 @@
           </a:ln>
           <a:extLst>
             <a:ext uri="{C572A759-6A51-4108-AA02-DFA0A04FC94B}">
-              <ma14:wrappingTextBoxFlag xmlns:ma14="http://schemas.microsoft.com/office/mac/drawingml/2011/main" xmlns="" val="1"/>
+              <ma14:wrappingTextBoxFlag xmlns="" xmlns:ma14="http://schemas.microsoft.com/office/mac/drawingml/2011/main" val="1"/>
             </a:ext>
           </a:extLst>
         </p:spPr>
@@ -18418,7 +18418,7 @@
           </a:ln>
           <a:extLst>
             <a:ext uri="{C572A759-6A51-4108-AA02-DFA0A04FC94B}">
-              <ma14:wrappingTextBoxFlag xmlns:ma14="http://schemas.microsoft.com/office/mac/drawingml/2011/main" xmlns="" val="1"/>
+              <ma14:wrappingTextBoxFlag xmlns="" xmlns:ma14="http://schemas.microsoft.com/office/mac/drawingml/2011/main" val="1"/>
             </a:ext>
           </a:extLst>
         </p:spPr>
@@ -18467,7 +18467,7 @@
           </a:ln>
           <a:extLst>
             <a:ext uri="{C572A759-6A51-4108-AA02-DFA0A04FC94B}">
-              <ma14:wrappingTextBoxFlag xmlns:ma14="http://schemas.microsoft.com/office/mac/drawingml/2011/main" xmlns="" val="1"/>
+              <ma14:wrappingTextBoxFlag xmlns="" xmlns:ma14="http://schemas.microsoft.com/office/mac/drawingml/2011/main" val="1"/>
             </a:ext>
           </a:extLst>
         </p:spPr>
@@ -18516,7 +18516,7 @@
           </a:ln>
           <a:extLst>
             <a:ext uri="{C572A759-6A51-4108-AA02-DFA0A04FC94B}">
-              <ma14:wrappingTextBoxFlag xmlns:ma14="http://schemas.microsoft.com/office/mac/drawingml/2011/main" xmlns="" val="1"/>
+              <ma14:wrappingTextBoxFlag xmlns="" xmlns:ma14="http://schemas.microsoft.com/office/mac/drawingml/2011/main" val="1"/>
             </a:ext>
           </a:extLst>
         </p:spPr>
@@ -18565,7 +18565,7 @@
           </a:ln>
           <a:extLst>
             <a:ext uri="{C572A759-6A51-4108-AA02-DFA0A04FC94B}">
-              <ma14:wrappingTextBoxFlag xmlns:ma14="http://schemas.microsoft.com/office/mac/drawingml/2011/main" xmlns="" val="1"/>
+              <ma14:wrappingTextBoxFlag xmlns="" xmlns:ma14="http://schemas.microsoft.com/office/mac/drawingml/2011/main" val="1"/>
             </a:ext>
           </a:extLst>
         </p:spPr>
@@ -18614,7 +18614,7 @@
           </a:ln>
           <a:extLst>
             <a:ext uri="{C572A759-6A51-4108-AA02-DFA0A04FC94B}">
-              <ma14:wrappingTextBoxFlag xmlns:ma14="http://schemas.microsoft.com/office/mac/drawingml/2011/main" xmlns="" val="1"/>
+              <ma14:wrappingTextBoxFlag xmlns="" xmlns:ma14="http://schemas.microsoft.com/office/mac/drawingml/2011/main" val="1"/>
             </a:ext>
           </a:extLst>
         </p:spPr>
@@ -18757,7 +18757,7 @@
           </a:ln>
           <a:extLst>
             <a:ext uri="{C572A759-6A51-4108-AA02-DFA0A04FC94B}">
-              <ma14:wrappingTextBoxFlag xmlns:ma14="http://schemas.microsoft.com/office/mac/drawingml/2011/main" xmlns="" val="1"/>
+              <ma14:wrappingTextBoxFlag xmlns="" xmlns:ma14="http://schemas.microsoft.com/office/mac/drawingml/2011/main" val="1"/>
             </a:ext>
           </a:extLst>
         </p:spPr>
@@ -18796,7 +18796,7 @@
           </a:ln>
           <a:extLst>
             <a:ext uri="{C572A759-6A51-4108-AA02-DFA0A04FC94B}">
-              <ma14:wrappingTextBoxFlag xmlns:ma14="http://schemas.microsoft.com/office/mac/drawingml/2011/main" xmlns="" val="1"/>
+              <ma14:wrappingTextBoxFlag xmlns="" xmlns:ma14="http://schemas.microsoft.com/office/mac/drawingml/2011/main" val="1"/>
             </a:ext>
           </a:extLst>
         </p:spPr>
@@ -18840,7 +18840,7 @@
           </a:ln>
           <a:extLst>
             <a:ext uri="{C572A759-6A51-4108-AA02-DFA0A04FC94B}">
-              <ma14:wrappingTextBoxFlag xmlns:ma14="http://schemas.microsoft.com/office/mac/drawingml/2011/main" xmlns="" val="1"/>
+              <ma14:wrappingTextBoxFlag xmlns="" xmlns:ma14="http://schemas.microsoft.com/office/mac/drawingml/2011/main" val="1"/>
             </a:ext>
           </a:extLst>
         </p:spPr>
@@ -18884,7 +18884,7 @@
           </a:ln>
           <a:extLst>
             <a:ext uri="{C572A759-6A51-4108-AA02-DFA0A04FC94B}">
-              <ma14:wrappingTextBoxFlag xmlns:ma14="http://schemas.microsoft.com/office/mac/drawingml/2011/main" xmlns="" val="1"/>
+              <ma14:wrappingTextBoxFlag xmlns="" xmlns:ma14="http://schemas.microsoft.com/office/mac/drawingml/2011/main" val="1"/>
             </a:ext>
           </a:extLst>
         </p:spPr>
@@ -19022,7 +19022,7 @@
           </a:ln>
           <a:extLst>
             <a:ext uri="{C572A759-6A51-4108-AA02-DFA0A04FC94B}">
-              <ma14:wrappingTextBoxFlag xmlns:ma14="http://schemas.microsoft.com/office/mac/drawingml/2011/main" xmlns="" val="1"/>
+              <ma14:wrappingTextBoxFlag xmlns="" xmlns:ma14="http://schemas.microsoft.com/office/mac/drawingml/2011/main" val="1"/>
             </a:ext>
           </a:extLst>
         </p:spPr>
@@ -19071,7 +19071,7 @@
           </a:ln>
           <a:extLst>
             <a:ext uri="{C572A759-6A51-4108-AA02-DFA0A04FC94B}">
-              <ma14:wrappingTextBoxFlag xmlns:ma14="http://schemas.microsoft.com/office/mac/drawingml/2011/main" xmlns="" val="1"/>
+              <ma14:wrappingTextBoxFlag xmlns="" xmlns:ma14="http://schemas.microsoft.com/office/mac/drawingml/2011/main" val="1"/>
             </a:ext>
           </a:extLst>
         </p:spPr>
@@ -19115,7 +19115,7 @@
           </a:ln>
           <a:extLst>
             <a:ext uri="{C572A759-6A51-4108-AA02-DFA0A04FC94B}">
-              <ma14:wrappingTextBoxFlag xmlns:ma14="http://schemas.microsoft.com/office/mac/drawingml/2011/main" xmlns="" val="1"/>
+              <ma14:wrappingTextBoxFlag xmlns="" xmlns:ma14="http://schemas.microsoft.com/office/mac/drawingml/2011/main" val="1"/>
             </a:ext>
           </a:extLst>
         </p:spPr>
@@ -19159,7 +19159,7 @@
           </a:ln>
           <a:extLst>
             <a:ext uri="{C572A759-6A51-4108-AA02-DFA0A04FC94B}">
-              <ma14:wrappingTextBoxFlag xmlns:ma14="http://schemas.microsoft.com/office/mac/drawingml/2011/main" xmlns="" val="1"/>
+              <ma14:wrappingTextBoxFlag xmlns="" xmlns:ma14="http://schemas.microsoft.com/office/mac/drawingml/2011/main" val="1"/>
             </a:ext>
           </a:extLst>
         </p:spPr>
@@ -19206,7 +19206,7 @@
           </a:ln>
           <a:extLst>
             <a:ext uri="{C572A759-6A51-4108-AA02-DFA0A04FC94B}">
-              <ma14:wrappingTextBoxFlag xmlns:ma14="http://schemas.microsoft.com/office/mac/drawingml/2011/main" xmlns="" val="1"/>
+              <ma14:wrappingTextBoxFlag xmlns="" xmlns:ma14="http://schemas.microsoft.com/office/mac/drawingml/2011/main" val="1"/>
             </a:ext>
           </a:extLst>
         </p:spPr>
@@ -19342,7 +19342,7 @@
           </a:ln>
           <a:extLst>
             <a:ext uri="{C572A759-6A51-4108-AA02-DFA0A04FC94B}">
-              <ma14:wrappingTextBoxFlag xmlns:ma14="http://schemas.microsoft.com/office/mac/drawingml/2011/main" xmlns="" val="1"/>
+              <ma14:wrappingTextBoxFlag xmlns="" xmlns:ma14="http://schemas.microsoft.com/office/mac/drawingml/2011/main" val="1"/>
             </a:ext>
           </a:extLst>
         </p:spPr>
@@ -19386,7 +19386,7 @@
           </a:ln>
           <a:extLst>
             <a:ext uri="{C572A759-6A51-4108-AA02-DFA0A04FC94B}">
-              <ma14:wrappingTextBoxFlag xmlns:ma14="http://schemas.microsoft.com/office/mac/drawingml/2011/main" xmlns="" val="1"/>
+              <ma14:wrappingTextBoxFlag xmlns="" xmlns:ma14="http://schemas.microsoft.com/office/mac/drawingml/2011/main" val="1"/>
             </a:ext>
           </a:extLst>
         </p:spPr>
@@ -19430,7 +19430,7 @@
           </a:ln>
           <a:extLst>
             <a:ext uri="{C572A759-6A51-4108-AA02-DFA0A04FC94B}">
-              <ma14:wrappingTextBoxFlag xmlns:ma14="http://schemas.microsoft.com/office/mac/drawingml/2011/main" xmlns="" val="1"/>
+              <ma14:wrappingTextBoxFlag xmlns="" xmlns:ma14="http://schemas.microsoft.com/office/mac/drawingml/2011/main" val="1"/>
             </a:ext>
           </a:extLst>
         </p:spPr>
@@ -19477,7 +19477,7 @@
           </a:ln>
           <a:extLst>
             <a:ext uri="{C572A759-6A51-4108-AA02-DFA0A04FC94B}">
-              <ma14:wrappingTextBoxFlag xmlns:ma14="http://schemas.microsoft.com/office/mac/drawingml/2011/main" xmlns="" val="1"/>
+              <ma14:wrappingTextBoxFlag xmlns="" xmlns:ma14="http://schemas.microsoft.com/office/mac/drawingml/2011/main" val="1"/>
             </a:ext>
           </a:extLst>
         </p:spPr>
@@ -19519,7 +19519,7 @@
           </a:ln>
           <a:extLst>
             <a:ext uri="{C572A759-6A51-4108-AA02-DFA0A04FC94B}">
-              <ma14:wrappingTextBoxFlag xmlns:ma14="http://schemas.microsoft.com/office/mac/drawingml/2011/main" xmlns="" val="1"/>
+              <ma14:wrappingTextBoxFlag xmlns="" xmlns:ma14="http://schemas.microsoft.com/office/mac/drawingml/2011/main" val="1"/>
             </a:ext>
           </a:extLst>
         </p:spPr>
@@ -19571,7 +19571,7 @@
           </a:ln>
           <a:extLst>
             <a:ext uri="{C572A759-6A51-4108-AA02-DFA0A04FC94B}">
-              <ma14:wrappingTextBoxFlag xmlns:ma14="http://schemas.microsoft.com/office/mac/drawingml/2011/main" xmlns="" val="1"/>
+              <ma14:wrappingTextBoxFlag xmlns="" xmlns:ma14="http://schemas.microsoft.com/office/mac/drawingml/2011/main" val="1"/>
             </a:ext>
           </a:extLst>
         </p:spPr>
@@ -19797,7 +19797,7 @@
           </a:ln>
           <a:extLst>
             <a:ext uri="{C572A759-6A51-4108-AA02-DFA0A04FC94B}">
-              <ma14:wrappingTextBoxFlag xmlns:ma14="http://schemas.microsoft.com/office/mac/drawingml/2011/main" xmlns="" val="1"/>
+              <ma14:wrappingTextBoxFlag xmlns="" xmlns:ma14="http://schemas.microsoft.com/office/mac/drawingml/2011/main" val="1"/>
             </a:ext>
           </a:extLst>
         </p:spPr>
@@ -19841,7 +19841,7 @@
           </a:ln>
           <a:extLst>
             <a:ext uri="{C572A759-6A51-4108-AA02-DFA0A04FC94B}">
-              <ma14:wrappingTextBoxFlag xmlns:ma14="http://schemas.microsoft.com/office/mac/drawingml/2011/main" xmlns="" val="1"/>
+              <ma14:wrappingTextBoxFlag xmlns="" xmlns:ma14="http://schemas.microsoft.com/office/mac/drawingml/2011/main" val="1"/>
             </a:ext>
           </a:extLst>
         </p:spPr>
@@ -19885,7 +19885,7 @@
           </a:ln>
           <a:extLst>
             <a:ext uri="{C572A759-6A51-4108-AA02-DFA0A04FC94B}">
-              <ma14:wrappingTextBoxFlag xmlns:ma14="http://schemas.microsoft.com/office/mac/drawingml/2011/main" xmlns="" val="1"/>
+              <ma14:wrappingTextBoxFlag xmlns="" xmlns:ma14="http://schemas.microsoft.com/office/mac/drawingml/2011/main" val="1"/>
             </a:ext>
           </a:extLst>
         </p:spPr>
@@ -19932,7 +19932,7 @@
           </a:ln>
           <a:extLst>
             <a:ext uri="{C572A759-6A51-4108-AA02-DFA0A04FC94B}">
-              <ma14:wrappingTextBoxFlag xmlns:ma14="http://schemas.microsoft.com/office/mac/drawingml/2011/main" xmlns="" val="1"/>
+              <ma14:wrappingTextBoxFlag xmlns="" xmlns:ma14="http://schemas.microsoft.com/office/mac/drawingml/2011/main" val="1"/>
             </a:ext>
           </a:extLst>
         </p:spPr>
@@ -19974,7 +19974,7 @@
           </a:ln>
           <a:extLst>
             <a:ext uri="{C572A759-6A51-4108-AA02-DFA0A04FC94B}">
-              <ma14:wrappingTextBoxFlag xmlns:ma14="http://schemas.microsoft.com/office/mac/drawingml/2011/main" xmlns="" val="1"/>
+              <ma14:wrappingTextBoxFlag xmlns="" xmlns:ma14="http://schemas.microsoft.com/office/mac/drawingml/2011/main" val="1"/>
             </a:ext>
           </a:extLst>
         </p:spPr>
@@ -20026,7 +20026,7 @@
           </a:ln>
           <a:extLst>
             <a:ext uri="{C572A759-6A51-4108-AA02-DFA0A04FC94B}">
-              <ma14:wrappingTextBoxFlag xmlns:ma14="http://schemas.microsoft.com/office/mac/drawingml/2011/main" xmlns="" val="1"/>
+              <ma14:wrappingTextBoxFlag xmlns="" xmlns:ma14="http://schemas.microsoft.com/office/mac/drawingml/2011/main" val="1"/>
             </a:ext>
           </a:extLst>
         </p:spPr>
@@ -20071,7 +20071,7 @@
           </a:ln>
           <a:extLst>
             <a:ext uri="{C572A759-6A51-4108-AA02-DFA0A04FC94B}">
-              <ma14:wrappingTextBoxFlag xmlns:ma14="http://schemas.microsoft.com/office/mac/drawingml/2011/main" xmlns="" val="1"/>
+              <ma14:wrappingTextBoxFlag xmlns="" xmlns:ma14="http://schemas.microsoft.com/office/mac/drawingml/2011/main" val="1"/>
             </a:ext>
           </a:extLst>
         </p:spPr>
@@ -20207,7 +20207,7 @@
           </a:ln>
           <a:extLst>
             <a:ext uri="{C572A759-6A51-4108-AA02-DFA0A04FC94B}">
-              <ma14:wrappingTextBoxFlag xmlns:ma14="http://schemas.microsoft.com/office/mac/drawingml/2011/main" xmlns="" val="1"/>
+              <ma14:wrappingTextBoxFlag xmlns="" xmlns:ma14="http://schemas.microsoft.com/office/mac/drawingml/2011/main" val="1"/>
             </a:ext>
           </a:extLst>
         </p:spPr>
@@ -20251,7 +20251,7 @@
           </a:ln>
           <a:extLst>
             <a:ext uri="{C572A759-6A51-4108-AA02-DFA0A04FC94B}">
-              <ma14:wrappingTextBoxFlag xmlns:ma14="http://schemas.microsoft.com/office/mac/drawingml/2011/main" xmlns="" val="1"/>
+              <ma14:wrappingTextBoxFlag xmlns="" xmlns:ma14="http://schemas.microsoft.com/office/mac/drawingml/2011/main" val="1"/>
             </a:ext>
           </a:extLst>
         </p:spPr>
@@ -20295,7 +20295,7 @@
           </a:ln>
           <a:extLst>
             <a:ext uri="{C572A759-6A51-4108-AA02-DFA0A04FC94B}">
-              <ma14:wrappingTextBoxFlag xmlns:ma14="http://schemas.microsoft.com/office/mac/drawingml/2011/main" xmlns="" val="1"/>
+              <ma14:wrappingTextBoxFlag xmlns="" xmlns:ma14="http://schemas.microsoft.com/office/mac/drawingml/2011/main" val="1"/>
             </a:ext>
           </a:extLst>
         </p:spPr>
@@ -20342,7 +20342,7 @@
           </a:ln>
           <a:extLst>
             <a:ext uri="{C572A759-6A51-4108-AA02-DFA0A04FC94B}">
-              <ma14:wrappingTextBoxFlag xmlns:ma14="http://schemas.microsoft.com/office/mac/drawingml/2011/main" xmlns="" val="1"/>
+              <ma14:wrappingTextBoxFlag xmlns="" xmlns:ma14="http://schemas.microsoft.com/office/mac/drawingml/2011/main" val="1"/>
             </a:ext>
           </a:extLst>
         </p:spPr>
@@ -20384,7 +20384,7 @@
           </a:ln>
           <a:extLst>
             <a:ext uri="{C572A759-6A51-4108-AA02-DFA0A04FC94B}">
-              <ma14:wrappingTextBoxFlag xmlns:ma14="http://schemas.microsoft.com/office/mac/drawingml/2011/main" xmlns="" val="1"/>
+              <ma14:wrappingTextBoxFlag xmlns="" xmlns:ma14="http://schemas.microsoft.com/office/mac/drawingml/2011/main" val="1"/>
             </a:ext>
           </a:extLst>
         </p:spPr>
@@ -20436,7 +20436,7 @@
           </a:ln>
           <a:extLst>
             <a:ext uri="{C572A759-6A51-4108-AA02-DFA0A04FC94B}">
-              <ma14:wrappingTextBoxFlag xmlns:ma14="http://schemas.microsoft.com/office/mac/drawingml/2011/main" xmlns="" val="1"/>
+              <ma14:wrappingTextBoxFlag xmlns="" xmlns:ma14="http://schemas.microsoft.com/office/mac/drawingml/2011/main" val="1"/>
             </a:ext>
           </a:extLst>
         </p:spPr>
@@ -20481,7 +20481,7 @@
           </a:ln>
           <a:extLst>
             <a:ext uri="{C572A759-6A51-4108-AA02-DFA0A04FC94B}">
-              <ma14:wrappingTextBoxFlag xmlns:ma14="http://schemas.microsoft.com/office/mac/drawingml/2011/main" xmlns="" val="1"/>
+              <ma14:wrappingTextBoxFlag xmlns="" xmlns:ma14="http://schemas.microsoft.com/office/mac/drawingml/2011/main" val="1"/>
             </a:ext>
           </a:extLst>
         </p:spPr>
@@ -20617,7 +20617,7 @@
           </a:ln>
           <a:extLst>
             <a:ext uri="{C572A759-6A51-4108-AA02-DFA0A04FC94B}">
-              <ma14:wrappingTextBoxFlag xmlns:ma14="http://schemas.microsoft.com/office/mac/drawingml/2011/main" xmlns="" val="1"/>
+              <ma14:wrappingTextBoxFlag xmlns="" xmlns:ma14="http://schemas.microsoft.com/office/mac/drawingml/2011/main" val="1"/>
             </a:ext>
           </a:extLst>
         </p:spPr>
@@ -20661,7 +20661,7 @@
           </a:ln>
           <a:extLst>
             <a:ext uri="{C572A759-6A51-4108-AA02-DFA0A04FC94B}">
-              <ma14:wrappingTextBoxFlag xmlns:ma14="http://schemas.microsoft.com/office/mac/drawingml/2011/main" xmlns="" val="1"/>
+              <ma14:wrappingTextBoxFlag xmlns="" xmlns:ma14="http://schemas.microsoft.com/office/mac/drawingml/2011/main" val="1"/>
             </a:ext>
           </a:extLst>
         </p:spPr>
@@ -20705,7 +20705,7 @@
           </a:ln>
           <a:extLst>
             <a:ext uri="{C572A759-6A51-4108-AA02-DFA0A04FC94B}">
-              <ma14:wrappingTextBoxFlag xmlns:ma14="http://schemas.microsoft.com/office/mac/drawingml/2011/main" xmlns="" val="1"/>
+              <ma14:wrappingTextBoxFlag xmlns="" xmlns:ma14="http://schemas.microsoft.com/office/mac/drawingml/2011/main" val="1"/>
             </a:ext>
           </a:extLst>
         </p:spPr>
@@ -20752,7 +20752,7 @@
           </a:ln>
           <a:extLst>
             <a:ext uri="{C572A759-6A51-4108-AA02-DFA0A04FC94B}">
-              <ma14:wrappingTextBoxFlag xmlns:ma14="http://schemas.microsoft.com/office/mac/drawingml/2011/main" xmlns="" val="1"/>
+              <ma14:wrappingTextBoxFlag xmlns="" xmlns:ma14="http://schemas.microsoft.com/office/mac/drawingml/2011/main" val="1"/>
             </a:ext>
           </a:extLst>
         </p:spPr>
@@ -20794,7 +20794,7 @@
           </a:ln>
           <a:extLst>
             <a:ext uri="{C572A759-6A51-4108-AA02-DFA0A04FC94B}">
-              <ma14:wrappingTextBoxFlag xmlns:ma14="http://schemas.microsoft.com/office/mac/drawingml/2011/main" xmlns="" val="1"/>
+              <ma14:wrappingTextBoxFlag xmlns="" xmlns:ma14="http://schemas.microsoft.com/office/mac/drawingml/2011/main" val="1"/>
             </a:ext>
           </a:extLst>
         </p:spPr>
@@ -20846,7 +20846,7 @@
           </a:ln>
           <a:extLst>
             <a:ext uri="{C572A759-6A51-4108-AA02-DFA0A04FC94B}">
-              <ma14:wrappingTextBoxFlag xmlns:ma14="http://schemas.microsoft.com/office/mac/drawingml/2011/main" xmlns="" val="1"/>
+              <ma14:wrappingTextBoxFlag xmlns="" xmlns:ma14="http://schemas.microsoft.com/office/mac/drawingml/2011/main" val="1"/>
             </a:ext>
           </a:extLst>
         </p:spPr>
@@ -20982,7 +20982,7 @@
           </a:ln>
           <a:extLst>
             <a:ext uri="{C572A759-6A51-4108-AA02-DFA0A04FC94B}">
-              <ma14:wrappingTextBoxFlag xmlns:ma14="http://schemas.microsoft.com/office/mac/drawingml/2011/main" xmlns="" val="1"/>
+              <ma14:wrappingTextBoxFlag xmlns="" xmlns:ma14="http://schemas.microsoft.com/office/mac/drawingml/2011/main" val="1"/>
             </a:ext>
           </a:extLst>
         </p:spPr>
@@ -21026,7 +21026,7 @@
           </a:ln>
           <a:extLst>
             <a:ext uri="{C572A759-6A51-4108-AA02-DFA0A04FC94B}">
-              <ma14:wrappingTextBoxFlag xmlns:ma14="http://schemas.microsoft.com/office/mac/drawingml/2011/main" xmlns="" val="1"/>
+              <ma14:wrappingTextBoxFlag xmlns="" xmlns:ma14="http://schemas.microsoft.com/office/mac/drawingml/2011/main" val="1"/>
             </a:ext>
           </a:extLst>
         </p:spPr>
@@ -21070,7 +21070,7 @@
           </a:ln>
           <a:extLst>
             <a:ext uri="{C572A759-6A51-4108-AA02-DFA0A04FC94B}">
-              <ma14:wrappingTextBoxFlag xmlns:ma14="http://schemas.microsoft.com/office/mac/drawingml/2011/main" xmlns="" val="1"/>
+              <ma14:wrappingTextBoxFlag xmlns="" xmlns:ma14="http://schemas.microsoft.com/office/mac/drawingml/2011/main" val="1"/>
             </a:ext>
           </a:extLst>
         </p:spPr>
@@ -21117,7 +21117,7 @@
           </a:ln>
           <a:extLst>
             <a:ext uri="{C572A759-6A51-4108-AA02-DFA0A04FC94B}">
-              <ma14:wrappingTextBoxFlag xmlns:ma14="http://schemas.microsoft.com/office/mac/drawingml/2011/main" xmlns="" val="1"/>
+              <ma14:wrappingTextBoxFlag xmlns="" xmlns:ma14="http://schemas.microsoft.com/office/mac/drawingml/2011/main" val="1"/>
             </a:ext>
           </a:extLst>
         </p:spPr>
@@ -21159,7 +21159,7 @@
           </a:ln>
           <a:extLst>
             <a:ext uri="{C572A759-6A51-4108-AA02-DFA0A04FC94B}">
-              <ma14:wrappingTextBoxFlag xmlns:ma14="http://schemas.microsoft.com/office/mac/drawingml/2011/main" xmlns="" val="1"/>
+              <ma14:wrappingTextBoxFlag xmlns="" xmlns:ma14="http://schemas.microsoft.com/office/mac/drawingml/2011/main" val="1"/>
             </a:ext>
           </a:extLst>
         </p:spPr>
@@ -21211,7 +21211,7 @@
           </a:ln>
           <a:extLst>
             <a:ext uri="{C572A759-6A51-4108-AA02-DFA0A04FC94B}">
-              <ma14:wrappingTextBoxFlag xmlns:ma14="http://schemas.microsoft.com/office/mac/drawingml/2011/main" xmlns="" val="1"/>
+              <ma14:wrappingTextBoxFlag xmlns="" xmlns:ma14="http://schemas.microsoft.com/office/mac/drawingml/2011/main" val="1"/>
             </a:ext>
           </a:extLst>
         </p:spPr>
@@ -21347,7 +21347,7 @@
           </a:ln>
           <a:extLst>
             <a:ext uri="{C572A759-6A51-4108-AA02-DFA0A04FC94B}">
-              <ma14:wrappingTextBoxFlag xmlns:ma14="http://schemas.microsoft.com/office/mac/drawingml/2011/main" xmlns="" val="1"/>
+              <ma14:wrappingTextBoxFlag xmlns="" xmlns:ma14="http://schemas.microsoft.com/office/mac/drawingml/2011/main" val="1"/>
             </a:ext>
           </a:extLst>
         </p:spPr>
@@ -21391,7 +21391,7 @@
           </a:ln>
           <a:extLst>
             <a:ext uri="{C572A759-6A51-4108-AA02-DFA0A04FC94B}">
-              <ma14:wrappingTextBoxFlag xmlns:ma14="http://schemas.microsoft.com/office/mac/drawingml/2011/main" xmlns="" val="1"/>
+              <ma14:wrappingTextBoxFlag xmlns="" xmlns:ma14="http://schemas.microsoft.com/office/mac/drawingml/2011/main" val="1"/>
             </a:ext>
           </a:extLst>
         </p:spPr>
@@ -21435,7 +21435,7 @@
           </a:ln>
           <a:extLst>
             <a:ext uri="{C572A759-6A51-4108-AA02-DFA0A04FC94B}">
-              <ma14:wrappingTextBoxFlag xmlns:ma14="http://schemas.microsoft.com/office/mac/drawingml/2011/main" xmlns="" val="1"/>
+              <ma14:wrappingTextBoxFlag xmlns="" xmlns:ma14="http://schemas.microsoft.com/office/mac/drawingml/2011/main" val="1"/>
             </a:ext>
           </a:extLst>
         </p:spPr>
@@ -21482,7 +21482,7 @@
           </a:ln>
           <a:extLst>
             <a:ext uri="{C572A759-6A51-4108-AA02-DFA0A04FC94B}">
-              <ma14:wrappingTextBoxFlag xmlns:ma14="http://schemas.microsoft.com/office/mac/drawingml/2011/main" xmlns="" val="1"/>
+              <ma14:wrappingTextBoxFlag xmlns="" xmlns:ma14="http://schemas.microsoft.com/office/mac/drawingml/2011/main" val="1"/>
             </a:ext>
           </a:extLst>
         </p:spPr>
@@ -21524,7 +21524,7 @@
           </a:ln>
           <a:extLst>
             <a:ext uri="{C572A759-6A51-4108-AA02-DFA0A04FC94B}">
-              <ma14:wrappingTextBoxFlag xmlns:ma14="http://schemas.microsoft.com/office/mac/drawingml/2011/main" xmlns="" val="1"/>
+              <ma14:wrappingTextBoxFlag xmlns="" xmlns:ma14="http://schemas.microsoft.com/office/mac/drawingml/2011/main" val="1"/>
             </a:ext>
           </a:extLst>
         </p:spPr>
@@ -21667,7 +21667,7 @@
           </a:ln>
           <a:extLst>
             <a:ext uri="{C572A759-6A51-4108-AA02-DFA0A04FC94B}">
-              <ma14:wrappingTextBoxFlag xmlns:ma14="http://schemas.microsoft.com/office/mac/drawingml/2011/main" xmlns="" val="1"/>
+              <ma14:wrappingTextBoxFlag xmlns="" xmlns:ma14="http://schemas.microsoft.com/office/mac/drawingml/2011/main" val="1"/>
             </a:ext>
           </a:extLst>
         </p:spPr>
@@ -21711,7 +21711,7 @@
           </a:ln>
           <a:extLst>
             <a:ext uri="{C572A759-6A51-4108-AA02-DFA0A04FC94B}">
-              <ma14:wrappingTextBoxFlag xmlns:ma14="http://schemas.microsoft.com/office/mac/drawingml/2011/main" xmlns="" val="1"/>
+              <ma14:wrappingTextBoxFlag xmlns="" xmlns:ma14="http://schemas.microsoft.com/office/mac/drawingml/2011/main" val="1"/>
             </a:ext>
           </a:extLst>
         </p:spPr>
@@ -21755,7 +21755,7 @@
           </a:ln>
           <a:extLst>
             <a:ext uri="{C572A759-6A51-4108-AA02-DFA0A04FC94B}">
-              <ma14:wrappingTextBoxFlag xmlns:ma14="http://schemas.microsoft.com/office/mac/drawingml/2011/main" xmlns="" val="1"/>
+              <ma14:wrappingTextBoxFlag xmlns="" xmlns:ma14="http://schemas.microsoft.com/office/mac/drawingml/2011/main" val="1"/>
             </a:ext>
           </a:extLst>
         </p:spPr>
@@ -21802,7 +21802,7 @@
           </a:ln>
           <a:extLst>
             <a:ext uri="{C572A759-6A51-4108-AA02-DFA0A04FC94B}">
-              <ma14:wrappingTextBoxFlag xmlns:ma14="http://schemas.microsoft.com/office/mac/drawingml/2011/main" xmlns="" val="1"/>
+              <ma14:wrappingTextBoxFlag xmlns="" xmlns:ma14="http://schemas.microsoft.com/office/mac/drawingml/2011/main" val="1"/>
             </a:ext>
           </a:extLst>
         </p:spPr>
@@ -21844,7 +21844,7 @@
           </a:ln>
           <a:extLst>
             <a:ext uri="{C572A759-6A51-4108-AA02-DFA0A04FC94B}">
-              <ma14:wrappingTextBoxFlag xmlns:ma14="http://schemas.microsoft.com/office/mac/drawingml/2011/main" xmlns="" val="1"/>
+              <ma14:wrappingTextBoxFlag xmlns="" xmlns:ma14="http://schemas.microsoft.com/office/mac/drawingml/2011/main" val="1"/>
             </a:ext>
           </a:extLst>
         </p:spPr>
@@ -21896,7 +21896,7 @@
           </a:ln>
           <a:extLst>
             <a:ext uri="{C572A759-6A51-4108-AA02-DFA0A04FC94B}">
-              <ma14:wrappingTextBoxFlag xmlns:ma14="http://schemas.microsoft.com/office/mac/drawingml/2011/main" xmlns="" val="1"/>
+              <ma14:wrappingTextBoxFlag xmlns="" xmlns:ma14="http://schemas.microsoft.com/office/mac/drawingml/2011/main" val="1"/>
             </a:ext>
           </a:extLst>
         </p:spPr>
@@ -22032,7 +22032,7 @@
           </a:ln>
           <a:extLst>
             <a:ext uri="{C572A759-6A51-4108-AA02-DFA0A04FC94B}">
-              <ma14:wrappingTextBoxFlag xmlns:ma14="http://schemas.microsoft.com/office/mac/drawingml/2011/main" xmlns="" val="1"/>
+              <ma14:wrappingTextBoxFlag xmlns="" xmlns:ma14="http://schemas.microsoft.com/office/mac/drawingml/2011/main" val="1"/>
             </a:ext>
           </a:extLst>
         </p:spPr>
@@ -22076,7 +22076,7 @@
           </a:ln>
           <a:extLst>
             <a:ext uri="{C572A759-6A51-4108-AA02-DFA0A04FC94B}">
-              <ma14:wrappingTextBoxFlag xmlns:ma14="http://schemas.microsoft.com/office/mac/drawingml/2011/main" xmlns="" val="1"/>
+              <ma14:wrappingTextBoxFlag xmlns="" xmlns:ma14="http://schemas.microsoft.com/office/mac/drawingml/2011/main" val="1"/>
             </a:ext>
           </a:extLst>
         </p:spPr>
@@ -22120,7 +22120,7 @@
           </a:ln>
           <a:extLst>
             <a:ext uri="{C572A759-6A51-4108-AA02-DFA0A04FC94B}">
-              <ma14:wrappingTextBoxFlag xmlns:ma14="http://schemas.microsoft.com/office/mac/drawingml/2011/main" xmlns="" val="1"/>
+              <ma14:wrappingTextBoxFlag xmlns="" xmlns:ma14="http://schemas.microsoft.com/office/mac/drawingml/2011/main" val="1"/>
             </a:ext>
           </a:extLst>
         </p:spPr>
@@ -22167,7 +22167,7 @@
           </a:ln>
           <a:extLst>
             <a:ext uri="{C572A759-6A51-4108-AA02-DFA0A04FC94B}">
-              <ma14:wrappingTextBoxFlag xmlns:ma14="http://schemas.microsoft.com/office/mac/drawingml/2011/main" xmlns="" val="1"/>
+              <ma14:wrappingTextBoxFlag xmlns="" xmlns:ma14="http://schemas.microsoft.com/office/mac/drawingml/2011/main" val="1"/>
             </a:ext>
           </a:extLst>
         </p:spPr>
@@ -22209,7 +22209,7 @@
           </a:ln>
           <a:extLst>
             <a:ext uri="{C572A759-6A51-4108-AA02-DFA0A04FC94B}">
-              <ma14:wrappingTextBoxFlag xmlns:ma14="http://schemas.microsoft.com/office/mac/drawingml/2011/main" xmlns="" val="1"/>
+              <ma14:wrappingTextBoxFlag xmlns="" xmlns:ma14="http://schemas.microsoft.com/office/mac/drawingml/2011/main" val="1"/>
             </a:ext>
           </a:extLst>
         </p:spPr>
@@ -22261,7 +22261,7 @@
           </a:ln>
           <a:extLst>
             <a:ext uri="{C572A759-6A51-4108-AA02-DFA0A04FC94B}">
-              <ma14:wrappingTextBoxFlag xmlns:ma14="http://schemas.microsoft.com/office/mac/drawingml/2011/main" xmlns="" val="1"/>
+              <ma14:wrappingTextBoxFlag xmlns="" xmlns:ma14="http://schemas.microsoft.com/office/mac/drawingml/2011/main" val="1"/>
             </a:ext>
           </a:extLst>
         </p:spPr>
@@ -22397,7 +22397,7 @@
           </a:ln>
           <a:extLst>
             <a:ext uri="{C572A759-6A51-4108-AA02-DFA0A04FC94B}">
-              <ma14:wrappingTextBoxFlag xmlns:ma14="http://schemas.microsoft.com/office/mac/drawingml/2011/main" xmlns="" val="1"/>
+              <ma14:wrappingTextBoxFlag xmlns="" xmlns:ma14="http://schemas.microsoft.com/office/mac/drawingml/2011/main" val="1"/>
             </a:ext>
           </a:extLst>
         </p:spPr>
@@ -22441,7 +22441,7 @@
           </a:ln>
           <a:extLst>
             <a:ext uri="{C572A759-6A51-4108-AA02-DFA0A04FC94B}">
-              <ma14:wrappingTextBoxFlag xmlns:ma14="http://schemas.microsoft.com/office/mac/drawingml/2011/main" xmlns="" val="1"/>
+              <ma14:wrappingTextBoxFlag xmlns="" xmlns:ma14="http://schemas.microsoft.com/office/mac/drawingml/2011/main" val="1"/>
             </a:ext>
           </a:extLst>
         </p:spPr>
@@ -22485,7 +22485,7 @@
           </a:ln>
           <a:extLst>
             <a:ext uri="{C572A759-6A51-4108-AA02-DFA0A04FC94B}">
-              <ma14:wrappingTextBoxFlag xmlns:ma14="http://schemas.microsoft.com/office/mac/drawingml/2011/main" xmlns="" val="1"/>
+              <ma14:wrappingTextBoxFlag xmlns="" xmlns:ma14="http://schemas.microsoft.com/office/mac/drawingml/2011/main" val="1"/>
             </a:ext>
           </a:extLst>
         </p:spPr>
@@ -22532,7 +22532,7 @@
           </a:ln>
           <a:extLst>
             <a:ext uri="{C572A759-6A51-4108-AA02-DFA0A04FC94B}">
-              <ma14:wrappingTextBoxFlag xmlns:ma14="http://schemas.microsoft.com/office/mac/drawingml/2011/main" xmlns="" val="1"/>
+              <ma14:wrappingTextBoxFlag xmlns="" xmlns:ma14="http://schemas.microsoft.com/office/mac/drawingml/2011/main" val="1"/>
             </a:ext>
           </a:extLst>
         </p:spPr>
@@ -22574,7 +22574,7 @@
           </a:ln>
           <a:extLst>
             <a:ext uri="{C572A759-6A51-4108-AA02-DFA0A04FC94B}">
-              <ma14:wrappingTextBoxFlag xmlns:ma14="http://schemas.microsoft.com/office/mac/drawingml/2011/main" xmlns="" val="1"/>
+              <ma14:wrappingTextBoxFlag xmlns="" xmlns:ma14="http://schemas.microsoft.com/office/mac/drawingml/2011/main" val="1"/>
             </a:ext>
           </a:extLst>
         </p:spPr>
@@ -22717,7 +22717,7 @@
           </a:ln>
           <a:extLst>
             <a:ext uri="{C572A759-6A51-4108-AA02-DFA0A04FC94B}">
-              <ma14:wrappingTextBoxFlag xmlns:ma14="http://schemas.microsoft.com/office/mac/drawingml/2011/main" xmlns="" val="1"/>
+              <ma14:wrappingTextBoxFlag xmlns="" xmlns:ma14="http://schemas.microsoft.com/office/mac/drawingml/2011/main" val="1"/>
             </a:ext>
           </a:extLst>
         </p:spPr>
@@ -22761,7 +22761,7 @@
           </a:ln>
           <a:extLst>
             <a:ext uri="{C572A759-6A51-4108-AA02-DFA0A04FC94B}">
-              <ma14:wrappingTextBoxFlag xmlns:ma14="http://schemas.microsoft.com/office/mac/drawingml/2011/main" xmlns="" val="1"/>
+              <ma14:wrappingTextBoxFlag xmlns="" xmlns:ma14="http://schemas.microsoft.com/office/mac/drawingml/2011/main" val="1"/>
             </a:ext>
           </a:extLst>
         </p:spPr>
@@ -22805,7 +22805,7 @@
           </a:ln>
           <a:extLst>
             <a:ext uri="{C572A759-6A51-4108-AA02-DFA0A04FC94B}">
-              <ma14:wrappingTextBoxFlag xmlns:ma14="http://schemas.microsoft.com/office/mac/drawingml/2011/main" xmlns="" val="1"/>
+              <ma14:wrappingTextBoxFlag xmlns="" xmlns:ma14="http://schemas.microsoft.com/office/mac/drawingml/2011/main" val="1"/>
             </a:ext>
           </a:extLst>
         </p:spPr>
@@ -22852,7 +22852,7 @@
           </a:ln>
           <a:extLst>
             <a:ext uri="{C572A759-6A51-4108-AA02-DFA0A04FC94B}">
-              <ma14:wrappingTextBoxFlag xmlns:ma14="http://schemas.microsoft.com/office/mac/drawingml/2011/main" xmlns="" val="1"/>
+              <ma14:wrappingTextBoxFlag xmlns="" xmlns:ma14="http://schemas.microsoft.com/office/mac/drawingml/2011/main" val="1"/>
             </a:ext>
           </a:extLst>
         </p:spPr>
@@ -22894,7 +22894,7 @@
           </a:ln>
           <a:extLst>
             <a:ext uri="{C572A759-6A51-4108-AA02-DFA0A04FC94B}">
-              <ma14:wrappingTextBoxFlag xmlns:ma14="http://schemas.microsoft.com/office/mac/drawingml/2011/main" xmlns="" val="1"/>
+              <ma14:wrappingTextBoxFlag xmlns="" xmlns:ma14="http://schemas.microsoft.com/office/mac/drawingml/2011/main" val="1"/>
             </a:ext>
           </a:extLst>
         </p:spPr>
@@ -23049,7 +23049,7 @@
           </a:ln>
           <a:extLst>
             <a:ext uri="{C572A759-6A51-4108-AA02-DFA0A04FC94B}">
-              <ma14:wrappingTextBoxFlag xmlns:ma14="http://schemas.microsoft.com/office/mac/drawingml/2011/main" xmlns="" val="1"/>
+              <ma14:wrappingTextBoxFlag xmlns="" xmlns:ma14="http://schemas.microsoft.com/office/mac/drawingml/2011/main" val="1"/>
             </a:ext>
           </a:extLst>
         </p:spPr>
@@ -23093,7 +23093,7 @@
           </a:ln>
           <a:extLst>
             <a:ext uri="{C572A759-6A51-4108-AA02-DFA0A04FC94B}">
-              <ma14:wrappingTextBoxFlag xmlns:ma14="http://schemas.microsoft.com/office/mac/drawingml/2011/main" xmlns="" val="1"/>
+              <ma14:wrappingTextBoxFlag xmlns="" xmlns:ma14="http://schemas.microsoft.com/office/mac/drawingml/2011/main" val="1"/>
             </a:ext>
           </a:extLst>
         </p:spPr>
@@ -23137,7 +23137,7 @@
           </a:ln>
           <a:extLst>
             <a:ext uri="{C572A759-6A51-4108-AA02-DFA0A04FC94B}">
-              <ma14:wrappingTextBoxFlag xmlns:ma14="http://schemas.microsoft.com/office/mac/drawingml/2011/main" xmlns="" val="1"/>
+              <ma14:wrappingTextBoxFlag xmlns="" xmlns:ma14="http://schemas.microsoft.com/office/mac/drawingml/2011/main" val="1"/>
             </a:ext>
           </a:extLst>
         </p:spPr>
@@ -23181,7 +23181,7 @@
           </a:ln>
           <a:extLst>
             <a:ext uri="{C572A759-6A51-4108-AA02-DFA0A04FC94B}">
-              <ma14:wrappingTextBoxFlag xmlns:ma14="http://schemas.microsoft.com/office/mac/drawingml/2011/main" xmlns="" val="1"/>
+              <ma14:wrappingTextBoxFlag xmlns="" xmlns:ma14="http://schemas.microsoft.com/office/mac/drawingml/2011/main" val="1"/>
             </a:ext>
           </a:extLst>
         </p:spPr>
@@ -23327,7 +23327,7 @@
           </a:ln>
           <a:extLst>
             <a:ext uri="{C572A759-6A51-4108-AA02-DFA0A04FC94B}">
-              <ma14:wrappingTextBoxFlag xmlns:ma14="http://schemas.microsoft.com/office/mac/drawingml/2011/main" xmlns="" val="1"/>
+              <ma14:wrappingTextBoxFlag xmlns="" xmlns:ma14="http://schemas.microsoft.com/office/mac/drawingml/2011/main" val="1"/>
             </a:ext>
           </a:extLst>
         </p:spPr>
@@ -23427,7 +23427,7 @@
           </a:ln>
           <a:extLst>
             <a:ext uri="{C572A759-6A51-4108-AA02-DFA0A04FC94B}">
-              <ma14:wrappingTextBoxFlag xmlns:ma14="http://schemas.microsoft.com/office/mac/drawingml/2011/main" xmlns="" val="1"/>
+              <ma14:wrappingTextBoxFlag xmlns="" xmlns:ma14="http://schemas.microsoft.com/office/mac/drawingml/2011/main" val="1"/>
             </a:ext>
           </a:extLst>
         </p:spPr>
@@ -23472,7 +23472,7 @@
           </a:ln>
           <a:extLst>
             <a:ext uri="{C572A759-6A51-4108-AA02-DFA0A04FC94B}">
-              <ma14:wrappingTextBoxFlag xmlns:ma14="http://schemas.microsoft.com/office/mac/drawingml/2011/main" xmlns="" val="1"/>
+              <ma14:wrappingTextBoxFlag xmlns="" xmlns:ma14="http://schemas.microsoft.com/office/mac/drawingml/2011/main" val="1"/>
             </a:ext>
           </a:extLst>
         </p:spPr>
@@ -23517,7 +23517,7 @@
           </a:ln>
           <a:extLst>
             <a:ext uri="{C572A759-6A51-4108-AA02-DFA0A04FC94B}">
-              <ma14:wrappingTextBoxFlag xmlns:ma14="http://schemas.microsoft.com/office/mac/drawingml/2011/main" xmlns="" val="1"/>
+              <ma14:wrappingTextBoxFlag xmlns="" xmlns:ma14="http://schemas.microsoft.com/office/mac/drawingml/2011/main" val="1"/>
             </a:ext>
           </a:extLst>
         </p:spPr>
@@ -23562,7 +23562,7 @@
           </a:ln>
           <a:extLst>
             <a:ext uri="{C572A759-6A51-4108-AA02-DFA0A04FC94B}">
-              <ma14:wrappingTextBoxFlag xmlns:ma14="http://schemas.microsoft.com/office/mac/drawingml/2011/main" xmlns="" val="1"/>
+              <ma14:wrappingTextBoxFlag xmlns="" xmlns:ma14="http://schemas.microsoft.com/office/mac/drawingml/2011/main" val="1"/>
             </a:ext>
           </a:extLst>
         </p:spPr>
@@ -23607,7 +23607,7 @@
           </a:ln>
           <a:extLst>
             <a:ext uri="{C572A759-6A51-4108-AA02-DFA0A04FC94B}">
-              <ma14:wrappingTextBoxFlag xmlns:ma14="http://schemas.microsoft.com/office/mac/drawingml/2011/main" xmlns="" val="1"/>
+              <ma14:wrappingTextBoxFlag xmlns="" xmlns:ma14="http://schemas.microsoft.com/office/mac/drawingml/2011/main" val="1"/>
             </a:ext>
           </a:extLst>
         </p:spPr>
@@ -23845,7 +23845,7 @@
           </a:ln>
           <a:extLst>
             <a:ext uri="{C572A759-6A51-4108-AA02-DFA0A04FC94B}">
-              <ma14:wrappingTextBoxFlag xmlns:ma14="http://schemas.microsoft.com/office/mac/drawingml/2011/main" xmlns="" val="1"/>
+              <ma14:wrappingTextBoxFlag xmlns="" xmlns:ma14="http://schemas.microsoft.com/office/mac/drawingml/2011/main" val="1"/>
             </a:ext>
           </a:extLst>
         </p:spPr>
@@ -23884,7 +23884,7 @@
           </a:ln>
           <a:extLst>
             <a:ext uri="{C572A759-6A51-4108-AA02-DFA0A04FC94B}">
-              <ma14:wrappingTextBoxFlag xmlns:ma14="http://schemas.microsoft.com/office/mac/drawingml/2011/main" xmlns="" val="1"/>
+              <ma14:wrappingTextBoxFlag xmlns="" xmlns:ma14="http://schemas.microsoft.com/office/mac/drawingml/2011/main" val="1"/>
             </a:ext>
           </a:extLst>
         </p:spPr>
@@ -23923,7 +23923,7 @@
           </a:ln>
           <a:extLst>
             <a:ext uri="{C572A759-6A51-4108-AA02-DFA0A04FC94B}">
-              <ma14:wrappingTextBoxFlag xmlns:ma14="http://schemas.microsoft.com/office/mac/drawingml/2011/main" xmlns="" val="1"/>
+              <ma14:wrappingTextBoxFlag xmlns="" xmlns:ma14="http://schemas.microsoft.com/office/mac/drawingml/2011/main" val="1"/>
             </a:ext>
           </a:extLst>
         </p:spPr>
@@ -24094,7 +24094,7 @@
           </a:ln>
           <a:extLst>
             <a:ext uri="{C572A759-6A51-4108-AA02-DFA0A04FC94B}">
-              <ma14:wrappingTextBoxFlag xmlns:ma14="http://schemas.microsoft.com/office/mac/drawingml/2011/main" xmlns="" val="1"/>
+              <ma14:wrappingTextBoxFlag xmlns="" xmlns:ma14="http://schemas.microsoft.com/office/mac/drawingml/2011/main" val="1"/>
             </a:ext>
           </a:extLst>
         </p:spPr>
@@ -24138,7 +24138,7 @@
           </a:ln>
           <a:extLst>
             <a:ext uri="{C572A759-6A51-4108-AA02-DFA0A04FC94B}">
-              <ma14:wrappingTextBoxFlag xmlns:ma14="http://schemas.microsoft.com/office/mac/drawingml/2011/main" xmlns="" val="1"/>
+              <ma14:wrappingTextBoxFlag xmlns="" xmlns:ma14="http://schemas.microsoft.com/office/mac/drawingml/2011/main" val="1"/>
             </a:ext>
           </a:extLst>
         </p:spPr>
@@ -24182,7 +24182,7 @@
           </a:ln>
           <a:extLst>
             <a:ext uri="{C572A759-6A51-4108-AA02-DFA0A04FC94B}">
-              <ma14:wrappingTextBoxFlag xmlns:ma14="http://schemas.microsoft.com/office/mac/drawingml/2011/main" xmlns="" val="1"/>
+              <ma14:wrappingTextBoxFlag xmlns="" xmlns:ma14="http://schemas.microsoft.com/office/mac/drawingml/2011/main" val="1"/>
             </a:ext>
           </a:extLst>
         </p:spPr>
@@ -24226,7 +24226,7 @@
           </a:ln>
           <a:extLst>
             <a:ext uri="{C572A759-6A51-4108-AA02-DFA0A04FC94B}">
-              <ma14:wrappingTextBoxFlag xmlns:ma14="http://schemas.microsoft.com/office/mac/drawingml/2011/main" xmlns="" val="1"/>
+              <ma14:wrappingTextBoxFlag xmlns="" xmlns:ma14="http://schemas.microsoft.com/office/mac/drawingml/2011/main" val="1"/>
             </a:ext>
           </a:extLst>
         </p:spPr>
@@ -24287,7 +24287,7 @@
           </a:ln>
           <a:extLst>
             <a:ext uri="{C572A759-6A51-4108-AA02-DFA0A04FC94B}">
-              <ma14:wrappingTextBoxFlag xmlns:ma14="http://schemas.microsoft.com/office/mac/drawingml/2011/main" xmlns="" val="1"/>
+              <ma14:wrappingTextBoxFlag xmlns="" xmlns:ma14="http://schemas.microsoft.com/office/mac/drawingml/2011/main" val="1"/>
             </a:ext>
           </a:extLst>
         </p:spPr>
@@ -24470,7 +24470,7 @@
           </a:ln>
           <a:extLst>
             <a:ext uri="{C572A759-6A51-4108-AA02-DFA0A04FC94B}">
-              <ma14:wrappingTextBoxFlag xmlns:ma14="http://schemas.microsoft.com/office/mac/drawingml/2011/main" xmlns="" val="1"/>
+              <ma14:wrappingTextBoxFlag xmlns="" xmlns:ma14="http://schemas.microsoft.com/office/mac/drawingml/2011/main" val="1"/>
             </a:ext>
           </a:extLst>
         </p:spPr>
@@ -24509,7 +24509,7 @@
           </a:ln>
           <a:extLst>
             <a:ext uri="{C572A759-6A51-4108-AA02-DFA0A04FC94B}">
-              <ma14:wrappingTextBoxFlag xmlns:ma14="http://schemas.microsoft.com/office/mac/drawingml/2011/main" xmlns="" val="1"/>
+              <ma14:wrappingTextBoxFlag xmlns="" xmlns:ma14="http://schemas.microsoft.com/office/mac/drawingml/2011/main" val="1"/>
             </a:ext>
           </a:extLst>
         </p:spPr>
@@ -24553,7 +24553,7 @@
           </a:ln>
           <a:extLst>
             <a:ext uri="{C572A759-6A51-4108-AA02-DFA0A04FC94B}">
-              <ma14:wrappingTextBoxFlag xmlns:ma14="http://schemas.microsoft.com/office/mac/drawingml/2011/main" xmlns="" val="1"/>
+              <ma14:wrappingTextBoxFlag xmlns="" xmlns:ma14="http://schemas.microsoft.com/office/mac/drawingml/2011/main" val="1"/>
             </a:ext>
           </a:extLst>
         </p:spPr>
@@ -24597,7 +24597,7 @@
           </a:ln>
           <a:extLst>
             <a:ext uri="{C572A759-6A51-4108-AA02-DFA0A04FC94B}">
-              <ma14:wrappingTextBoxFlag xmlns:ma14="http://schemas.microsoft.com/office/mac/drawingml/2011/main" xmlns="" val="1"/>
+              <ma14:wrappingTextBoxFlag xmlns="" xmlns:ma14="http://schemas.microsoft.com/office/mac/drawingml/2011/main" val="1"/>
             </a:ext>
           </a:extLst>
         </p:spPr>
@@ -24735,7 +24735,7 @@
           </a:ln>
           <a:extLst>
             <a:ext uri="{C572A759-6A51-4108-AA02-DFA0A04FC94B}">
-              <ma14:wrappingTextBoxFlag xmlns:ma14="http://schemas.microsoft.com/office/mac/drawingml/2011/main" xmlns="" val="1"/>
+              <ma14:wrappingTextBoxFlag xmlns="" xmlns:ma14="http://schemas.microsoft.com/office/mac/drawingml/2011/main" val="1"/>
             </a:ext>
           </a:extLst>
         </p:spPr>
@@ -24784,7 +24784,7 @@
           </a:ln>
           <a:extLst>
             <a:ext uri="{C572A759-6A51-4108-AA02-DFA0A04FC94B}">
-              <ma14:wrappingTextBoxFlag xmlns:ma14="http://schemas.microsoft.com/office/mac/drawingml/2011/main" xmlns="" val="1"/>
+              <ma14:wrappingTextBoxFlag xmlns="" xmlns:ma14="http://schemas.microsoft.com/office/mac/drawingml/2011/main" val="1"/>
             </a:ext>
           </a:extLst>
         </p:spPr>
@@ -24828,7 +24828,7 @@
           </a:ln>
           <a:extLst>
             <a:ext uri="{C572A759-6A51-4108-AA02-DFA0A04FC94B}">
-              <ma14:wrappingTextBoxFlag xmlns:ma14="http://schemas.microsoft.com/office/mac/drawingml/2011/main" xmlns="" val="1"/>
+              <ma14:wrappingTextBoxFlag xmlns="" xmlns:ma14="http://schemas.microsoft.com/office/mac/drawingml/2011/main" val="1"/>
             </a:ext>
           </a:extLst>
         </p:spPr>
@@ -24872,7 +24872,7 @@
           </a:ln>
           <a:extLst>
             <a:ext uri="{C572A759-6A51-4108-AA02-DFA0A04FC94B}">
-              <ma14:wrappingTextBoxFlag xmlns:ma14="http://schemas.microsoft.com/office/mac/drawingml/2011/main" xmlns="" val="1"/>
+              <ma14:wrappingTextBoxFlag xmlns="" xmlns:ma14="http://schemas.microsoft.com/office/mac/drawingml/2011/main" val="1"/>
             </a:ext>
           </a:extLst>
         </p:spPr>
@@ -24919,7 +24919,7 @@
           </a:ln>
           <a:extLst>
             <a:ext uri="{C572A759-6A51-4108-AA02-DFA0A04FC94B}">
-              <ma14:wrappingTextBoxFlag xmlns:ma14="http://schemas.microsoft.com/office/mac/drawingml/2011/main" xmlns="" val="1"/>
+              <ma14:wrappingTextBoxFlag xmlns="" xmlns:ma14="http://schemas.microsoft.com/office/mac/drawingml/2011/main" val="1"/>
             </a:ext>
           </a:extLst>
         </p:spPr>
@@ -25055,7 +25055,7 @@
           </a:ln>
           <a:extLst>
             <a:ext uri="{C572A759-6A51-4108-AA02-DFA0A04FC94B}">
-              <ma14:wrappingTextBoxFlag xmlns:ma14="http://schemas.microsoft.com/office/mac/drawingml/2011/main" xmlns="" val="1"/>
+              <ma14:wrappingTextBoxFlag xmlns="" xmlns:ma14="http://schemas.microsoft.com/office/mac/drawingml/2011/main" val="1"/>
             </a:ext>
           </a:extLst>
         </p:spPr>
@@ -25104,7 +25104,7 @@
           </a:ln>
           <a:extLst>
             <a:ext uri="{C572A759-6A51-4108-AA02-DFA0A04FC94B}">
-              <ma14:wrappingTextBoxFlag xmlns:ma14="http://schemas.microsoft.com/office/mac/drawingml/2011/main" xmlns="" val="1"/>
+              <ma14:wrappingTextBoxFlag xmlns="" xmlns:ma14="http://schemas.microsoft.com/office/mac/drawingml/2011/main" val="1"/>
             </a:ext>
           </a:extLst>
         </p:spPr>
@@ -25148,7 +25148,7 @@
           </a:ln>
           <a:extLst>
             <a:ext uri="{C572A759-6A51-4108-AA02-DFA0A04FC94B}">
-              <ma14:wrappingTextBoxFlag xmlns:ma14="http://schemas.microsoft.com/office/mac/drawingml/2011/main" xmlns="" val="1"/>
+              <ma14:wrappingTextBoxFlag xmlns="" xmlns:ma14="http://schemas.microsoft.com/office/mac/drawingml/2011/main" val="1"/>
             </a:ext>
           </a:extLst>
         </p:spPr>
@@ -25192,7 +25192,7 @@
           </a:ln>
           <a:extLst>
             <a:ext uri="{C572A759-6A51-4108-AA02-DFA0A04FC94B}">
-              <ma14:wrappingTextBoxFlag xmlns:ma14="http://schemas.microsoft.com/office/mac/drawingml/2011/main" xmlns="" val="1"/>
+              <ma14:wrappingTextBoxFlag xmlns="" xmlns:ma14="http://schemas.microsoft.com/office/mac/drawingml/2011/main" val="1"/>
             </a:ext>
           </a:extLst>
         </p:spPr>
@@ -25239,7 +25239,7 @@
           </a:ln>
           <a:extLst>
             <a:ext uri="{C572A759-6A51-4108-AA02-DFA0A04FC94B}">
-              <ma14:wrappingTextBoxFlag xmlns:ma14="http://schemas.microsoft.com/office/mac/drawingml/2011/main" xmlns="" val="1"/>
+              <ma14:wrappingTextBoxFlag xmlns="" xmlns:ma14="http://schemas.microsoft.com/office/mac/drawingml/2011/main" val="1"/>
             </a:ext>
           </a:extLst>
         </p:spPr>
@@ -25284,7 +25284,7 @@
           </a:ln>
           <a:extLst>
             <a:ext uri="{C572A759-6A51-4108-AA02-DFA0A04FC94B}">
-              <ma14:wrappingTextBoxFlag xmlns:ma14="http://schemas.microsoft.com/office/mac/drawingml/2011/main" xmlns="" val="1"/>
+              <ma14:wrappingTextBoxFlag xmlns="" xmlns:ma14="http://schemas.microsoft.com/office/mac/drawingml/2011/main" val="1"/>
             </a:ext>
           </a:extLst>
         </p:spPr>
@@ -25420,7 +25420,7 @@
           </a:ln>
           <a:extLst>
             <a:ext uri="{C572A759-6A51-4108-AA02-DFA0A04FC94B}">
-              <ma14:wrappingTextBoxFlag xmlns:ma14="http://schemas.microsoft.com/office/mac/drawingml/2011/main" xmlns="" val="1"/>
+              <ma14:wrappingTextBoxFlag xmlns="" xmlns:ma14="http://schemas.microsoft.com/office/mac/drawingml/2011/main" val="1"/>
             </a:ext>
           </a:extLst>
         </p:spPr>
@@ -25469,7 +25469,7 @@
           </a:ln>
           <a:extLst>
             <a:ext uri="{C572A759-6A51-4108-AA02-DFA0A04FC94B}">
-              <ma14:wrappingTextBoxFlag xmlns:ma14="http://schemas.microsoft.com/office/mac/drawingml/2011/main" xmlns="" val="1"/>
+              <ma14:wrappingTextBoxFlag xmlns="" xmlns:ma14="http://schemas.microsoft.com/office/mac/drawingml/2011/main" val="1"/>
             </a:ext>
           </a:extLst>
         </p:spPr>
@@ -25513,7 +25513,7 @@
           </a:ln>
           <a:extLst>
             <a:ext uri="{C572A759-6A51-4108-AA02-DFA0A04FC94B}">
-              <ma14:wrappingTextBoxFlag xmlns:ma14="http://schemas.microsoft.com/office/mac/drawingml/2011/main" xmlns="" val="1"/>
+              <ma14:wrappingTextBoxFlag xmlns="" xmlns:ma14="http://schemas.microsoft.com/office/mac/drawingml/2011/main" val="1"/>
             </a:ext>
           </a:extLst>
         </p:spPr>
@@ -25557,7 +25557,7 @@
           </a:ln>
           <a:extLst>
             <a:ext uri="{C572A759-6A51-4108-AA02-DFA0A04FC94B}">
-              <ma14:wrappingTextBoxFlag xmlns:ma14="http://schemas.microsoft.com/office/mac/drawingml/2011/main" xmlns="" val="1"/>
+              <ma14:wrappingTextBoxFlag xmlns="" xmlns:ma14="http://schemas.microsoft.com/office/mac/drawingml/2011/main" val="1"/>
             </a:ext>
           </a:extLst>
         </p:spPr>
@@ -25604,7 +25604,7 @@
           </a:ln>
           <a:extLst>
             <a:ext uri="{C572A759-6A51-4108-AA02-DFA0A04FC94B}">
-              <ma14:wrappingTextBoxFlag xmlns:ma14="http://schemas.microsoft.com/office/mac/drawingml/2011/main" xmlns="" val="1"/>
+              <ma14:wrappingTextBoxFlag xmlns="" xmlns:ma14="http://schemas.microsoft.com/office/mac/drawingml/2011/main" val="1"/>
             </a:ext>
           </a:extLst>
         </p:spPr>
@@ -25649,7 +25649,7 @@
           </a:ln>
           <a:extLst>
             <a:ext uri="{C572A759-6A51-4108-AA02-DFA0A04FC94B}">
-              <ma14:wrappingTextBoxFlag xmlns:ma14="http://schemas.microsoft.com/office/mac/drawingml/2011/main" xmlns="" val="1"/>
+              <ma14:wrappingTextBoxFlag xmlns="" xmlns:ma14="http://schemas.microsoft.com/office/mac/drawingml/2011/main" val="1"/>
             </a:ext>
           </a:extLst>
         </p:spPr>
@@ -25785,7 +25785,7 @@
           </a:ln>
           <a:extLst>
             <a:ext uri="{C572A759-6A51-4108-AA02-DFA0A04FC94B}">
-              <ma14:wrappingTextBoxFlag xmlns:ma14="http://schemas.microsoft.com/office/mac/drawingml/2011/main" xmlns="" val="1"/>
+              <ma14:wrappingTextBoxFlag xmlns="" xmlns:ma14="http://schemas.microsoft.com/office/mac/drawingml/2011/main" val="1"/>
             </a:ext>
           </a:extLst>
         </p:spPr>
@@ -25834,7 +25834,7 @@
           </a:ln>
           <a:extLst>
             <a:ext uri="{C572A759-6A51-4108-AA02-DFA0A04FC94B}">
-              <ma14:wrappingTextBoxFlag xmlns:ma14="http://schemas.microsoft.com/office/mac/drawingml/2011/main" xmlns="" val="1"/>
+              <ma14:wrappingTextBoxFlag xmlns="" xmlns:ma14="http://schemas.microsoft.com/office/mac/drawingml/2011/main" val="1"/>
             </a:ext>
           </a:extLst>
         </p:spPr>
@@ -25878,7 +25878,7 @@
           </a:ln>
           <a:extLst>
             <a:ext uri="{C572A759-6A51-4108-AA02-DFA0A04FC94B}">
-              <ma14:wrappingTextBoxFlag xmlns:ma14="http://schemas.microsoft.com/office/mac/drawingml/2011/main" xmlns="" val="1"/>
+              <ma14:wrappingTextBoxFlag xmlns="" xmlns:ma14="http://schemas.microsoft.com/office/mac/drawingml/2011/main" val="1"/>
             </a:ext>
           </a:extLst>
         </p:spPr>
@@ -25922,7 +25922,7 @@
           </a:ln>
           <a:extLst>
             <a:ext uri="{C572A759-6A51-4108-AA02-DFA0A04FC94B}">
-              <ma14:wrappingTextBoxFlag xmlns:ma14="http://schemas.microsoft.com/office/mac/drawingml/2011/main" xmlns="" val="1"/>
+              <ma14:wrappingTextBoxFlag xmlns="" xmlns:ma14="http://schemas.microsoft.com/office/mac/drawingml/2011/main" val="1"/>
             </a:ext>
           </a:extLst>
         </p:spPr>
@@ -25969,7 +25969,7 @@
           </a:ln>
           <a:extLst>
             <a:ext uri="{C572A759-6A51-4108-AA02-DFA0A04FC94B}">
-              <ma14:wrappingTextBoxFlag xmlns:ma14="http://schemas.microsoft.com/office/mac/drawingml/2011/main" xmlns="" val="1"/>
+              <ma14:wrappingTextBoxFlag xmlns="" xmlns:ma14="http://schemas.microsoft.com/office/mac/drawingml/2011/main" val="1"/>
             </a:ext>
           </a:extLst>
         </p:spPr>
@@ -26105,7 +26105,7 @@
           </a:ln>
           <a:extLst>
             <a:ext uri="{C572A759-6A51-4108-AA02-DFA0A04FC94B}">
-              <ma14:wrappingTextBoxFlag xmlns:ma14="http://schemas.microsoft.com/office/mac/drawingml/2011/main" xmlns="" val="1"/>
+              <ma14:wrappingTextBoxFlag xmlns="" xmlns:ma14="http://schemas.microsoft.com/office/mac/drawingml/2011/main" val="1"/>
             </a:ext>
           </a:extLst>
         </p:spPr>
@@ -26154,7 +26154,7 @@
           </a:ln>
           <a:extLst>
             <a:ext uri="{C572A759-6A51-4108-AA02-DFA0A04FC94B}">
-              <ma14:wrappingTextBoxFlag xmlns:ma14="http://schemas.microsoft.com/office/mac/drawingml/2011/main" xmlns="" val="1"/>
+              <ma14:wrappingTextBoxFlag xmlns="" xmlns:ma14="http://schemas.microsoft.com/office/mac/drawingml/2011/main" val="1"/>
             </a:ext>
           </a:extLst>
         </p:spPr>
@@ -26198,7 +26198,7 @@
           </a:ln>
           <a:extLst>
             <a:ext uri="{C572A759-6A51-4108-AA02-DFA0A04FC94B}">
-              <ma14:wrappingTextBoxFlag xmlns:ma14="http://schemas.microsoft.com/office/mac/drawingml/2011/main" xmlns="" val="1"/>
+              <ma14:wrappingTextBoxFlag xmlns="" xmlns:ma14="http://schemas.microsoft.com/office/mac/drawingml/2011/main" val="1"/>
             </a:ext>
           </a:extLst>
         </p:spPr>
@@ -26242,7 +26242,7 @@
           </a:ln>
           <a:extLst>
             <a:ext uri="{C572A759-6A51-4108-AA02-DFA0A04FC94B}">
-              <ma14:wrappingTextBoxFlag xmlns:ma14="http://schemas.microsoft.com/office/mac/drawingml/2011/main" xmlns="" val="1"/>
+              <ma14:wrappingTextBoxFlag xmlns="" xmlns:ma14="http://schemas.microsoft.com/office/mac/drawingml/2011/main" val="1"/>
             </a:ext>
           </a:extLst>
         </p:spPr>
@@ -26289,7 +26289,7 @@
           </a:ln>
           <a:extLst>
             <a:ext uri="{C572A759-6A51-4108-AA02-DFA0A04FC94B}">
-              <ma14:wrappingTextBoxFlag xmlns:ma14="http://schemas.microsoft.com/office/mac/drawingml/2011/main" xmlns="" val="1"/>
+              <ma14:wrappingTextBoxFlag xmlns="" xmlns:ma14="http://schemas.microsoft.com/office/mac/drawingml/2011/main" val="1"/>
             </a:ext>
           </a:extLst>
         </p:spPr>
@@ -26425,7 +26425,7 @@
           </a:ln>
           <a:extLst>
             <a:ext uri="{C572A759-6A51-4108-AA02-DFA0A04FC94B}">
-              <ma14:wrappingTextBoxFlag xmlns:ma14="http://schemas.microsoft.com/office/mac/drawingml/2011/main" xmlns="" val="1"/>
+              <ma14:wrappingTextBoxFlag xmlns="" xmlns:ma14="http://schemas.microsoft.com/office/mac/drawingml/2011/main" val="1"/>
             </a:ext>
           </a:extLst>
         </p:spPr>
@@ -26474,7 +26474,7 @@
           </a:ln>
           <a:extLst>
             <a:ext uri="{C572A759-6A51-4108-AA02-DFA0A04FC94B}">
-              <ma14:wrappingTextBoxFlag xmlns:ma14="http://schemas.microsoft.com/office/mac/drawingml/2011/main" xmlns="" val="1"/>
+              <ma14:wrappingTextBoxFlag xmlns="" xmlns:ma14="http://schemas.microsoft.com/office/mac/drawingml/2011/main" val="1"/>
             </a:ext>
           </a:extLst>
         </p:spPr>
@@ -26518,7 +26518,7 @@
           </a:ln>
           <a:extLst>
             <a:ext uri="{C572A759-6A51-4108-AA02-DFA0A04FC94B}">
-              <ma14:wrappingTextBoxFlag xmlns:ma14="http://schemas.microsoft.com/office/mac/drawingml/2011/main" xmlns="" val="1"/>
+              <ma14:wrappingTextBoxFlag xmlns="" xmlns:ma14="http://schemas.microsoft.com/office/mac/drawingml/2011/main" val="1"/>
             </a:ext>
           </a:extLst>
         </p:spPr>
@@ -26562,7 +26562,7 @@
           </a:ln>
           <a:extLst>
             <a:ext uri="{C572A759-6A51-4108-AA02-DFA0A04FC94B}">
-              <ma14:wrappingTextBoxFlag xmlns:ma14="http://schemas.microsoft.com/office/mac/drawingml/2011/main" xmlns="" val="1"/>
+              <ma14:wrappingTextBoxFlag xmlns="" xmlns:ma14="http://schemas.microsoft.com/office/mac/drawingml/2011/main" val="1"/>
             </a:ext>
           </a:extLst>
         </p:spPr>
@@ -26609,7 +26609,7 @@
           </a:ln>
           <a:extLst>
             <a:ext uri="{C572A759-6A51-4108-AA02-DFA0A04FC94B}">
-              <ma14:wrappingTextBoxFlag xmlns:ma14="http://schemas.microsoft.com/office/mac/drawingml/2011/main" xmlns="" val="1"/>
+              <ma14:wrappingTextBoxFlag xmlns="" xmlns:ma14="http://schemas.microsoft.com/office/mac/drawingml/2011/main" val="1"/>
             </a:ext>
           </a:extLst>
         </p:spPr>
@@ -26651,7 +26651,7 @@
           </a:ln>
           <a:extLst>
             <a:ext uri="{C572A759-6A51-4108-AA02-DFA0A04FC94B}">
-              <ma14:wrappingTextBoxFlag xmlns:ma14="http://schemas.microsoft.com/office/mac/drawingml/2011/main" xmlns="" val="1"/>
+              <ma14:wrappingTextBoxFlag xmlns="" xmlns:ma14="http://schemas.microsoft.com/office/mac/drawingml/2011/main" val="1"/>
             </a:ext>
           </a:extLst>
         </p:spPr>
@@ -26828,7 +26828,7 @@
           </a:ln>
           <a:extLst>
             <a:ext uri="{C572A759-6A51-4108-AA02-DFA0A04FC94B}">
-              <ma14:wrappingTextBoxFlag xmlns:ma14="http://schemas.microsoft.com/office/mac/drawingml/2011/main" xmlns="" val="1"/>
+              <ma14:wrappingTextBoxFlag xmlns="" xmlns:ma14="http://schemas.microsoft.com/office/mac/drawingml/2011/main" val="1"/>
             </a:ext>
           </a:extLst>
         </p:spPr>
@@ -27541,7 +27541,7 @@
           </a:ln>
           <a:extLst>
             <a:ext uri="{C572A759-6A51-4108-AA02-DFA0A04FC94B}">
-              <ma14:wrappingTextBoxFlag xmlns:ma14="http://schemas.microsoft.com/office/mac/drawingml/2011/main" xmlns="" val="1"/>
+              <ma14:wrappingTextBoxFlag xmlns="" xmlns:ma14="http://schemas.microsoft.com/office/mac/drawingml/2011/main" val="1"/>
             </a:ext>
           </a:extLst>
         </p:spPr>
@@ -27585,7 +27585,7 @@
           </a:ln>
           <a:extLst>
             <a:ext uri="{C572A759-6A51-4108-AA02-DFA0A04FC94B}">
-              <ma14:wrappingTextBoxFlag xmlns:ma14="http://schemas.microsoft.com/office/mac/drawingml/2011/main" xmlns="" val="1"/>
+              <ma14:wrappingTextBoxFlag xmlns="" xmlns:ma14="http://schemas.microsoft.com/office/mac/drawingml/2011/main" val="1"/>
             </a:ext>
           </a:extLst>
         </p:spPr>
@@ -27633,7 +27633,7 @@
           </a:ln>
           <a:extLst>
             <a:ext uri="{C572A759-6A51-4108-AA02-DFA0A04FC94B}">
-              <ma14:wrappingTextBoxFlag xmlns:ma14="http://schemas.microsoft.com/office/mac/drawingml/2011/main" xmlns="" val="1"/>
+              <ma14:wrappingTextBoxFlag xmlns="" xmlns:ma14="http://schemas.microsoft.com/office/mac/drawingml/2011/main" val="1"/>
             </a:ext>
           </a:extLst>
         </p:spPr>
@@ -27792,7 +27792,7 @@
           </a:ln>
           <a:extLst>
             <a:ext uri="{C572A759-6A51-4108-AA02-DFA0A04FC94B}">
-              <ma14:wrappingTextBoxFlag xmlns:ma14="http://schemas.microsoft.com/office/mac/drawingml/2011/main" xmlns="" val="1"/>
+              <ma14:wrappingTextBoxFlag xmlns="" xmlns:ma14="http://schemas.microsoft.com/office/mac/drawingml/2011/main" val="1"/>
             </a:ext>
           </a:extLst>
         </p:spPr>
@@ -28072,7 +28072,7 @@
           </a:ln>
           <a:extLst>
             <a:ext uri="{C572A759-6A51-4108-AA02-DFA0A04FC94B}">
-              <ma14:wrappingTextBoxFlag xmlns:ma14="http://schemas.microsoft.com/office/mac/drawingml/2011/main" xmlns="" val="1"/>
+              <ma14:wrappingTextBoxFlag xmlns="" xmlns:ma14="http://schemas.microsoft.com/office/mac/drawingml/2011/main" val="1"/>
             </a:ext>
           </a:extLst>
         </p:spPr>
@@ -28119,7 +28119,7 @@
           </a:ln>
           <a:extLst>
             <a:ext uri="{C572A759-6A51-4108-AA02-DFA0A04FC94B}">
-              <ma14:wrappingTextBoxFlag xmlns:ma14="http://schemas.microsoft.com/office/mac/drawingml/2011/main" xmlns="" val="1"/>
+              <ma14:wrappingTextBoxFlag xmlns="" xmlns:ma14="http://schemas.microsoft.com/office/mac/drawingml/2011/main" val="1"/>
             </a:ext>
           </a:extLst>
         </p:spPr>
@@ -28166,7 +28166,7 @@
           </a:ln>
           <a:extLst>
             <a:ext uri="{C572A759-6A51-4108-AA02-DFA0A04FC94B}">
-              <ma14:wrappingTextBoxFlag xmlns:ma14="http://schemas.microsoft.com/office/mac/drawingml/2011/main" xmlns="" val="1"/>
+              <ma14:wrappingTextBoxFlag xmlns="" xmlns:ma14="http://schemas.microsoft.com/office/mac/drawingml/2011/main" val="1"/>
             </a:ext>
           </a:extLst>
         </p:spPr>
@@ -28213,7 +28213,7 @@
           </a:ln>
           <a:extLst>
             <a:ext uri="{C572A759-6A51-4108-AA02-DFA0A04FC94B}">
-              <ma14:wrappingTextBoxFlag xmlns:ma14="http://schemas.microsoft.com/office/mac/drawingml/2011/main" xmlns="" val="1"/>
+              <ma14:wrappingTextBoxFlag xmlns="" xmlns:ma14="http://schemas.microsoft.com/office/mac/drawingml/2011/main" val="1"/>
             </a:ext>
           </a:extLst>
         </p:spPr>
@@ -28257,7 +28257,7 @@
           </a:ln>
           <a:extLst>
             <a:ext uri="{C572A759-6A51-4108-AA02-DFA0A04FC94B}">
-              <ma14:wrappingTextBoxFlag xmlns:ma14="http://schemas.microsoft.com/office/mac/drawingml/2011/main" xmlns="" val="1"/>
+              <ma14:wrappingTextBoxFlag xmlns="" xmlns:ma14="http://schemas.microsoft.com/office/mac/drawingml/2011/main" val="1"/>
             </a:ext>
           </a:extLst>
         </p:spPr>
@@ -28298,7 +28298,7 @@
           </a:ln>
           <a:extLst>
             <a:ext uri="{C572A759-6A51-4108-AA02-DFA0A04FC94B}">
-              <ma14:wrappingTextBoxFlag xmlns:ma14="http://schemas.microsoft.com/office/mac/drawingml/2011/main" xmlns="" val="1"/>
+              <ma14:wrappingTextBoxFlag xmlns="" xmlns:ma14="http://schemas.microsoft.com/office/mac/drawingml/2011/main" val="1"/>
             </a:ext>
           </a:extLst>
         </p:spPr>
@@ -28745,7 +28745,7 @@
           </a:ln>
           <a:extLst>
             <a:ext uri="{C572A759-6A51-4108-AA02-DFA0A04FC94B}">
-              <ma14:wrappingTextBoxFlag xmlns:ma14="http://schemas.microsoft.com/office/mac/drawingml/2011/main" xmlns="" val="1"/>
+              <ma14:wrappingTextBoxFlag xmlns="" xmlns:ma14="http://schemas.microsoft.com/office/mac/drawingml/2011/main" val="1"/>
             </a:ext>
           </a:extLst>
         </p:spPr>
@@ -28781,7 +28781,7 @@
           </a:ln>
           <a:extLst>
             <a:ext uri="{C572A759-6A51-4108-AA02-DFA0A04FC94B}">
-              <ma14:wrappingTextBoxFlag xmlns:ma14="http://schemas.microsoft.com/office/mac/drawingml/2011/main" xmlns="" val="1"/>
+              <ma14:wrappingTextBoxFlag xmlns="" xmlns:ma14="http://schemas.microsoft.com/office/mac/drawingml/2011/main" val="1"/>
             </a:ext>
           </a:extLst>
         </p:spPr>
@@ -28816,7 +28816,7 @@
           </a:ln>
           <a:extLst>
             <a:ext uri="{C572A759-6A51-4108-AA02-DFA0A04FC94B}">
-              <ma14:wrappingTextBoxFlag xmlns:ma14="http://schemas.microsoft.com/office/mac/drawingml/2011/main" xmlns="" val="1"/>
+              <ma14:wrappingTextBoxFlag xmlns="" xmlns:ma14="http://schemas.microsoft.com/office/mac/drawingml/2011/main" val="1"/>
             </a:ext>
           </a:extLst>
         </p:spPr>
@@ -29483,7 +29483,7 @@
           </a:ln>
           <a:extLst>
             <a:ext uri="{C572A759-6A51-4108-AA02-DFA0A04FC94B}">
-              <ma14:wrappingTextBoxFlag xmlns:ma14="http://schemas.microsoft.com/office/mac/drawingml/2011/main" xmlns="" val="1"/>
+              <ma14:wrappingTextBoxFlag xmlns="" xmlns:ma14="http://schemas.microsoft.com/office/mac/drawingml/2011/main" val="1"/>
             </a:ext>
           </a:extLst>
         </p:spPr>
@@ -29518,7 +29518,7 @@
           </a:ln>
           <a:extLst>
             <a:ext uri="{C572A759-6A51-4108-AA02-DFA0A04FC94B}">
-              <ma14:wrappingTextBoxFlag xmlns:ma14="http://schemas.microsoft.com/office/mac/drawingml/2011/main" xmlns="" val="1"/>
+              <ma14:wrappingTextBoxFlag xmlns="" xmlns:ma14="http://schemas.microsoft.com/office/mac/drawingml/2011/main" val="1"/>
             </a:ext>
           </a:extLst>
         </p:spPr>
@@ -29553,7 +29553,7 @@
           </a:ln>
           <a:extLst>
             <a:ext uri="{C572A759-6A51-4108-AA02-DFA0A04FC94B}">
-              <ma14:wrappingTextBoxFlag xmlns:ma14="http://schemas.microsoft.com/office/mac/drawingml/2011/main" xmlns="" val="1"/>
+              <ma14:wrappingTextBoxFlag xmlns="" xmlns:ma14="http://schemas.microsoft.com/office/mac/drawingml/2011/main" val="1"/>
             </a:ext>
           </a:extLst>
         </p:spPr>
@@ -29588,7 +29588,7 @@
           </a:ln>
           <a:extLst>
             <a:ext uri="{C572A759-6A51-4108-AA02-DFA0A04FC94B}">
-              <ma14:wrappingTextBoxFlag xmlns:ma14="http://schemas.microsoft.com/office/mac/drawingml/2011/main" xmlns="" val="1"/>
+              <ma14:wrappingTextBoxFlag xmlns="" xmlns:ma14="http://schemas.microsoft.com/office/mac/drawingml/2011/main" val="1"/>
             </a:ext>
           </a:extLst>
         </p:spPr>
@@ -29623,7 +29623,7 @@
           </a:ln>
           <a:extLst>
             <a:ext uri="{C572A759-6A51-4108-AA02-DFA0A04FC94B}">
-              <ma14:wrappingTextBoxFlag xmlns:ma14="http://schemas.microsoft.com/office/mac/drawingml/2011/main" xmlns="" val="1"/>
+              <ma14:wrappingTextBoxFlag xmlns="" xmlns:ma14="http://schemas.microsoft.com/office/mac/drawingml/2011/main" val="1"/>
             </a:ext>
           </a:extLst>
         </p:spPr>
@@ -30142,7 +30142,7 @@
           </a:ln>
           <a:extLst>
             <a:ext uri="{C572A759-6A51-4108-AA02-DFA0A04FC94B}">
-              <ma14:wrappingTextBoxFlag xmlns:ma14="http://schemas.microsoft.com/office/mac/drawingml/2011/main" xmlns="" val="1"/>
+              <ma14:wrappingTextBoxFlag xmlns="" xmlns:ma14="http://schemas.microsoft.com/office/mac/drawingml/2011/main" val="1"/>
             </a:ext>
           </a:extLst>
         </p:spPr>
@@ -30177,7 +30177,7 @@
           </a:ln>
           <a:extLst>
             <a:ext uri="{C572A759-6A51-4108-AA02-DFA0A04FC94B}">
-              <ma14:wrappingTextBoxFlag xmlns:ma14="http://schemas.microsoft.com/office/mac/drawingml/2011/main" xmlns="" val="1"/>
+              <ma14:wrappingTextBoxFlag xmlns="" xmlns:ma14="http://schemas.microsoft.com/office/mac/drawingml/2011/main" val="1"/>
             </a:ext>
           </a:extLst>
         </p:spPr>
@@ -30212,7 +30212,7 @@
           </a:ln>
           <a:extLst>
             <a:ext uri="{C572A759-6A51-4108-AA02-DFA0A04FC94B}">
-              <ma14:wrappingTextBoxFlag xmlns:ma14="http://schemas.microsoft.com/office/mac/drawingml/2011/main" xmlns="" val="1"/>
+              <ma14:wrappingTextBoxFlag xmlns="" xmlns:ma14="http://schemas.microsoft.com/office/mac/drawingml/2011/main" val="1"/>
             </a:ext>
           </a:extLst>
         </p:spPr>
@@ -30247,7 +30247,7 @@
           </a:ln>
           <a:extLst>
             <a:ext uri="{C572A759-6A51-4108-AA02-DFA0A04FC94B}">
-              <ma14:wrappingTextBoxFlag xmlns:ma14="http://schemas.microsoft.com/office/mac/drawingml/2011/main" xmlns="" val="1"/>
+              <ma14:wrappingTextBoxFlag xmlns="" xmlns:ma14="http://schemas.microsoft.com/office/mac/drawingml/2011/main" val="1"/>
             </a:ext>
           </a:extLst>
         </p:spPr>
@@ -30282,7 +30282,7 @@
           </a:ln>
           <a:extLst>
             <a:ext uri="{C572A759-6A51-4108-AA02-DFA0A04FC94B}">
-              <ma14:wrappingTextBoxFlag xmlns:ma14="http://schemas.microsoft.com/office/mac/drawingml/2011/main" xmlns="" val="1"/>
+              <ma14:wrappingTextBoxFlag xmlns="" xmlns:ma14="http://schemas.microsoft.com/office/mac/drawingml/2011/main" val="1"/>
             </a:ext>
           </a:extLst>
         </p:spPr>
@@ -30801,7 +30801,7 @@
           </a:ln>
           <a:extLst>
             <a:ext uri="{C572A759-6A51-4108-AA02-DFA0A04FC94B}">
-              <ma14:wrappingTextBoxFlag xmlns:ma14="http://schemas.microsoft.com/office/mac/drawingml/2011/main" xmlns="" val="1"/>
+              <ma14:wrappingTextBoxFlag xmlns="" xmlns:ma14="http://schemas.microsoft.com/office/mac/drawingml/2011/main" val="1"/>
             </a:ext>
           </a:extLst>
         </p:spPr>
@@ -30836,7 +30836,7 @@
           </a:ln>
           <a:extLst>
             <a:ext uri="{C572A759-6A51-4108-AA02-DFA0A04FC94B}">
-              <ma14:wrappingTextBoxFlag xmlns:ma14="http://schemas.microsoft.com/office/mac/drawingml/2011/main" xmlns="" val="1"/>
+              <ma14:wrappingTextBoxFlag xmlns="" xmlns:ma14="http://schemas.microsoft.com/office/mac/drawingml/2011/main" val="1"/>
             </a:ext>
           </a:extLst>
         </p:spPr>
@@ -30871,7 +30871,7 @@
           </a:ln>
           <a:extLst>
             <a:ext uri="{C572A759-6A51-4108-AA02-DFA0A04FC94B}">
-              <ma14:wrappingTextBoxFlag xmlns:ma14="http://schemas.microsoft.com/office/mac/drawingml/2011/main" xmlns="" val="1"/>
+              <ma14:wrappingTextBoxFlag xmlns="" xmlns:ma14="http://schemas.microsoft.com/office/mac/drawingml/2011/main" val="1"/>
             </a:ext>
           </a:extLst>
         </p:spPr>
@@ -30906,7 +30906,7 @@
           </a:ln>
           <a:extLst>
             <a:ext uri="{C572A759-6A51-4108-AA02-DFA0A04FC94B}">
-              <ma14:wrappingTextBoxFlag xmlns:ma14="http://schemas.microsoft.com/office/mac/drawingml/2011/main" xmlns="" val="1"/>
+              <ma14:wrappingTextBoxFlag xmlns="" xmlns:ma14="http://schemas.microsoft.com/office/mac/drawingml/2011/main" val="1"/>
             </a:ext>
           </a:extLst>
         </p:spPr>
@@ -30941,7 +30941,7 @@
           </a:ln>
           <a:extLst>
             <a:ext uri="{C572A759-6A51-4108-AA02-DFA0A04FC94B}">
-              <ma14:wrappingTextBoxFlag xmlns:ma14="http://schemas.microsoft.com/office/mac/drawingml/2011/main" xmlns="" val="1"/>
+              <ma14:wrappingTextBoxFlag xmlns="" xmlns:ma14="http://schemas.microsoft.com/office/mac/drawingml/2011/main" val="1"/>
             </a:ext>
           </a:extLst>
         </p:spPr>
@@ -31460,7 +31460,7 @@
           </a:ln>
           <a:extLst>
             <a:ext uri="{C572A759-6A51-4108-AA02-DFA0A04FC94B}">
-              <ma14:wrappingTextBoxFlag xmlns:ma14="http://schemas.microsoft.com/office/mac/drawingml/2011/main" xmlns="" val="1"/>
+              <ma14:wrappingTextBoxFlag xmlns="" xmlns:ma14="http://schemas.microsoft.com/office/mac/drawingml/2011/main" val="1"/>
             </a:ext>
           </a:extLst>
         </p:spPr>
@@ -31495,7 +31495,7 @@
           </a:ln>
           <a:extLst>
             <a:ext uri="{C572A759-6A51-4108-AA02-DFA0A04FC94B}">
-              <ma14:wrappingTextBoxFlag xmlns:ma14="http://schemas.microsoft.com/office/mac/drawingml/2011/main" xmlns="" val="1"/>
+              <ma14:wrappingTextBoxFlag xmlns="" xmlns:ma14="http://schemas.microsoft.com/office/mac/drawingml/2011/main" val="1"/>
             </a:ext>
           </a:extLst>
         </p:spPr>
@@ -31530,7 +31530,7 @@
           </a:ln>
           <a:extLst>
             <a:ext uri="{C572A759-6A51-4108-AA02-DFA0A04FC94B}">
-              <ma14:wrappingTextBoxFlag xmlns:ma14="http://schemas.microsoft.com/office/mac/drawingml/2011/main" xmlns="" val="1"/>
+              <ma14:wrappingTextBoxFlag xmlns="" xmlns:ma14="http://schemas.microsoft.com/office/mac/drawingml/2011/main" val="1"/>
             </a:ext>
           </a:extLst>
         </p:spPr>
@@ -31565,7 +31565,7 @@
           </a:ln>
           <a:extLst>
             <a:ext uri="{C572A759-6A51-4108-AA02-DFA0A04FC94B}">
-              <ma14:wrappingTextBoxFlag xmlns:ma14="http://schemas.microsoft.com/office/mac/drawingml/2011/main" xmlns="" val="1"/>
+              <ma14:wrappingTextBoxFlag xmlns="" xmlns:ma14="http://schemas.microsoft.com/office/mac/drawingml/2011/main" val="1"/>
             </a:ext>
           </a:extLst>
         </p:spPr>
@@ -31600,7 +31600,7 @@
           </a:ln>
           <a:extLst>
             <a:ext uri="{C572A759-6A51-4108-AA02-DFA0A04FC94B}">
-              <ma14:wrappingTextBoxFlag xmlns:ma14="http://schemas.microsoft.com/office/mac/drawingml/2011/main" xmlns="" val="1"/>
+              <ma14:wrappingTextBoxFlag xmlns="" xmlns:ma14="http://schemas.microsoft.com/office/mac/drawingml/2011/main" val="1"/>
             </a:ext>
           </a:extLst>
         </p:spPr>
@@ -32119,7 +32119,7 @@
           </a:ln>
           <a:extLst>
             <a:ext uri="{C572A759-6A51-4108-AA02-DFA0A04FC94B}">
-              <ma14:wrappingTextBoxFlag xmlns:ma14="http://schemas.microsoft.com/office/mac/drawingml/2011/main" xmlns="" val="1"/>
+              <ma14:wrappingTextBoxFlag xmlns="" xmlns:ma14="http://schemas.microsoft.com/office/mac/drawingml/2011/main" val="1"/>
             </a:ext>
           </a:extLst>
         </p:spPr>
@@ -32154,7 +32154,7 @@
           </a:ln>
           <a:extLst>
             <a:ext uri="{C572A759-6A51-4108-AA02-DFA0A04FC94B}">
-              <ma14:wrappingTextBoxFlag xmlns:ma14="http://schemas.microsoft.com/office/mac/drawingml/2011/main" xmlns="" val="1"/>
+              <ma14:wrappingTextBoxFlag xmlns="" xmlns:ma14="http://schemas.microsoft.com/office/mac/drawingml/2011/main" val="1"/>
             </a:ext>
           </a:extLst>
         </p:spPr>
@@ -32189,7 +32189,7 @@
           </a:ln>
           <a:extLst>
             <a:ext uri="{C572A759-6A51-4108-AA02-DFA0A04FC94B}">
-              <ma14:wrappingTextBoxFlag xmlns:ma14="http://schemas.microsoft.com/office/mac/drawingml/2011/main" xmlns="" val="1"/>
+              <ma14:wrappingTextBoxFlag xmlns="" xmlns:ma14="http://schemas.microsoft.com/office/mac/drawingml/2011/main" val="1"/>
             </a:ext>
           </a:extLst>
         </p:spPr>
@@ -32224,7 +32224,7 @@
           </a:ln>
           <a:extLst>
             <a:ext uri="{C572A759-6A51-4108-AA02-DFA0A04FC94B}">
-              <ma14:wrappingTextBoxFlag xmlns:ma14="http://schemas.microsoft.com/office/mac/drawingml/2011/main" xmlns="" val="1"/>
+              <ma14:wrappingTextBoxFlag xmlns="" xmlns:ma14="http://schemas.microsoft.com/office/mac/drawingml/2011/main" val="1"/>
             </a:ext>
           </a:extLst>
         </p:spPr>
@@ -32259,7 +32259,7 @@
           </a:ln>
           <a:extLst>
             <a:ext uri="{C572A759-6A51-4108-AA02-DFA0A04FC94B}">
-              <ma14:wrappingTextBoxFlag xmlns:ma14="http://schemas.microsoft.com/office/mac/drawingml/2011/main" xmlns="" val="1"/>
+              <ma14:wrappingTextBoxFlag xmlns="" xmlns:ma14="http://schemas.microsoft.com/office/mac/drawingml/2011/main" val="1"/>
             </a:ext>
           </a:extLst>
         </p:spPr>
@@ -32778,7 +32778,7 @@
           </a:ln>
           <a:extLst>
             <a:ext uri="{C572A759-6A51-4108-AA02-DFA0A04FC94B}">
-              <ma14:wrappingTextBoxFlag xmlns:ma14="http://schemas.microsoft.com/office/mac/drawingml/2011/main" xmlns="" val="1"/>
+              <ma14:wrappingTextBoxFlag xmlns="" xmlns:ma14="http://schemas.microsoft.com/office/mac/drawingml/2011/main" val="1"/>
             </a:ext>
           </a:extLst>
         </p:spPr>
@@ -32813,7 +32813,7 @@
           </a:ln>
           <a:extLst>
             <a:ext uri="{C572A759-6A51-4108-AA02-DFA0A04FC94B}">
-              <ma14:wrappingTextBoxFlag xmlns:ma14="http://schemas.microsoft.com/office/mac/drawingml/2011/main" xmlns="" val="1"/>
+              <ma14:wrappingTextBoxFlag xmlns="" xmlns:ma14="http://schemas.microsoft.com/office/mac/drawingml/2011/main" val="1"/>
             </a:ext>
           </a:extLst>
         </p:spPr>
@@ -32848,7 +32848,7 @@
           </a:ln>
           <a:extLst>
             <a:ext uri="{C572A759-6A51-4108-AA02-DFA0A04FC94B}">
-              <ma14:wrappingTextBoxFlag xmlns:ma14="http://schemas.microsoft.com/office/mac/drawingml/2011/main" xmlns="" val="1"/>
+              <ma14:wrappingTextBoxFlag xmlns="" xmlns:ma14="http://schemas.microsoft.com/office/mac/drawingml/2011/main" val="1"/>
             </a:ext>
           </a:extLst>
         </p:spPr>
@@ -32883,7 +32883,7 @@
           </a:ln>
           <a:extLst>
             <a:ext uri="{C572A759-6A51-4108-AA02-DFA0A04FC94B}">
-              <ma14:wrappingTextBoxFlag xmlns:ma14="http://schemas.microsoft.com/office/mac/drawingml/2011/main" xmlns="" val="1"/>
+              <ma14:wrappingTextBoxFlag xmlns="" xmlns:ma14="http://schemas.microsoft.com/office/mac/drawingml/2011/main" val="1"/>
             </a:ext>
           </a:extLst>
         </p:spPr>
@@ -32918,7 +32918,7 @@
           </a:ln>
           <a:extLst>
             <a:ext uri="{C572A759-6A51-4108-AA02-DFA0A04FC94B}">
-              <ma14:wrappingTextBoxFlag xmlns:ma14="http://schemas.microsoft.com/office/mac/drawingml/2011/main" xmlns="" val="1"/>
+              <ma14:wrappingTextBoxFlag xmlns="" xmlns:ma14="http://schemas.microsoft.com/office/mac/drawingml/2011/main" val="1"/>
             </a:ext>
           </a:extLst>
         </p:spPr>
@@ -33437,7 +33437,7 @@
           </a:ln>
           <a:extLst>
             <a:ext uri="{C572A759-6A51-4108-AA02-DFA0A04FC94B}">
-              <ma14:wrappingTextBoxFlag xmlns:ma14="http://schemas.microsoft.com/office/mac/drawingml/2011/main" xmlns="" val="1"/>
+              <ma14:wrappingTextBoxFlag xmlns="" xmlns:ma14="http://schemas.microsoft.com/office/mac/drawingml/2011/main" val="1"/>
             </a:ext>
           </a:extLst>
         </p:spPr>
@@ -33472,7 +33472,7 @@
           </a:ln>
           <a:extLst>
             <a:ext uri="{C572A759-6A51-4108-AA02-DFA0A04FC94B}">
-              <ma14:wrappingTextBoxFlag xmlns:ma14="http://schemas.microsoft.com/office/mac/drawingml/2011/main" xmlns="" val="1"/>
+              <ma14:wrappingTextBoxFlag xmlns="" xmlns:ma14="http://schemas.microsoft.com/office/mac/drawingml/2011/main" val="1"/>
             </a:ext>
           </a:extLst>
         </p:spPr>
@@ -33507,7 +33507,7 @@
           </a:ln>
           <a:extLst>
             <a:ext uri="{C572A759-6A51-4108-AA02-DFA0A04FC94B}">
-              <ma14:wrappingTextBoxFlag xmlns:ma14="http://schemas.microsoft.com/office/mac/drawingml/2011/main" xmlns="" val="1"/>
+              <ma14:wrappingTextBoxFlag xmlns="" xmlns:ma14="http://schemas.microsoft.com/office/mac/drawingml/2011/main" val="1"/>
             </a:ext>
           </a:extLst>
         </p:spPr>
@@ -33542,7 +33542,7 @@
           </a:ln>
           <a:extLst>
             <a:ext uri="{C572A759-6A51-4108-AA02-DFA0A04FC94B}">
-              <ma14:wrappingTextBoxFlag xmlns:ma14="http://schemas.microsoft.com/office/mac/drawingml/2011/main" xmlns="" val="1"/>
+              <ma14:wrappingTextBoxFlag xmlns="" xmlns:ma14="http://schemas.microsoft.com/office/mac/drawingml/2011/main" val="1"/>
             </a:ext>
           </a:extLst>
         </p:spPr>
@@ -33577,7 +33577,7 @@
           </a:ln>
           <a:extLst>
             <a:ext uri="{C572A759-6A51-4108-AA02-DFA0A04FC94B}">
-              <ma14:wrappingTextBoxFlag xmlns:ma14="http://schemas.microsoft.com/office/mac/drawingml/2011/main" xmlns="" val="1"/>
+              <ma14:wrappingTextBoxFlag xmlns="" xmlns:ma14="http://schemas.microsoft.com/office/mac/drawingml/2011/main" val="1"/>
             </a:ext>
           </a:extLst>
         </p:spPr>
@@ -34096,7 +34096,7 @@
           </a:ln>
           <a:extLst>
             <a:ext uri="{C572A759-6A51-4108-AA02-DFA0A04FC94B}">
-              <ma14:wrappingTextBoxFlag xmlns:ma14="http://schemas.microsoft.com/office/mac/drawingml/2011/main" xmlns="" val="1"/>
+              <ma14:wrappingTextBoxFlag xmlns="" xmlns:ma14="http://schemas.microsoft.com/office/mac/drawingml/2011/main" val="1"/>
             </a:ext>
           </a:extLst>
         </p:spPr>
@@ -34131,7 +34131,7 @@
           </a:ln>
           <a:extLst>
             <a:ext uri="{C572A759-6A51-4108-AA02-DFA0A04FC94B}">
-              <ma14:wrappingTextBoxFlag xmlns:ma14="http://schemas.microsoft.com/office/mac/drawingml/2011/main" xmlns="" val="1"/>
+              <ma14:wrappingTextBoxFlag xmlns="" xmlns:ma14="http://schemas.microsoft.com/office/mac/drawingml/2011/main" val="1"/>
             </a:ext>
           </a:extLst>
         </p:spPr>
@@ -34166,7 +34166,7 @@
           </a:ln>
           <a:extLst>
             <a:ext uri="{C572A759-6A51-4108-AA02-DFA0A04FC94B}">
-              <ma14:wrappingTextBoxFlag xmlns:ma14="http://schemas.microsoft.com/office/mac/drawingml/2011/main" xmlns="" val="1"/>
+              <ma14:wrappingTextBoxFlag xmlns="" xmlns:ma14="http://schemas.microsoft.com/office/mac/drawingml/2011/main" val="1"/>
             </a:ext>
           </a:extLst>
         </p:spPr>
@@ -34201,7 +34201,7 @@
           </a:ln>
           <a:extLst>
             <a:ext uri="{C572A759-6A51-4108-AA02-DFA0A04FC94B}">
-              <ma14:wrappingTextBoxFlag xmlns:ma14="http://schemas.microsoft.com/office/mac/drawingml/2011/main" xmlns="" val="1"/>
+              <ma14:wrappingTextBoxFlag xmlns="" xmlns:ma14="http://schemas.microsoft.com/office/mac/drawingml/2011/main" val="1"/>
             </a:ext>
           </a:extLst>
         </p:spPr>
@@ -34236,7 +34236,7 @@
           </a:ln>
           <a:extLst>
             <a:ext uri="{C572A759-6A51-4108-AA02-DFA0A04FC94B}">
-              <ma14:wrappingTextBoxFlag xmlns:ma14="http://schemas.microsoft.com/office/mac/drawingml/2011/main" xmlns="" val="1"/>
+              <ma14:wrappingTextBoxFlag xmlns="" xmlns:ma14="http://schemas.microsoft.com/office/mac/drawingml/2011/main" val="1"/>
             </a:ext>
           </a:extLst>
         </p:spPr>
@@ -34755,7 +34755,7 @@
           </a:ln>
           <a:extLst>
             <a:ext uri="{C572A759-6A51-4108-AA02-DFA0A04FC94B}">
-              <ma14:wrappingTextBoxFlag xmlns:ma14="http://schemas.microsoft.com/office/mac/drawingml/2011/main" xmlns="" val="1"/>
+              <ma14:wrappingTextBoxFlag xmlns="" xmlns:ma14="http://schemas.microsoft.com/office/mac/drawingml/2011/main" val="1"/>
             </a:ext>
           </a:extLst>
         </p:spPr>
@@ -34790,7 +34790,7 @@
           </a:ln>
           <a:extLst>
             <a:ext uri="{C572A759-6A51-4108-AA02-DFA0A04FC94B}">
-              <ma14:wrappingTextBoxFlag xmlns:ma14="http://schemas.microsoft.com/office/mac/drawingml/2011/main" xmlns="" val="1"/>
+              <ma14:wrappingTextBoxFlag xmlns="" xmlns:ma14="http://schemas.microsoft.com/office/mac/drawingml/2011/main" val="1"/>
             </a:ext>
           </a:extLst>
         </p:spPr>
@@ -34825,7 +34825,7 @@
           </a:ln>
           <a:extLst>
             <a:ext uri="{C572A759-6A51-4108-AA02-DFA0A04FC94B}">
-              <ma14:wrappingTextBoxFlag xmlns:ma14="http://schemas.microsoft.com/office/mac/drawingml/2011/main" xmlns="" val="1"/>
+              <ma14:wrappingTextBoxFlag xmlns="" xmlns:ma14="http://schemas.microsoft.com/office/mac/drawingml/2011/main" val="1"/>
             </a:ext>
           </a:extLst>
         </p:spPr>
@@ -34860,7 +34860,7 @@
           </a:ln>
           <a:extLst>
             <a:ext uri="{C572A759-6A51-4108-AA02-DFA0A04FC94B}">
-              <ma14:wrappingTextBoxFlag xmlns:ma14="http://schemas.microsoft.com/office/mac/drawingml/2011/main" xmlns="" val="1"/>
+              <ma14:wrappingTextBoxFlag xmlns="" xmlns:ma14="http://schemas.microsoft.com/office/mac/drawingml/2011/main" val="1"/>
             </a:ext>
           </a:extLst>
         </p:spPr>
@@ -34895,7 +34895,7 @@
           </a:ln>
           <a:extLst>
             <a:ext uri="{C572A759-6A51-4108-AA02-DFA0A04FC94B}">
-              <ma14:wrappingTextBoxFlag xmlns:ma14="http://schemas.microsoft.com/office/mac/drawingml/2011/main" xmlns="" val="1"/>
+              <ma14:wrappingTextBoxFlag xmlns="" xmlns:ma14="http://schemas.microsoft.com/office/mac/drawingml/2011/main" val="1"/>
             </a:ext>
           </a:extLst>
         </p:spPr>
@@ -35018,7 +35018,7 @@
           </a:ln>
           <a:extLst>
             <a:ext uri="{C572A759-6A51-4108-AA02-DFA0A04FC94B}">
-              <ma14:wrappingTextBoxFlag xmlns:ma14="http://schemas.microsoft.com/office/mac/drawingml/2011/main" xmlns="" val="1"/>
+              <ma14:wrappingTextBoxFlag xmlns="" xmlns:ma14="http://schemas.microsoft.com/office/mac/drawingml/2011/main" val="1"/>
             </a:ext>
           </a:extLst>
         </p:spPr>
@@ -35065,7 +35065,7 @@
           </a:ln>
           <a:extLst>
             <a:ext uri="{C572A759-6A51-4108-AA02-DFA0A04FC94B}">
-              <ma14:wrappingTextBoxFlag xmlns:ma14="http://schemas.microsoft.com/office/mac/drawingml/2011/main" xmlns="" val="1"/>
+              <ma14:wrappingTextBoxFlag xmlns="" xmlns:ma14="http://schemas.microsoft.com/office/mac/drawingml/2011/main" val="1"/>
             </a:ext>
           </a:extLst>
         </p:spPr>
@@ -35112,7 +35112,7 @@
           </a:ln>
           <a:extLst>
             <a:ext uri="{C572A759-6A51-4108-AA02-DFA0A04FC94B}">
-              <ma14:wrappingTextBoxFlag xmlns:ma14="http://schemas.microsoft.com/office/mac/drawingml/2011/main" xmlns="" val="1"/>
+              <ma14:wrappingTextBoxFlag xmlns="" xmlns:ma14="http://schemas.microsoft.com/office/mac/drawingml/2011/main" val="1"/>
             </a:ext>
           </a:extLst>
         </p:spPr>
@@ -35159,7 +35159,7 @@
           </a:ln>
           <a:extLst>
             <a:ext uri="{C572A759-6A51-4108-AA02-DFA0A04FC94B}">
-              <ma14:wrappingTextBoxFlag xmlns:ma14="http://schemas.microsoft.com/office/mac/drawingml/2011/main" xmlns="" val="1"/>
+              <ma14:wrappingTextBoxFlag xmlns="" xmlns:ma14="http://schemas.microsoft.com/office/mac/drawingml/2011/main" val="1"/>
             </a:ext>
           </a:extLst>
         </p:spPr>
@@ -35203,7 +35203,7 @@
           </a:ln>
           <a:extLst>
             <a:ext uri="{C572A759-6A51-4108-AA02-DFA0A04FC94B}">
-              <ma14:wrappingTextBoxFlag xmlns:ma14="http://schemas.microsoft.com/office/mac/drawingml/2011/main" xmlns="" val="1"/>
+              <ma14:wrappingTextBoxFlag xmlns="" xmlns:ma14="http://schemas.microsoft.com/office/mac/drawingml/2011/main" val="1"/>
             </a:ext>
           </a:extLst>
         </p:spPr>
@@ -35244,7 +35244,7 @@
           </a:ln>
           <a:extLst>
             <a:ext uri="{C572A759-6A51-4108-AA02-DFA0A04FC94B}">
-              <ma14:wrappingTextBoxFlag xmlns:ma14="http://schemas.microsoft.com/office/mac/drawingml/2011/main" xmlns="" val="1"/>
+              <ma14:wrappingTextBoxFlag xmlns="" xmlns:ma14="http://schemas.microsoft.com/office/mac/drawingml/2011/main" val="1"/>
             </a:ext>
           </a:extLst>
         </p:spPr>
@@ -35879,7 +35879,7 @@
           </a:ln>
           <a:extLst>
             <a:ext uri="{C572A759-6A51-4108-AA02-DFA0A04FC94B}">
-              <ma14:wrappingTextBoxFlag xmlns:ma14="http://schemas.microsoft.com/office/mac/drawingml/2011/main" xmlns="" val="1"/>
+              <ma14:wrappingTextBoxFlag xmlns="" xmlns:ma14="http://schemas.microsoft.com/office/mac/drawingml/2011/main" val="1"/>
             </a:ext>
           </a:extLst>
         </p:spPr>
@@ -35914,7 +35914,7 @@
           </a:ln>
           <a:extLst>
             <a:ext uri="{C572A759-6A51-4108-AA02-DFA0A04FC94B}">
-              <ma14:wrappingTextBoxFlag xmlns:ma14="http://schemas.microsoft.com/office/mac/drawingml/2011/main" xmlns="" val="1"/>
+              <ma14:wrappingTextBoxFlag xmlns="" xmlns:ma14="http://schemas.microsoft.com/office/mac/drawingml/2011/main" val="1"/>
             </a:ext>
           </a:extLst>
         </p:spPr>
@@ -35949,7 +35949,7 @@
           </a:ln>
           <a:extLst>
             <a:ext uri="{C572A759-6A51-4108-AA02-DFA0A04FC94B}">
-              <ma14:wrappingTextBoxFlag xmlns:ma14="http://schemas.microsoft.com/office/mac/drawingml/2011/main" xmlns="" val="1"/>
+              <ma14:wrappingTextBoxFlag xmlns="" xmlns:ma14="http://schemas.microsoft.com/office/mac/drawingml/2011/main" val="1"/>
             </a:ext>
           </a:extLst>
         </p:spPr>
@@ -35984,7 +35984,7 @@
           </a:ln>
           <a:extLst>
             <a:ext uri="{C572A759-6A51-4108-AA02-DFA0A04FC94B}">
-              <ma14:wrappingTextBoxFlag xmlns:ma14="http://schemas.microsoft.com/office/mac/drawingml/2011/main" xmlns="" val="1"/>
+              <ma14:wrappingTextBoxFlag xmlns="" xmlns:ma14="http://schemas.microsoft.com/office/mac/drawingml/2011/main" val="1"/>
             </a:ext>
           </a:extLst>
         </p:spPr>
@@ -36019,7 +36019,7 @@
           </a:ln>
           <a:extLst>
             <a:ext uri="{C572A759-6A51-4108-AA02-DFA0A04FC94B}">
-              <ma14:wrappingTextBoxFlag xmlns:ma14="http://schemas.microsoft.com/office/mac/drawingml/2011/main" xmlns="" val="1"/>
+              <ma14:wrappingTextBoxFlag xmlns="" xmlns:ma14="http://schemas.microsoft.com/office/mac/drawingml/2011/main" val="1"/>
             </a:ext>
           </a:extLst>
         </p:spPr>
@@ -36538,7 +36538,7 @@
           </a:ln>
           <a:extLst>
             <a:ext uri="{C572A759-6A51-4108-AA02-DFA0A04FC94B}">
-              <ma14:wrappingTextBoxFlag xmlns:ma14="http://schemas.microsoft.com/office/mac/drawingml/2011/main" xmlns="" val="1"/>
+              <ma14:wrappingTextBoxFlag xmlns="" xmlns:ma14="http://schemas.microsoft.com/office/mac/drawingml/2011/main" val="1"/>
             </a:ext>
           </a:extLst>
         </p:spPr>
@@ -36573,7 +36573,7 @@
           </a:ln>
           <a:extLst>
             <a:ext uri="{C572A759-6A51-4108-AA02-DFA0A04FC94B}">
-              <ma14:wrappingTextBoxFlag xmlns:ma14="http://schemas.microsoft.com/office/mac/drawingml/2011/main" xmlns="" val="1"/>
+              <ma14:wrappingTextBoxFlag xmlns="" xmlns:ma14="http://schemas.microsoft.com/office/mac/drawingml/2011/main" val="1"/>
             </a:ext>
           </a:extLst>
         </p:spPr>
@@ -36608,7 +36608,7 @@
           </a:ln>
           <a:extLst>
             <a:ext uri="{C572A759-6A51-4108-AA02-DFA0A04FC94B}">
-              <ma14:wrappingTextBoxFlag xmlns:ma14="http://schemas.microsoft.com/office/mac/drawingml/2011/main" xmlns="" val="1"/>
+              <ma14:wrappingTextBoxFlag xmlns="" xmlns:ma14="http://schemas.microsoft.com/office/mac/drawingml/2011/main" val="1"/>
             </a:ext>
           </a:extLst>
         </p:spPr>
@@ -36643,7 +36643,7 @@
           </a:ln>
           <a:extLst>
             <a:ext uri="{C572A759-6A51-4108-AA02-DFA0A04FC94B}">
-              <ma14:wrappingTextBoxFlag xmlns:ma14="http://schemas.microsoft.com/office/mac/drawingml/2011/main" xmlns="" val="1"/>
+              <ma14:wrappingTextBoxFlag xmlns="" xmlns:ma14="http://schemas.microsoft.com/office/mac/drawingml/2011/main" val="1"/>
             </a:ext>
           </a:extLst>
         </p:spPr>
@@ -36678,7 +36678,7 @@
           </a:ln>
           <a:extLst>
             <a:ext uri="{C572A759-6A51-4108-AA02-DFA0A04FC94B}">
-              <ma14:wrappingTextBoxFlag xmlns:ma14="http://schemas.microsoft.com/office/mac/drawingml/2011/main" xmlns="" val="1"/>
+              <ma14:wrappingTextBoxFlag xmlns="" xmlns:ma14="http://schemas.microsoft.com/office/mac/drawingml/2011/main" val="1"/>
             </a:ext>
           </a:extLst>
         </p:spPr>
@@ -37197,7 +37197,7 @@
           </a:ln>
           <a:extLst>
             <a:ext uri="{C572A759-6A51-4108-AA02-DFA0A04FC94B}">
-              <ma14:wrappingTextBoxFlag xmlns:ma14="http://schemas.microsoft.com/office/mac/drawingml/2011/main" xmlns="" val="1"/>
+              <ma14:wrappingTextBoxFlag xmlns="" xmlns:ma14="http://schemas.microsoft.com/office/mac/drawingml/2011/main" val="1"/>
             </a:ext>
           </a:extLst>
         </p:spPr>
@@ -37232,7 +37232,7 @@
           </a:ln>
           <a:extLst>
             <a:ext uri="{C572A759-6A51-4108-AA02-DFA0A04FC94B}">
-              <ma14:wrappingTextBoxFlag xmlns:ma14="http://schemas.microsoft.com/office/mac/drawingml/2011/main" xmlns="" val="1"/>
+              <ma14:wrappingTextBoxFlag xmlns="" xmlns:ma14="http://schemas.microsoft.com/office/mac/drawingml/2011/main" val="1"/>
             </a:ext>
           </a:extLst>
         </p:spPr>
@@ -37267,7 +37267,7 @@
           </a:ln>
           <a:extLst>
             <a:ext uri="{C572A759-6A51-4108-AA02-DFA0A04FC94B}">
-              <ma14:wrappingTextBoxFlag xmlns:ma14="http://schemas.microsoft.com/office/mac/drawingml/2011/main" xmlns="" val="1"/>
+              <ma14:wrappingTextBoxFlag xmlns="" xmlns:ma14="http://schemas.microsoft.com/office/mac/drawingml/2011/main" val="1"/>
             </a:ext>
           </a:extLst>
         </p:spPr>
@@ -37302,7 +37302,7 @@
           </a:ln>
           <a:extLst>
             <a:ext uri="{C572A759-6A51-4108-AA02-DFA0A04FC94B}">
-              <ma14:wrappingTextBoxFlag xmlns:ma14="http://schemas.microsoft.com/office/mac/drawingml/2011/main" xmlns="" val="1"/>
+              <ma14:wrappingTextBoxFlag xmlns="" xmlns:ma14="http://schemas.microsoft.com/office/mac/drawingml/2011/main" val="1"/>
             </a:ext>
           </a:extLst>
         </p:spPr>
@@ -37337,7 +37337,7 @@
           </a:ln>
           <a:extLst>
             <a:ext uri="{C572A759-6A51-4108-AA02-DFA0A04FC94B}">
-              <ma14:wrappingTextBoxFlag xmlns:ma14="http://schemas.microsoft.com/office/mac/drawingml/2011/main" xmlns="" val="1"/>
+              <ma14:wrappingTextBoxFlag xmlns="" xmlns:ma14="http://schemas.microsoft.com/office/mac/drawingml/2011/main" val="1"/>
             </a:ext>
           </a:extLst>
         </p:spPr>
@@ -37856,7 +37856,7 @@
           </a:ln>
           <a:extLst>
             <a:ext uri="{C572A759-6A51-4108-AA02-DFA0A04FC94B}">
-              <ma14:wrappingTextBoxFlag xmlns:ma14="http://schemas.microsoft.com/office/mac/drawingml/2011/main" xmlns="" val="1"/>
+              <ma14:wrappingTextBoxFlag xmlns="" xmlns:ma14="http://schemas.microsoft.com/office/mac/drawingml/2011/main" val="1"/>
             </a:ext>
           </a:extLst>
         </p:spPr>
@@ -37891,7 +37891,7 @@
           </a:ln>
           <a:extLst>
             <a:ext uri="{C572A759-6A51-4108-AA02-DFA0A04FC94B}">
-              <ma14:wrappingTextBoxFlag xmlns:ma14="http://schemas.microsoft.com/office/mac/drawingml/2011/main" xmlns="" val="1"/>
+              <ma14:wrappingTextBoxFlag xmlns="" xmlns:ma14="http://schemas.microsoft.com/office/mac/drawingml/2011/main" val="1"/>
             </a:ext>
           </a:extLst>
         </p:spPr>
@@ -37926,7 +37926,7 @@
           </a:ln>
           <a:extLst>
             <a:ext uri="{C572A759-6A51-4108-AA02-DFA0A04FC94B}">
-              <ma14:wrappingTextBoxFlag xmlns:ma14="http://schemas.microsoft.com/office/mac/drawingml/2011/main" xmlns="" val="1"/>
+              <ma14:wrappingTextBoxFlag xmlns="" xmlns:ma14="http://schemas.microsoft.com/office/mac/drawingml/2011/main" val="1"/>
             </a:ext>
           </a:extLst>
         </p:spPr>
@@ -37961,7 +37961,7 @@
           </a:ln>
           <a:extLst>
             <a:ext uri="{C572A759-6A51-4108-AA02-DFA0A04FC94B}">
-              <ma14:wrappingTextBoxFlag xmlns:ma14="http://schemas.microsoft.com/office/mac/drawingml/2011/main" xmlns="" val="1"/>
+              <ma14:wrappingTextBoxFlag xmlns="" xmlns:ma14="http://schemas.microsoft.com/office/mac/drawingml/2011/main" val="1"/>
             </a:ext>
           </a:extLst>
         </p:spPr>
@@ -37996,7 +37996,7 @@
           </a:ln>
           <a:extLst>
             <a:ext uri="{C572A759-6A51-4108-AA02-DFA0A04FC94B}">
-              <ma14:wrappingTextBoxFlag xmlns:ma14="http://schemas.microsoft.com/office/mac/drawingml/2011/main" xmlns="" val="1"/>
+              <ma14:wrappingTextBoxFlag xmlns="" xmlns:ma14="http://schemas.microsoft.com/office/mac/drawingml/2011/main" val="1"/>
             </a:ext>
           </a:extLst>
         </p:spPr>
@@ -38515,7 +38515,7 @@
           </a:ln>
           <a:extLst>
             <a:ext uri="{C572A759-6A51-4108-AA02-DFA0A04FC94B}">
-              <ma14:wrappingTextBoxFlag xmlns:ma14="http://schemas.microsoft.com/office/mac/drawingml/2011/main" xmlns="" val="1"/>
+              <ma14:wrappingTextBoxFlag xmlns="" xmlns:ma14="http://schemas.microsoft.com/office/mac/drawingml/2011/main" val="1"/>
             </a:ext>
           </a:extLst>
         </p:spPr>
@@ -38550,7 +38550,7 @@
           </a:ln>
           <a:extLst>
             <a:ext uri="{C572A759-6A51-4108-AA02-DFA0A04FC94B}">
-              <ma14:wrappingTextBoxFlag xmlns:ma14="http://schemas.microsoft.com/office/mac/drawingml/2011/main" xmlns="" val="1"/>
+              <ma14:wrappingTextBoxFlag xmlns="" xmlns:ma14="http://schemas.microsoft.com/office/mac/drawingml/2011/main" val="1"/>
             </a:ext>
           </a:extLst>
         </p:spPr>
@@ -38585,7 +38585,7 @@
           </a:ln>
           <a:extLst>
             <a:ext uri="{C572A759-6A51-4108-AA02-DFA0A04FC94B}">
-              <ma14:wrappingTextBoxFlag xmlns:ma14="http://schemas.microsoft.com/office/mac/drawingml/2011/main" xmlns="" val="1"/>
+              <ma14:wrappingTextBoxFlag xmlns="" xmlns:ma14="http://schemas.microsoft.com/office/mac/drawingml/2011/main" val="1"/>
             </a:ext>
           </a:extLst>
         </p:spPr>
@@ -38620,7 +38620,7 @@
           </a:ln>
           <a:extLst>
             <a:ext uri="{C572A759-6A51-4108-AA02-DFA0A04FC94B}">
-              <ma14:wrappingTextBoxFlag xmlns:ma14="http://schemas.microsoft.com/office/mac/drawingml/2011/main" xmlns="" val="1"/>
+              <ma14:wrappingTextBoxFlag xmlns="" xmlns:ma14="http://schemas.microsoft.com/office/mac/drawingml/2011/main" val="1"/>
             </a:ext>
           </a:extLst>
         </p:spPr>
@@ -38655,7 +38655,7 @@
           </a:ln>
           <a:extLst>
             <a:ext uri="{C572A759-6A51-4108-AA02-DFA0A04FC94B}">
-              <ma14:wrappingTextBoxFlag xmlns:ma14="http://schemas.microsoft.com/office/mac/drawingml/2011/main" xmlns="" val="1"/>
+              <ma14:wrappingTextBoxFlag xmlns="" xmlns:ma14="http://schemas.microsoft.com/office/mac/drawingml/2011/main" val="1"/>
             </a:ext>
           </a:extLst>
         </p:spPr>
@@ -39174,7 +39174,7 @@
           </a:ln>
           <a:extLst>
             <a:ext uri="{C572A759-6A51-4108-AA02-DFA0A04FC94B}">
-              <ma14:wrappingTextBoxFlag xmlns:ma14="http://schemas.microsoft.com/office/mac/drawingml/2011/main" xmlns="" val="1"/>
+              <ma14:wrappingTextBoxFlag xmlns="" xmlns:ma14="http://schemas.microsoft.com/office/mac/drawingml/2011/main" val="1"/>
             </a:ext>
           </a:extLst>
         </p:spPr>
@@ -39209,7 +39209,7 @@
           </a:ln>
           <a:extLst>
             <a:ext uri="{C572A759-6A51-4108-AA02-DFA0A04FC94B}">
-              <ma14:wrappingTextBoxFlag xmlns:ma14="http://schemas.microsoft.com/office/mac/drawingml/2011/main" xmlns="" val="1"/>
+              <ma14:wrappingTextBoxFlag xmlns="" xmlns:ma14="http://schemas.microsoft.com/office/mac/drawingml/2011/main" val="1"/>
             </a:ext>
           </a:extLst>
         </p:spPr>
@@ -39244,7 +39244,7 @@
           </a:ln>
           <a:extLst>
             <a:ext uri="{C572A759-6A51-4108-AA02-DFA0A04FC94B}">
-              <ma14:wrappingTextBoxFlag xmlns:ma14="http://schemas.microsoft.com/office/mac/drawingml/2011/main" xmlns="" val="1"/>
+              <ma14:wrappingTextBoxFlag xmlns="" xmlns:ma14="http://schemas.microsoft.com/office/mac/drawingml/2011/main" val="1"/>
             </a:ext>
           </a:extLst>
         </p:spPr>
@@ -39279,7 +39279,7 @@
           </a:ln>
           <a:extLst>
             <a:ext uri="{C572A759-6A51-4108-AA02-DFA0A04FC94B}">
-              <ma14:wrappingTextBoxFlag xmlns:ma14="http://schemas.microsoft.com/office/mac/drawingml/2011/main" xmlns="" val="1"/>
+              <ma14:wrappingTextBoxFlag xmlns="" xmlns:ma14="http://schemas.microsoft.com/office/mac/drawingml/2011/main" val="1"/>
             </a:ext>
           </a:extLst>
         </p:spPr>
@@ -39314,7 +39314,7 @@
           </a:ln>
           <a:extLst>
             <a:ext uri="{C572A759-6A51-4108-AA02-DFA0A04FC94B}">
-              <ma14:wrappingTextBoxFlag xmlns:ma14="http://schemas.microsoft.com/office/mac/drawingml/2011/main" xmlns="" val="1"/>
+              <ma14:wrappingTextBoxFlag xmlns="" xmlns:ma14="http://schemas.microsoft.com/office/mac/drawingml/2011/main" val="1"/>
             </a:ext>
           </a:extLst>
         </p:spPr>
@@ -39833,7 +39833,7 @@
           </a:ln>
           <a:extLst>
             <a:ext uri="{C572A759-6A51-4108-AA02-DFA0A04FC94B}">
-              <ma14:wrappingTextBoxFlag xmlns:ma14="http://schemas.microsoft.com/office/mac/drawingml/2011/main" xmlns="" val="1"/>
+              <ma14:wrappingTextBoxFlag xmlns="" xmlns:ma14="http://schemas.microsoft.com/office/mac/drawingml/2011/main" val="1"/>
             </a:ext>
           </a:extLst>
         </p:spPr>
@@ -39868,7 +39868,7 @@
           </a:ln>
           <a:extLst>
             <a:ext uri="{C572A759-6A51-4108-AA02-DFA0A04FC94B}">
-              <ma14:wrappingTextBoxFlag xmlns:ma14="http://schemas.microsoft.com/office/mac/drawingml/2011/main" xmlns="" val="1"/>
+              <ma14:wrappingTextBoxFlag xmlns="" xmlns:ma14="http://schemas.microsoft.com/office/mac/drawingml/2011/main" val="1"/>
             </a:ext>
           </a:extLst>
         </p:spPr>
@@ -39903,7 +39903,7 @@
           </a:ln>
           <a:extLst>
             <a:ext uri="{C572A759-6A51-4108-AA02-DFA0A04FC94B}">
-              <ma14:wrappingTextBoxFlag xmlns:ma14="http://schemas.microsoft.com/office/mac/drawingml/2011/main" xmlns="" val="1"/>
+              <ma14:wrappingTextBoxFlag xmlns="" xmlns:ma14="http://schemas.microsoft.com/office/mac/drawingml/2011/main" val="1"/>
             </a:ext>
           </a:extLst>
         </p:spPr>
@@ -40162,7 +40162,7 @@
           </a:ln>
           <a:extLst>
             <a:ext uri="{C572A759-6A51-4108-AA02-DFA0A04FC94B}">
-              <ma14:wrappingTextBoxFlag xmlns:ma14="http://schemas.microsoft.com/office/mac/drawingml/2011/main" xmlns="" val="1"/>
+              <ma14:wrappingTextBoxFlag xmlns="" xmlns:ma14="http://schemas.microsoft.com/office/mac/drawingml/2011/main" val="1"/>
             </a:ext>
           </a:extLst>
         </p:spPr>
@@ -40216,7 +40216,7 @@
           </a:ln>
           <a:extLst>
             <a:ext uri="{C572A759-6A51-4108-AA02-DFA0A04FC94B}">
-              <ma14:wrappingTextBoxFlag xmlns:ma14="http://schemas.microsoft.com/office/mac/drawingml/2011/main" xmlns="" val="1"/>
+              <ma14:wrappingTextBoxFlag xmlns="" xmlns:ma14="http://schemas.microsoft.com/office/mac/drawingml/2011/main" val="1"/>
             </a:ext>
           </a:extLst>
         </p:spPr>
@@ -40339,7 +40339,7 @@
           </a:ln>
           <a:extLst>
             <a:ext uri="{C572A759-6A51-4108-AA02-DFA0A04FC94B}">
-              <ma14:wrappingTextBoxFlag xmlns:ma14="http://schemas.microsoft.com/office/mac/drawingml/2011/main" xmlns="" val="1"/>
+              <ma14:wrappingTextBoxFlag xmlns="" xmlns:ma14="http://schemas.microsoft.com/office/mac/drawingml/2011/main" val="1"/>
             </a:ext>
           </a:extLst>
         </p:spPr>
@@ -40393,7 +40393,7 @@
           </a:ln>
           <a:extLst>
             <a:ext uri="{C572A759-6A51-4108-AA02-DFA0A04FC94B}">
-              <ma14:wrappingTextBoxFlag xmlns:ma14="http://schemas.microsoft.com/office/mac/drawingml/2011/main" xmlns="" val="1"/>
+              <ma14:wrappingTextBoxFlag xmlns="" xmlns:ma14="http://schemas.microsoft.com/office/mac/drawingml/2011/main" val="1"/>
             </a:ext>
           </a:extLst>
         </p:spPr>
@@ -40443,7 +40443,7 @@
           </a:ln>
           <a:extLst>
             <a:ext uri="{C572A759-6A51-4108-AA02-DFA0A04FC94B}">
-              <ma14:wrappingTextBoxFlag xmlns:ma14="http://schemas.microsoft.com/office/mac/drawingml/2011/main" xmlns="" val="1"/>
+              <ma14:wrappingTextBoxFlag xmlns="" xmlns:ma14="http://schemas.microsoft.com/office/mac/drawingml/2011/main" val="1"/>
             </a:ext>
           </a:extLst>
         </p:spPr>
@@ -40486,7 +40486,7 @@
           </a:ln>
           <a:extLst>
             <a:ext uri="{C572A759-6A51-4108-AA02-DFA0A04FC94B}">
-              <ma14:wrappingTextBoxFlag xmlns:ma14="http://schemas.microsoft.com/office/mac/drawingml/2011/main" xmlns="" val="1"/>
+              <ma14:wrappingTextBoxFlag xmlns="" xmlns:ma14="http://schemas.microsoft.com/office/mac/drawingml/2011/main" val="1"/>
             </a:ext>
           </a:extLst>
         </p:spPr>
@@ -40659,7 +40659,7 @@
           </a:ln>
           <a:extLst>
             <a:ext uri="{C572A759-6A51-4108-AA02-DFA0A04FC94B}">
-              <ma14:wrappingTextBoxFlag xmlns:ma14="http://schemas.microsoft.com/office/mac/drawingml/2011/main" xmlns="" val="1"/>
+              <ma14:wrappingTextBoxFlag xmlns="" xmlns:ma14="http://schemas.microsoft.com/office/mac/drawingml/2011/main" val="1"/>
             </a:ext>
           </a:extLst>
         </p:spPr>
@@ -40706,7 +40706,7 @@
           </a:ln>
           <a:extLst>
             <a:ext uri="{C572A759-6A51-4108-AA02-DFA0A04FC94B}">
-              <ma14:wrappingTextBoxFlag xmlns:ma14="http://schemas.microsoft.com/office/mac/drawingml/2011/main" xmlns="" val="1"/>
+              <ma14:wrappingTextBoxFlag xmlns="" xmlns:ma14="http://schemas.microsoft.com/office/mac/drawingml/2011/main" val="1"/>
             </a:ext>
           </a:extLst>
         </p:spPr>
@@ -40753,7 +40753,7 @@
           </a:ln>
           <a:extLst>
             <a:ext uri="{C572A759-6A51-4108-AA02-DFA0A04FC94B}">
-              <ma14:wrappingTextBoxFlag xmlns:ma14="http://schemas.microsoft.com/office/mac/drawingml/2011/main" xmlns="" val="1"/>
+              <ma14:wrappingTextBoxFlag xmlns="" xmlns:ma14="http://schemas.microsoft.com/office/mac/drawingml/2011/main" val="1"/>
             </a:ext>
           </a:extLst>
         </p:spPr>
@@ -40800,7 +40800,7 @@
           </a:ln>
           <a:extLst>
             <a:ext uri="{C572A759-6A51-4108-AA02-DFA0A04FC94B}">
-              <ma14:wrappingTextBoxFlag xmlns:ma14="http://schemas.microsoft.com/office/mac/drawingml/2011/main" xmlns="" val="1"/>
+              <ma14:wrappingTextBoxFlag xmlns="" xmlns:ma14="http://schemas.microsoft.com/office/mac/drawingml/2011/main" val="1"/>
             </a:ext>
           </a:extLst>
         </p:spPr>
@@ -40844,7 +40844,7 @@
           </a:ln>
           <a:extLst>
             <a:ext uri="{C572A759-6A51-4108-AA02-DFA0A04FC94B}">
-              <ma14:wrappingTextBoxFlag xmlns:ma14="http://schemas.microsoft.com/office/mac/drawingml/2011/main" xmlns="" val="1"/>
+              <ma14:wrappingTextBoxFlag xmlns="" xmlns:ma14="http://schemas.microsoft.com/office/mac/drawingml/2011/main" val="1"/>
             </a:ext>
           </a:extLst>
         </p:spPr>
@@ -41039,7 +41039,7 @@
           </a:ln>
           <a:extLst>
             <a:ext uri="{C572A759-6A51-4108-AA02-DFA0A04FC94B}">
-              <ma14:wrappingTextBoxFlag xmlns:ma14="http://schemas.microsoft.com/office/mac/drawingml/2011/main" xmlns="" val="1"/>
+              <ma14:wrappingTextBoxFlag xmlns="" xmlns:ma14="http://schemas.microsoft.com/office/mac/drawingml/2011/main" val="1"/>
             </a:ext>
           </a:extLst>
         </p:spPr>
@@ -41164,7 +41164,7 @@
           </a:ln>
           <a:extLst>
             <a:ext uri="{C572A759-6A51-4108-AA02-DFA0A04FC94B}">
-              <ma14:wrappingTextBoxFlag xmlns:ma14="http://schemas.microsoft.com/office/mac/drawingml/2011/main" xmlns="" val="1"/>
+              <ma14:wrappingTextBoxFlag xmlns="" xmlns:ma14="http://schemas.microsoft.com/office/mac/drawingml/2011/main" val="1"/>
             </a:ext>
           </a:extLst>
         </p:spPr>
@@ -41221,7 +41221,7 @@
           </a:ln>
           <a:extLst>
             <a:ext uri="{C572A759-6A51-4108-AA02-DFA0A04FC94B}">
-              <ma14:wrappingTextBoxFlag xmlns:ma14="http://schemas.microsoft.com/office/mac/drawingml/2011/main" xmlns="" val="1"/>
+              <ma14:wrappingTextBoxFlag xmlns="" xmlns:ma14="http://schemas.microsoft.com/office/mac/drawingml/2011/main" val="1"/>
             </a:ext>
           </a:extLst>
         </p:spPr>
@@ -41263,7 +41263,7 @@
           </a:ln>
           <a:extLst>
             <a:ext uri="{C572A759-6A51-4108-AA02-DFA0A04FC94B}">
-              <ma14:wrappingTextBoxFlag xmlns:ma14="http://schemas.microsoft.com/office/mac/drawingml/2011/main" xmlns="" val="1"/>
+              <ma14:wrappingTextBoxFlag xmlns="" xmlns:ma14="http://schemas.microsoft.com/office/mac/drawingml/2011/main" val="1"/>
             </a:ext>
           </a:extLst>
         </p:spPr>
@@ -41313,7 +41313,7 @@
           </a:ln>
           <a:extLst>
             <a:ext uri="{C572A759-6A51-4108-AA02-DFA0A04FC94B}">
-              <ma14:wrappingTextBoxFlag xmlns:ma14="http://schemas.microsoft.com/office/mac/drawingml/2011/main" xmlns="" val="1"/>
+              <ma14:wrappingTextBoxFlag xmlns="" xmlns:ma14="http://schemas.microsoft.com/office/mac/drawingml/2011/main" val="1"/>
             </a:ext>
           </a:extLst>
         </p:spPr>
@@ -41393,7 +41393,7 @@
           </a:ln>
           <a:extLst>
             <a:ext uri="{C572A759-6A51-4108-AA02-DFA0A04FC94B}">
-              <ma14:wrappingTextBoxFlag xmlns:ma14="http://schemas.microsoft.com/office/mac/drawingml/2011/main" xmlns="" val="1"/>
+              <ma14:wrappingTextBoxFlag xmlns="" xmlns:ma14="http://schemas.microsoft.com/office/mac/drawingml/2011/main" val="1"/>
             </a:ext>
           </a:extLst>
         </p:spPr>
@@ -41602,7 +41602,7 @@
           </a:ln>
           <a:extLst>
             <a:ext uri="{C572A759-6A51-4108-AA02-DFA0A04FC94B}">
-              <ma14:wrappingTextBoxFlag xmlns:ma14="http://schemas.microsoft.com/office/mac/drawingml/2011/main" xmlns="" val="1"/>
+              <ma14:wrappingTextBoxFlag xmlns="" xmlns:ma14="http://schemas.microsoft.com/office/mac/drawingml/2011/main" val="1"/>
             </a:ext>
           </a:extLst>
         </p:spPr>
@@ -41659,7 +41659,7 @@
           </a:ln>
           <a:extLst>
             <a:ext uri="{C572A759-6A51-4108-AA02-DFA0A04FC94B}">
-              <ma14:wrappingTextBoxFlag xmlns:ma14="http://schemas.microsoft.com/office/mac/drawingml/2011/main" xmlns="" val="1"/>
+              <ma14:wrappingTextBoxFlag xmlns="" xmlns:ma14="http://schemas.microsoft.com/office/mac/drawingml/2011/main" val="1"/>
             </a:ext>
           </a:extLst>
         </p:spPr>
@@ -41701,7 +41701,7 @@
           </a:ln>
           <a:extLst>
             <a:ext uri="{C572A759-6A51-4108-AA02-DFA0A04FC94B}">
-              <ma14:wrappingTextBoxFlag xmlns:ma14="http://schemas.microsoft.com/office/mac/drawingml/2011/main" xmlns="" val="1"/>
+              <ma14:wrappingTextBoxFlag xmlns="" xmlns:ma14="http://schemas.microsoft.com/office/mac/drawingml/2011/main" val="1"/>
             </a:ext>
           </a:extLst>
         </p:spPr>
@@ -41743,7 +41743,7 @@
           </a:ln>
           <a:extLst>
             <a:ext uri="{C572A759-6A51-4108-AA02-DFA0A04FC94B}">
-              <ma14:wrappingTextBoxFlag xmlns:ma14="http://schemas.microsoft.com/office/mac/drawingml/2011/main" xmlns="" val="1"/>
+              <ma14:wrappingTextBoxFlag xmlns="" xmlns:ma14="http://schemas.microsoft.com/office/mac/drawingml/2011/main" val="1"/>
             </a:ext>
           </a:extLst>
         </p:spPr>
@@ -41834,7 +41834,7 @@
           </a:ln>
           <a:extLst>
             <a:ext uri="{C572A759-6A51-4108-AA02-DFA0A04FC94B}">
-              <ma14:wrappingTextBoxFlag xmlns:ma14="http://schemas.microsoft.com/office/mac/drawingml/2011/main" xmlns="" val="1"/>
+              <ma14:wrappingTextBoxFlag xmlns="" xmlns:ma14="http://schemas.microsoft.com/office/mac/drawingml/2011/main" val="1"/>
             </a:ext>
           </a:extLst>
         </p:spPr>
@@ -41914,7 +41914,7 @@
           </a:ln>
           <a:extLst>
             <a:ext uri="{C572A759-6A51-4108-AA02-DFA0A04FC94B}">
-              <ma14:wrappingTextBoxFlag xmlns:ma14="http://schemas.microsoft.com/office/mac/drawingml/2011/main" xmlns="" val="1"/>
+              <ma14:wrappingTextBoxFlag xmlns="" xmlns:ma14="http://schemas.microsoft.com/office/mac/drawingml/2011/main" val="1"/>
             </a:ext>
           </a:extLst>
         </p:spPr>
@@ -42123,7 +42123,7 @@
           </a:ln>
           <a:extLst>
             <a:ext uri="{C572A759-6A51-4108-AA02-DFA0A04FC94B}">
-              <ma14:wrappingTextBoxFlag xmlns:ma14="http://schemas.microsoft.com/office/mac/drawingml/2011/main" xmlns="" val="1"/>
+              <ma14:wrappingTextBoxFlag xmlns="" xmlns:ma14="http://schemas.microsoft.com/office/mac/drawingml/2011/main" val="1"/>
             </a:ext>
           </a:extLst>
         </p:spPr>
@@ -42180,7 +42180,7 @@
           </a:ln>
           <a:extLst>
             <a:ext uri="{C572A759-6A51-4108-AA02-DFA0A04FC94B}">
-              <ma14:wrappingTextBoxFlag xmlns:ma14="http://schemas.microsoft.com/office/mac/drawingml/2011/main" xmlns="" val="1"/>
+              <ma14:wrappingTextBoxFlag xmlns="" xmlns:ma14="http://schemas.microsoft.com/office/mac/drawingml/2011/main" val="1"/>
             </a:ext>
           </a:extLst>
         </p:spPr>
@@ -42222,7 +42222,7 @@
           </a:ln>
           <a:extLst>
             <a:ext uri="{C572A759-6A51-4108-AA02-DFA0A04FC94B}">
-              <ma14:wrappingTextBoxFlag xmlns:ma14="http://schemas.microsoft.com/office/mac/drawingml/2011/main" xmlns="" val="1"/>
+              <ma14:wrappingTextBoxFlag xmlns="" xmlns:ma14="http://schemas.microsoft.com/office/mac/drawingml/2011/main" val="1"/>
             </a:ext>
           </a:extLst>
         </p:spPr>
@@ -42264,7 +42264,7 @@
           </a:ln>
           <a:extLst>
             <a:ext uri="{C572A759-6A51-4108-AA02-DFA0A04FC94B}">
-              <ma14:wrappingTextBoxFlag xmlns:ma14="http://schemas.microsoft.com/office/mac/drawingml/2011/main" xmlns="" val="1"/>
+              <ma14:wrappingTextBoxFlag xmlns="" xmlns:ma14="http://schemas.microsoft.com/office/mac/drawingml/2011/main" val="1"/>
             </a:ext>
           </a:extLst>
         </p:spPr>
@@ -42309,7 +42309,7 @@
           </a:ln>
           <a:extLst>
             <a:ext uri="{C572A759-6A51-4108-AA02-DFA0A04FC94B}">
-              <ma14:wrappingTextBoxFlag xmlns:ma14="http://schemas.microsoft.com/office/mac/drawingml/2011/main" xmlns="" val="1"/>
+              <ma14:wrappingTextBoxFlag xmlns="" xmlns:ma14="http://schemas.microsoft.com/office/mac/drawingml/2011/main" val="1"/>
             </a:ext>
           </a:extLst>
         </p:spPr>
@@ -42438,7 +42438,7 @@
           </a:ln>
           <a:extLst>
             <a:ext uri="{C572A759-6A51-4108-AA02-DFA0A04FC94B}">
-              <ma14:wrappingTextBoxFlag xmlns:ma14="http://schemas.microsoft.com/office/mac/drawingml/2011/main" xmlns="" val="1"/>
+              <ma14:wrappingTextBoxFlag xmlns="" xmlns:ma14="http://schemas.microsoft.com/office/mac/drawingml/2011/main" val="1"/>
             </a:ext>
           </a:extLst>
         </p:spPr>
@@ -42518,7 +42518,7 @@
           </a:ln>
           <a:extLst>
             <a:ext uri="{C572A759-6A51-4108-AA02-DFA0A04FC94B}">
-              <ma14:wrappingTextBoxFlag xmlns:ma14="http://schemas.microsoft.com/office/mac/drawingml/2011/main" xmlns="" val="1"/>
+              <ma14:wrappingTextBoxFlag xmlns="" xmlns:ma14="http://schemas.microsoft.com/office/mac/drawingml/2011/main" val="1"/>
             </a:ext>
           </a:extLst>
         </p:spPr>
@@ -42727,7 +42727,7 @@
           </a:ln>
           <a:extLst>
             <a:ext uri="{C572A759-6A51-4108-AA02-DFA0A04FC94B}">
-              <ma14:wrappingTextBoxFlag xmlns:ma14="http://schemas.microsoft.com/office/mac/drawingml/2011/main" xmlns="" val="1"/>
+              <ma14:wrappingTextBoxFlag xmlns="" xmlns:ma14="http://schemas.microsoft.com/office/mac/drawingml/2011/main" val="1"/>
             </a:ext>
           </a:extLst>
         </p:spPr>
@@ -42784,7 +42784,7 @@
           </a:ln>
           <a:extLst>
             <a:ext uri="{C572A759-6A51-4108-AA02-DFA0A04FC94B}">
-              <ma14:wrappingTextBoxFlag xmlns:ma14="http://schemas.microsoft.com/office/mac/drawingml/2011/main" xmlns="" val="1"/>
+              <ma14:wrappingTextBoxFlag xmlns="" xmlns:ma14="http://schemas.microsoft.com/office/mac/drawingml/2011/main" val="1"/>
             </a:ext>
           </a:extLst>
         </p:spPr>
@@ -42826,7 +42826,7 @@
           </a:ln>
           <a:extLst>
             <a:ext uri="{C572A759-6A51-4108-AA02-DFA0A04FC94B}">
-              <ma14:wrappingTextBoxFlag xmlns:ma14="http://schemas.microsoft.com/office/mac/drawingml/2011/main" xmlns="" val="1"/>
+              <ma14:wrappingTextBoxFlag xmlns="" xmlns:ma14="http://schemas.microsoft.com/office/mac/drawingml/2011/main" val="1"/>
             </a:ext>
           </a:extLst>
         </p:spPr>
@@ -42868,7 +42868,7 @@
           </a:ln>
           <a:extLst>
             <a:ext uri="{C572A759-6A51-4108-AA02-DFA0A04FC94B}">
-              <ma14:wrappingTextBoxFlag xmlns:ma14="http://schemas.microsoft.com/office/mac/drawingml/2011/main" xmlns="" val="1"/>
+              <ma14:wrappingTextBoxFlag xmlns="" xmlns:ma14="http://schemas.microsoft.com/office/mac/drawingml/2011/main" val="1"/>
             </a:ext>
           </a:extLst>
         </p:spPr>
@@ -42913,7 +42913,7 @@
           </a:ln>
           <a:extLst>
             <a:ext uri="{C572A759-6A51-4108-AA02-DFA0A04FC94B}">
-              <ma14:wrappingTextBoxFlag xmlns:ma14="http://schemas.microsoft.com/office/mac/drawingml/2011/main" xmlns="" val="1"/>
+              <ma14:wrappingTextBoxFlag xmlns="" xmlns:ma14="http://schemas.microsoft.com/office/mac/drawingml/2011/main" val="1"/>
             </a:ext>
           </a:extLst>
         </p:spPr>
@@ -42992,7 +42992,7 @@
           </a:ln>
           <a:extLst>
             <a:ext uri="{C572A759-6A51-4108-AA02-DFA0A04FC94B}">
-              <ma14:wrappingTextBoxFlag xmlns:ma14="http://schemas.microsoft.com/office/mac/drawingml/2011/main" xmlns="" val="1"/>
+              <ma14:wrappingTextBoxFlag xmlns="" xmlns:ma14="http://schemas.microsoft.com/office/mac/drawingml/2011/main" val="1"/>
             </a:ext>
           </a:extLst>
         </p:spPr>
@@ -43156,7 +43156,7 @@
           </a:ln>
           <a:extLst>
             <a:ext uri="{C572A759-6A51-4108-AA02-DFA0A04FC94B}">
-              <ma14:wrappingTextBoxFlag xmlns:ma14="http://schemas.microsoft.com/office/mac/drawingml/2011/main" xmlns="" val="1"/>
+              <ma14:wrappingTextBoxFlag xmlns="" xmlns:ma14="http://schemas.microsoft.com/office/mac/drawingml/2011/main" val="1"/>
             </a:ext>
           </a:extLst>
         </p:spPr>
@@ -43236,7 +43236,7 @@
           </a:ln>
           <a:extLst>
             <a:ext uri="{C572A759-6A51-4108-AA02-DFA0A04FC94B}">
-              <ma14:wrappingTextBoxFlag xmlns:ma14="http://schemas.microsoft.com/office/mac/drawingml/2011/main" xmlns="" val="1"/>
+              <ma14:wrappingTextBoxFlag xmlns="" xmlns:ma14="http://schemas.microsoft.com/office/mac/drawingml/2011/main" val="1"/>
             </a:ext>
           </a:extLst>
         </p:spPr>
@@ -43448,7 +43448,7 @@
           </a:ln>
           <a:extLst>
             <a:ext uri="{C572A759-6A51-4108-AA02-DFA0A04FC94B}">
-              <ma14:wrappingTextBoxFlag xmlns:ma14="http://schemas.microsoft.com/office/mac/drawingml/2011/main" xmlns="" val="1"/>
+              <ma14:wrappingTextBoxFlag xmlns="" xmlns:ma14="http://schemas.microsoft.com/office/mac/drawingml/2011/main" val="1"/>
             </a:ext>
           </a:extLst>
         </p:spPr>
@@ -43490,7 +43490,7 @@
           </a:ln>
           <a:extLst>
             <a:ext uri="{C572A759-6A51-4108-AA02-DFA0A04FC94B}">
-              <ma14:wrappingTextBoxFlag xmlns:ma14="http://schemas.microsoft.com/office/mac/drawingml/2011/main" xmlns="" val="1"/>
+              <ma14:wrappingTextBoxFlag xmlns="" xmlns:ma14="http://schemas.microsoft.com/office/mac/drawingml/2011/main" val="1"/>
             </a:ext>
           </a:extLst>
         </p:spPr>
@@ -43532,7 +43532,7 @@
           </a:ln>
           <a:extLst>
             <a:ext uri="{C572A759-6A51-4108-AA02-DFA0A04FC94B}">
-              <ma14:wrappingTextBoxFlag xmlns:ma14="http://schemas.microsoft.com/office/mac/drawingml/2011/main" xmlns="" val="1"/>
+              <ma14:wrappingTextBoxFlag xmlns="" xmlns:ma14="http://schemas.microsoft.com/office/mac/drawingml/2011/main" val="1"/>
             </a:ext>
           </a:extLst>
         </p:spPr>
@@ -43577,7 +43577,7 @@
           </a:ln>
           <a:extLst>
             <a:ext uri="{C572A759-6A51-4108-AA02-DFA0A04FC94B}">
-              <ma14:wrappingTextBoxFlag xmlns:ma14="http://schemas.microsoft.com/office/mac/drawingml/2011/main" xmlns="" val="1"/>
+              <ma14:wrappingTextBoxFlag xmlns="" xmlns:ma14="http://schemas.microsoft.com/office/mac/drawingml/2011/main" val="1"/>
             </a:ext>
           </a:extLst>
         </p:spPr>
@@ -43656,7 +43656,7 @@
           </a:ln>
           <a:extLst>
             <a:ext uri="{C572A759-6A51-4108-AA02-DFA0A04FC94B}">
-              <ma14:wrappingTextBoxFlag xmlns:ma14="http://schemas.microsoft.com/office/mac/drawingml/2011/main" xmlns="" val="1"/>
+              <ma14:wrappingTextBoxFlag xmlns="" xmlns:ma14="http://schemas.microsoft.com/office/mac/drawingml/2011/main" val="1"/>
             </a:ext>
           </a:extLst>
         </p:spPr>
@@ -43820,7 +43820,7 @@
           </a:ln>
           <a:extLst>
             <a:ext uri="{C572A759-6A51-4108-AA02-DFA0A04FC94B}">
-              <ma14:wrappingTextBoxFlag xmlns:ma14="http://schemas.microsoft.com/office/mac/drawingml/2011/main" xmlns="" val="1"/>
+              <ma14:wrappingTextBoxFlag xmlns="" xmlns:ma14="http://schemas.microsoft.com/office/mac/drawingml/2011/main" val="1"/>
             </a:ext>
           </a:extLst>
         </p:spPr>
@@ -43900,7 +43900,7 @@
           </a:ln>
           <a:extLst>
             <a:ext uri="{C572A759-6A51-4108-AA02-DFA0A04FC94B}">
-              <ma14:wrappingTextBoxFlag xmlns:ma14="http://schemas.microsoft.com/office/mac/drawingml/2011/main" xmlns="" val="1"/>
+              <ma14:wrappingTextBoxFlag xmlns="" xmlns:ma14="http://schemas.microsoft.com/office/mac/drawingml/2011/main" val="1"/>
             </a:ext>
           </a:extLst>
         </p:spPr>
@@ -43985,7 +43985,7 @@
           </a:ln>
           <a:extLst>
             <a:ext uri="{C572A759-6A51-4108-AA02-DFA0A04FC94B}">
-              <ma14:wrappingTextBoxFlag xmlns:ma14="http://schemas.microsoft.com/office/mac/drawingml/2011/main" xmlns="" val="1"/>
+              <ma14:wrappingTextBoxFlag xmlns="" xmlns:ma14="http://schemas.microsoft.com/office/mac/drawingml/2011/main" val="1"/>
             </a:ext>
           </a:extLst>
         </p:spPr>
@@ -44123,7 +44123,7 @@
           </a:ln>
           <a:extLst>
             <a:ext uri="{C572A759-6A51-4108-AA02-DFA0A04FC94B}">
-              <ma14:wrappingTextBoxFlag xmlns:ma14="http://schemas.microsoft.com/office/mac/drawingml/2011/main" xmlns="" val="1"/>
+              <ma14:wrappingTextBoxFlag xmlns="" xmlns:ma14="http://schemas.microsoft.com/office/mac/drawingml/2011/main" val="1"/>
             </a:ext>
           </a:extLst>
         </p:spPr>
@@ -44180,7 +44180,7 @@
           </a:ln>
           <a:extLst>
             <a:ext uri="{C572A759-6A51-4108-AA02-DFA0A04FC94B}">
-              <ma14:wrappingTextBoxFlag xmlns:ma14="http://schemas.microsoft.com/office/mac/drawingml/2011/main" xmlns="" val="1"/>
+              <ma14:wrappingTextBoxFlag xmlns="" xmlns:ma14="http://schemas.microsoft.com/office/mac/drawingml/2011/main" val="1"/>
             </a:ext>
           </a:extLst>
         </p:spPr>
@@ -44222,7 +44222,7 @@
           </a:ln>
           <a:extLst>
             <a:ext uri="{C572A759-6A51-4108-AA02-DFA0A04FC94B}">
-              <ma14:wrappingTextBoxFlag xmlns:ma14="http://schemas.microsoft.com/office/mac/drawingml/2011/main" xmlns="" val="1"/>
+              <ma14:wrappingTextBoxFlag xmlns="" xmlns:ma14="http://schemas.microsoft.com/office/mac/drawingml/2011/main" val="1"/>
             </a:ext>
           </a:extLst>
         </p:spPr>
@@ -44264,7 +44264,7 @@
           </a:ln>
           <a:extLst>
             <a:ext uri="{C572A759-6A51-4108-AA02-DFA0A04FC94B}">
-              <ma14:wrappingTextBoxFlag xmlns:ma14="http://schemas.microsoft.com/office/mac/drawingml/2011/main" xmlns="" val="1"/>
+              <ma14:wrappingTextBoxFlag xmlns="" xmlns:ma14="http://schemas.microsoft.com/office/mac/drawingml/2011/main" val="1"/>
             </a:ext>
           </a:extLst>
         </p:spPr>
@@ -44309,7 +44309,7 @@
           </a:ln>
           <a:extLst>
             <a:ext uri="{C572A759-6A51-4108-AA02-DFA0A04FC94B}">
-              <ma14:wrappingTextBoxFlag xmlns:ma14="http://schemas.microsoft.com/office/mac/drawingml/2011/main" xmlns="" val="1"/>
+              <ma14:wrappingTextBoxFlag xmlns="" xmlns:ma14="http://schemas.microsoft.com/office/mac/drawingml/2011/main" val="1"/>
             </a:ext>
           </a:extLst>
         </p:spPr>
@@ -44362,7 +44362,7 @@
           </a:ln>
           <a:extLst>
             <a:ext uri="{C572A759-6A51-4108-AA02-DFA0A04FC94B}">
-              <ma14:wrappingTextBoxFlag xmlns:ma14="http://schemas.microsoft.com/office/mac/drawingml/2011/main" xmlns="" val="1"/>
+              <ma14:wrappingTextBoxFlag xmlns="" xmlns:ma14="http://schemas.microsoft.com/office/mac/drawingml/2011/main" val="1"/>
             </a:ext>
           </a:extLst>
         </p:spPr>
@@ -44491,7 +44491,7 @@
           </a:ln>
           <a:extLst>
             <a:ext uri="{C572A759-6A51-4108-AA02-DFA0A04FC94B}">
-              <ma14:wrappingTextBoxFlag xmlns:ma14="http://schemas.microsoft.com/office/mac/drawingml/2011/main" xmlns="" val="1"/>
+              <ma14:wrappingTextBoxFlag xmlns="" xmlns:ma14="http://schemas.microsoft.com/office/mac/drawingml/2011/main" val="1"/>
             </a:ext>
           </a:extLst>
         </p:spPr>
@@ -44571,7 +44571,7 @@
           </a:ln>
           <a:extLst>
             <a:ext uri="{C572A759-6A51-4108-AA02-DFA0A04FC94B}">
-              <ma14:wrappingTextBoxFlag xmlns:ma14="http://schemas.microsoft.com/office/mac/drawingml/2011/main" xmlns="" val="1"/>
+              <ma14:wrappingTextBoxFlag xmlns="" xmlns:ma14="http://schemas.microsoft.com/office/mac/drawingml/2011/main" val="1"/>
             </a:ext>
           </a:extLst>
         </p:spPr>
@@ -44783,7 +44783,7 @@
           </a:ln>
           <a:extLst>
             <a:ext uri="{C572A759-6A51-4108-AA02-DFA0A04FC94B}">
-              <ma14:wrappingTextBoxFlag xmlns:ma14="http://schemas.microsoft.com/office/mac/drawingml/2011/main" xmlns="" val="1"/>
+              <ma14:wrappingTextBoxFlag xmlns="" xmlns:ma14="http://schemas.microsoft.com/office/mac/drawingml/2011/main" val="1"/>
             </a:ext>
           </a:extLst>
         </p:spPr>
@@ -44825,7 +44825,7 @@
           </a:ln>
           <a:extLst>
             <a:ext uri="{C572A759-6A51-4108-AA02-DFA0A04FC94B}">
-              <ma14:wrappingTextBoxFlag xmlns:ma14="http://schemas.microsoft.com/office/mac/drawingml/2011/main" xmlns="" val="1"/>
+              <ma14:wrappingTextBoxFlag xmlns="" xmlns:ma14="http://schemas.microsoft.com/office/mac/drawingml/2011/main" val="1"/>
             </a:ext>
           </a:extLst>
         </p:spPr>
@@ -44867,7 +44867,7 @@
           </a:ln>
           <a:extLst>
             <a:ext uri="{C572A759-6A51-4108-AA02-DFA0A04FC94B}">
-              <ma14:wrappingTextBoxFlag xmlns:ma14="http://schemas.microsoft.com/office/mac/drawingml/2011/main" xmlns="" val="1"/>
+              <ma14:wrappingTextBoxFlag xmlns="" xmlns:ma14="http://schemas.microsoft.com/office/mac/drawingml/2011/main" val="1"/>
             </a:ext>
           </a:extLst>
         </p:spPr>
@@ -44920,7 +44920,7 @@
           </a:ln>
           <a:extLst>
             <a:ext uri="{C572A759-6A51-4108-AA02-DFA0A04FC94B}">
-              <ma14:wrappingTextBoxFlag xmlns:ma14="http://schemas.microsoft.com/office/mac/drawingml/2011/main" xmlns="" val="1"/>
+              <ma14:wrappingTextBoxFlag xmlns="" xmlns:ma14="http://schemas.microsoft.com/office/mac/drawingml/2011/main" val="1"/>
             </a:ext>
           </a:extLst>
         </p:spPr>
@@ -45011,7 +45011,7 @@
           </a:ln>
           <a:extLst>
             <a:ext uri="{C572A759-6A51-4108-AA02-DFA0A04FC94B}">
-              <ma14:wrappingTextBoxFlag xmlns:ma14="http://schemas.microsoft.com/office/mac/drawingml/2011/main" xmlns="" val="1"/>
+              <ma14:wrappingTextBoxFlag xmlns="" xmlns:ma14="http://schemas.microsoft.com/office/mac/drawingml/2011/main" val="1"/>
             </a:ext>
           </a:extLst>
         </p:spPr>
@@ -45091,7 +45091,7 @@
           </a:ln>
           <a:extLst>
             <a:ext uri="{C572A759-6A51-4108-AA02-DFA0A04FC94B}">
-              <ma14:wrappingTextBoxFlag xmlns:ma14="http://schemas.microsoft.com/office/mac/drawingml/2011/main" xmlns="" val="1"/>
+              <ma14:wrappingTextBoxFlag xmlns="" xmlns:ma14="http://schemas.microsoft.com/office/mac/drawingml/2011/main" val="1"/>
             </a:ext>
           </a:extLst>
         </p:spPr>
@@ -45176,7 +45176,7 @@
           </a:ln>
           <a:extLst>
             <a:ext uri="{C572A759-6A51-4108-AA02-DFA0A04FC94B}">
-              <ma14:wrappingTextBoxFlag xmlns:ma14="http://schemas.microsoft.com/office/mac/drawingml/2011/main" xmlns="" val="1"/>
+              <ma14:wrappingTextBoxFlag xmlns="" xmlns:ma14="http://schemas.microsoft.com/office/mac/drawingml/2011/main" val="1"/>
             </a:ext>
           </a:extLst>
         </p:spPr>
@@ -45357,7 +45357,7 @@
           </a:ln>
           <a:extLst>
             <a:ext uri="{C572A759-6A51-4108-AA02-DFA0A04FC94B}">
-              <ma14:wrappingTextBoxFlag xmlns:ma14="http://schemas.microsoft.com/office/mac/drawingml/2011/main" xmlns="" val="1"/>
+              <ma14:wrappingTextBoxFlag xmlns="" xmlns:ma14="http://schemas.microsoft.com/office/mac/drawingml/2011/main" val="1"/>
             </a:ext>
           </a:extLst>
         </p:spPr>
@@ -45399,7 +45399,7 @@
           </a:ln>
           <a:extLst>
             <a:ext uri="{C572A759-6A51-4108-AA02-DFA0A04FC94B}">
-              <ma14:wrappingTextBoxFlag xmlns:ma14="http://schemas.microsoft.com/office/mac/drawingml/2011/main" xmlns="" val="1"/>
+              <ma14:wrappingTextBoxFlag xmlns="" xmlns:ma14="http://schemas.microsoft.com/office/mac/drawingml/2011/main" val="1"/>
             </a:ext>
           </a:extLst>
         </p:spPr>
@@ -45449,7 +45449,7 @@
           </a:ln>
           <a:extLst>
             <a:ext uri="{C572A759-6A51-4108-AA02-DFA0A04FC94B}">
-              <ma14:wrappingTextBoxFlag xmlns:ma14="http://schemas.microsoft.com/office/mac/drawingml/2011/main" xmlns="" val="1"/>
+              <ma14:wrappingTextBoxFlag xmlns="" xmlns:ma14="http://schemas.microsoft.com/office/mac/drawingml/2011/main" val="1"/>
             </a:ext>
           </a:extLst>
         </p:spPr>
@@ -45502,7 +45502,7 @@
           </a:ln>
           <a:extLst>
             <a:ext uri="{C572A759-6A51-4108-AA02-DFA0A04FC94B}">
-              <ma14:wrappingTextBoxFlag xmlns:ma14="http://schemas.microsoft.com/office/mac/drawingml/2011/main" xmlns="" val="1"/>
+              <ma14:wrappingTextBoxFlag xmlns="" xmlns:ma14="http://schemas.microsoft.com/office/mac/drawingml/2011/main" val="1"/>
             </a:ext>
           </a:extLst>
         </p:spPr>
@@ -45582,7 +45582,7 @@
           </a:ln>
           <a:extLst>
             <a:ext uri="{C572A759-6A51-4108-AA02-DFA0A04FC94B}">
-              <ma14:wrappingTextBoxFlag xmlns:ma14="http://schemas.microsoft.com/office/mac/drawingml/2011/main" xmlns="" val="1"/>
+              <ma14:wrappingTextBoxFlag xmlns="" xmlns:ma14="http://schemas.microsoft.com/office/mac/drawingml/2011/main" val="1"/>
             </a:ext>
           </a:extLst>
         </p:spPr>
@@ -45667,7 +45667,7 @@
           </a:ln>
           <a:extLst>
             <a:ext uri="{C572A759-6A51-4108-AA02-DFA0A04FC94B}">
-              <ma14:wrappingTextBoxFlag xmlns:ma14="http://schemas.microsoft.com/office/mac/drawingml/2011/main" xmlns="" val="1"/>
+              <ma14:wrappingTextBoxFlag xmlns="" xmlns:ma14="http://schemas.microsoft.com/office/mac/drawingml/2011/main" val="1"/>
             </a:ext>
           </a:extLst>
         </p:spPr>
@@ -45856,7 +45856,7 @@
           </a:ln>
           <a:extLst>
             <a:ext uri="{C572A759-6A51-4108-AA02-DFA0A04FC94B}">
-              <ma14:wrappingTextBoxFlag xmlns:ma14="http://schemas.microsoft.com/office/mac/drawingml/2011/main" xmlns="" val="1"/>
+              <ma14:wrappingTextBoxFlag xmlns="" xmlns:ma14="http://schemas.microsoft.com/office/mac/drawingml/2011/main" val="1"/>
             </a:ext>
           </a:extLst>
         </p:spPr>
@@ -45898,7 +45898,7 @@
           </a:ln>
           <a:extLst>
             <a:ext uri="{C572A759-6A51-4108-AA02-DFA0A04FC94B}">
-              <ma14:wrappingTextBoxFlag xmlns:ma14="http://schemas.microsoft.com/office/mac/drawingml/2011/main" xmlns="" val="1"/>
+              <ma14:wrappingTextBoxFlag xmlns="" xmlns:ma14="http://schemas.microsoft.com/office/mac/drawingml/2011/main" val="1"/>
             </a:ext>
           </a:extLst>
         </p:spPr>
@@ -45948,7 +45948,7 @@
           </a:ln>
           <a:extLst>
             <a:ext uri="{C572A759-6A51-4108-AA02-DFA0A04FC94B}">
-              <ma14:wrappingTextBoxFlag xmlns:ma14="http://schemas.microsoft.com/office/mac/drawingml/2011/main" xmlns="" val="1"/>
+              <ma14:wrappingTextBoxFlag xmlns="" xmlns:ma14="http://schemas.microsoft.com/office/mac/drawingml/2011/main" val="1"/>
             </a:ext>
           </a:extLst>
         </p:spPr>
@@ -45991,7 +45991,7 @@
           </a:ln>
           <a:extLst>
             <a:ext uri="{C572A759-6A51-4108-AA02-DFA0A04FC94B}">
-              <ma14:wrappingTextBoxFlag xmlns:ma14="http://schemas.microsoft.com/office/mac/drawingml/2011/main" xmlns="" val="1"/>
+              <ma14:wrappingTextBoxFlag xmlns="" xmlns:ma14="http://schemas.microsoft.com/office/mac/drawingml/2011/main" val="1"/>
             </a:ext>
           </a:extLst>
         </p:spPr>
@@ -46076,7 +46076,7 @@
           </a:ln>
           <a:extLst>
             <a:ext uri="{C572A759-6A51-4108-AA02-DFA0A04FC94B}">
-              <ma14:wrappingTextBoxFlag xmlns:ma14="http://schemas.microsoft.com/office/mac/drawingml/2011/main" xmlns="" val="1"/>
+              <ma14:wrappingTextBoxFlag xmlns="" xmlns:ma14="http://schemas.microsoft.com/office/mac/drawingml/2011/main" val="1"/>
             </a:ext>
           </a:extLst>
         </p:spPr>
@@ -46254,7 +46254,7 @@
           </a:ln>
           <a:extLst>
             <a:ext uri="{C572A759-6A51-4108-AA02-DFA0A04FC94B}">
-              <ma14:wrappingTextBoxFlag xmlns:ma14="http://schemas.microsoft.com/office/mac/drawingml/2011/main" xmlns="" val="1"/>
+              <ma14:wrappingTextBoxFlag xmlns="" xmlns:ma14="http://schemas.microsoft.com/office/mac/drawingml/2011/main" val="1"/>
             </a:ext>
           </a:extLst>
         </p:spPr>
@@ -46304,7 +46304,7 @@
           </a:ln>
           <a:extLst>
             <a:ext uri="{C572A759-6A51-4108-AA02-DFA0A04FC94B}">
-              <ma14:wrappingTextBoxFlag xmlns:ma14="http://schemas.microsoft.com/office/mac/drawingml/2011/main" xmlns="" val="1"/>
+              <ma14:wrappingTextBoxFlag xmlns="" xmlns:ma14="http://schemas.microsoft.com/office/mac/drawingml/2011/main" val="1"/>
             </a:ext>
           </a:extLst>
         </p:spPr>
@@ -46347,7 +46347,7 @@
           </a:ln>
           <a:extLst>
             <a:ext uri="{C572A759-6A51-4108-AA02-DFA0A04FC94B}">
-              <ma14:wrappingTextBoxFlag xmlns:ma14="http://schemas.microsoft.com/office/mac/drawingml/2011/main" xmlns="" val="1"/>
+              <ma14:wrappingTextBoxFlag xmlns="" xmlns:ma14="http://schemas.microsoft.com/office/mac/drawingml/2011/main" val="1"/>
             </a:ext>
           </a:extLst>
         </p:spPr>
@@ -46432,7 +46432,7 @@
           </a:ln>
           <a:extLst>
             <a:ext uri="{C572A759-6A51-4108-AA02-DFA0A04FC94B}">
-              <ma14:wrappingTextBoxFlag xmlns:ma14="http://schemas.microsoft.com/office/mac/drawingml/2011/main" xmlns="" val="1"/>
+              <ma14:wrappingTextBoxFlag xmlns="" xmlns:ma14="http://schemas.microsoft.com/office/mac/drawingml/2011/main" val="1"/>
             </a:ext>
           </a:extLst>
         </p:spPr>
@@ -46574,7 +46574,7 @@
           </a:ln>
           <a:extLst>
             <a:ext uri="{C572A759-6A51-4108-AA02-DFA0A04FC94B}">
-              <ma14:wrappingTextBoxFlag xmlns:ma14="http://schemas.microsoft.com/office/mac/drawingml/2011/main" xmlns="" val="1"/>
+              <ma14:wrappingTextBoxFlag xmlns="" xmlns:ma14="http://schemas.microsoft.com/office/mac/drawingml/2011/main" val="1"/>
             </a:ext>
           </a:extLst>
         </p:spPr>
@@ -46621,7 +46621,7 @@
           </a:ln>
           <a:extLst>
             <a:ext uri="{C572A759-6A51-4108-AA02-DFA0A04FC94B}">
-              <ma14:wrappingTextBoxFlag xmlns:ma14="http://schemas.microsoft.com/office/mac/drawingml/2011/main" xmlns="" val="1"/>
+              <ma14:wrappingTextBoxFlag xmlns="" xmlns:ma14="http://schemas.microsoft.com/office/mac/drawingml/2011/main" val="1"/>
             </a:ext>
           </a:extLst>
         </p:spPr>
@@ -46668,7 +46668,7 @@
           </a:ln>
           <a:extLst>
             <a:ext uri="{C572A759-6A51-4108-AA02-DFA0A04FC94B}">
-              <ma14:wrappingTextBoxFlag xmlns:ma14="http://schemas.microsoft.com/office/mac/drawingml/2011/main" xmlns="" val="1"/>
+              <ma14:wrappingTextBoxFlag xmlns="" xmlns:ma14="http://schemas.microsoft.com/office/mac/drawingml/2011/main" val="1"/>
             </a:ext>
           </a:extLst>
         </p:spPr>
@@ -46712,7 +46712,7 @@
           </a:ln>
           <a:extLst>
             <a:ext uri="{C572A759-6A51-4108-AA02-DFA0A04FC94B}">
-              <ma14:wrappingTextBoxFlag xmlns:ma14="http://schemas.microsoft.com/office/mac/drawingml/2011/main" xmlns="" val="1"/>
+              <ma14:wrappingTextBoxFlag xmlns="" xmlns:ma14="http://schemas.microsoft.com/office/mac/drawingml/2011/main" val="1"/>
             </a:ext>
           </a:extLst>
         </p:spPr>
@@ -46869,7 +46869,7 @@
           </a:ln>
           <a:extLst>
             <a:ext uri="{C572A759-6A51-4108-AA02-DFA0A04FC94B}">
-              <ma14:wrappingTextBoxFlag xmlns:ma14="http://schemas.microsoft.com/office/mac/drawingml/2011/main" xmlns="" val="1"/>
+              <ma14:wrappingTextBoxFlag xmlns="" xmlns:ma14="http://schemas.microsoft.com/office/mac/drawingml/2011/main" val="1"/>
             </a:ext>
           </a:extLst>
         </p:spPr>
@@ -46998,7 +46998,7 @@
           </a:ln>
           <a:extLst>
             <a:ext uri="{C572A759-6A51-4108-AA02-DFA0A04FC94B}">
-              <ma14:wrappingTextBoxFlag xmlns:ma14="http://schemas.microsoft.com/office/mac/drawingml/2011/main" xmlns="" val="1"/>
+              <ma14:wrappingTextBoxFlag xmlns="" xmlns:ma14="http://schemas.microsoft.com/office/mac/drawingml/2011/main" val="1"/>
             </a:ext>
           </a:extLst>
         </p:spPr>
@@ -47045,7 +47045,7 @@
           </a:ln>
           <a:extLst>
             <a:ext uri="{C572A759-6A51-4108-AA02-DFA0A04FC94B}">
-              <ma14:wrappingTextBoxFlag xmlns:ma14="http://schemas.microsoft.com/office/mac/drawingml/2011/main" xmlns="" val="1"/>
+              <ma14:wrappingTextBoxFlag xmlns="" xmlns:ma14="http://schemas.microsoft.com/office/mac/drawingml/2011/main" val="1"/>
             </a:ext>
           </a:extLst>
         </p:spPr>
@@ -47092,7 +47092,7 @@
           </a:ln>
           <a:extLst>
             <a:ext uri="{C572A759-6A51-4108-AA02-DFA0A04FC94B}">
-              <ma14:wrappingTextBoxFlag xmlns:ma14="http://schemas.microsoft.com/office/mac/drawingml/2011/main" xmlns="" val="1"/>
+              <ma14:wrappingTextBoxFlag xmlns="" xmlns:ma14="http://schemas.microsoft.com/office/mac/drawingml/2011/main" val="1"/>
             </a:ext>
           </a:extLst>
         </p:spPr>
@@ -47136,7 +47136,7 @@
           </a:ln>
           <a:extLst>
             <a:ext uri="{C572A759-6A51-4108-AA02-DFA0A04FC94B}">
-              <ma14:wrappingTextBoxFlag xmlns:ma14="http://schemas.microsoft.com/office/mac/drawingml/2011/main" xmlns="" val="1"/>
+              <ma14:wrappingTextBoxFlag xmlns="" xmlns:ma14="http://schemas.microsoft.com/office/mac/drawingml/2011/main" val="1"/>
             </a:ext>
           </a:extLst>
         </p:spPr>
@@ -47290,7 +47290,7 @@
           </a:ln>
           <a:extLst>
             <a:ext uri="{C572A759-6A51-4108-AA02-DFA0A04FC94B}">
-              <ma14:wrappingTextBoxFlag xmlns:ma14="http://schemas.microsoft.com/office/mac/drawingml/2011/main" xmlns="" val="1"/>
+              <ma14:wrappingTextBoxFlag xmlns="" xmlns:ma14="http://schemas.microsoft.com/office/mac/drawingml/2011/main" val="1"/>
             </a:ext>
           </a:extLst>
         </p:spPr>
@@ -47378,7 +47378,7 @@
           </a:ln>
           <a:extLst>
             <a:ext uri="{C572A759-6A51-4108-AA02-DFA0A04FC94B}">
-              <ma14:wrappingTextBoxFlag xmlns:ma14="http://schemas.microsoft.com/office/mac/drawingml/2011/main" xmlns="" val="1"/>
+              <ma14:wrappingTextBoxFlag xmlns="" xmlns:ma14="http://schemas.microsoft.com/office/mac/drawingml/2011/main" val="1"/>
             </a:ext>
           </a:extLst>
         </p:spPr>

</xml_diff>